<commit_message>
vorschlag prosa, verzeichnisse in pp
</commit_message>
<xml_diff>
--- a/Agile_Softwareentwicklung_Automotive_PGPE.pptx
+++ b/Agile_Softwareentwicklung_Automotive_PGPE.pptx
@@ -9,13 +9,15 @@
     <p:sldMasterId id="2147483702" r:id="rId5"/>
   </p:sldMasterIdLst>
   <p:notesMasterIdLst>
-    <p:notesMasterId r:id="rId10"/>
+    <p:notesMasterId r:id="rId12"/>
   </p:notesMasterIdLst>
   <p:sldIdLst>
     <p:sldId id="281" r:id="rId6"/>
     <p:sldId id="282" r:id="rId7"/>
     <p:sldId id="283" r:id="rId8"/>
     <p:sldId id="284" r:id="rId9"/>
+    <p:sldId id="285" r:id="rId10"/>
+    <p:sldId id="286" r:id="rId11"/>
   </p:sldIdLst>
   <p:sldSz cx="12192000" cy="6858000"/>
   <p:notesSz cx="6858000" cy="9144000"/>
@@ -35392,15 +35394,6 @@
           <a:solidFill>
             <a:srgbClr val="FFFFFF"/>
           </a:solidFill>
-          <a:extLst>
-            <a:ext uri="{909E8E84-426E-40DD-AFC4-6F175D3DCCD1}">
-              <a14:hiddenFill xmlns:a14="http://schemas.microsoft.com/office/drawing/2010/main">
-                <a:solidFill>
-                  <a:srgbClr val="FFFFFF"/>
-                </a:solidFill>
-              </a14:hiddenFill>
-            </a:ext>
-          </a:extLst>
         </p:spPr>
       </p:pic>
       <p:sp>
@@ -35583,8 +35576,8 @@
         </p:nvSpPr>
         <p:spPr>
           <a:xfrm>
-            <a:off x="9883778" y="6515213"/>
-            <a:ext cx="1899711" cy="216000"/>
+            <a:off x="8682361" y="6515213"/>
+            <a:ext cx="3101129" cy="216000"/>
           </a:xfrm>
         </p:spPr>
         <p:txBody>
@@ -35600,7 +35593,18 @@
             </a:pPr>
             <a:r>
               <a:rPr lang="de-DE" dirty="0"/>
-              <a:t>[Agile Alliance, 2022]|  </a:t>
+              <a:t>[Agile Alliance, 2022], [</a:t>
+            </a:r>
+            <a:r>
+              <a:rPr lang="de-DE" b="0" i="0" dirty="0">
+                <a:effectLst/>
+                <a:latin typeface="Arial" panose="020B0604020202020204" pitchFamily="34" charset="0"/>
+              </a:rPr>
+              <a:t>Abbildung 1] </a:t>
+            </a:r>
+            <a:r>
+              <a:rPr lang="de-DE" dirty="0"/>
+              <a:t>|  </a:t>
             </a:r>
             <a:fld id="{E6B5151A-17C4-4431-8407-112C0160A8B6}" type="slidenum">
               <a:rPr lang="de-DE" smtClean="0"/>
@@ -35649,6 +35653,751 @@
     <p:extLst>
       <p:ext uri="{BB962C8B-B14F-4D97-AF65-F5344CB8AC3E}">
         <p14:creationId xmlns:p14="http://schemas.microsoft.com/office/powerpoint/2010/main" val="2642037031"/>
+      </p:ext>
+    </p:extLst>
+  </p:cSld>
+  <p:clrMapOvr>
+    <a:masterClrMapping/>
+  </p:clrMapOvr>
+</p:sld>
+</file>
+
+<file path=ppt/slides/slide5.xml><?xml version="1.0" encoding="utf-8"?>
+<p:sld xmlns:a="http://schemas.openxmlformats.org/drawingml/2006/main" xmlns:r="http://schemas.openxmlformats.org/officeDocument/2006/relationships" xmlns:p="http://schemas.openxmlformats.org/presentationml/2006/main">
+  <p:cSld>
+    <p:spTree>
+      <p:nvGrpSpPr>
+        <p:cNvPr id="1" name=""/>
+        <p:cNvGrpSpPr/>
+        <p:nvPr/>
+      </p:nvGrpSpPr>
+      <p:grpSpPr>
+        <a:xfrm>
+          <a:off x="0" y="0"/>
+          <a:ext cx="0" cy="0"/>
+          <a:chOff x="0" y="0"/>
+          <a:chExt cx="0" cy="0"/>
+        </a:xfrm>
+      </p:grpSpPr>
+      <p:sp>
+        <p:nvSpPr>
+          <p:cNvPr id="3" name="Datumsplatzhalter 2">
+            <a:extLst>
+              <a:ext uri="{FF2B5EF4-FFF2-40B4-BE49-F238E27FC236}">
+                <a16:creationId xmlns:a16="http://schemas.microsoft.com/office/drawing/2014/main" id="{FE2618A7-246F-BE95-0BA0-D89E868BB6CD}"/>
+              </a:ext>
+            </a:extLst>
+          </p:cNvPr>
+          <p:cNvSpPr>
+            <a:spLocks noGrp="1"/>
+          </p:cNvSpPr>
+          <p:nvPr>
+            <p:ph type="dt" sz="half" idx="10"/>
+          </p:nvPr>
+        </p:nvSpPr>
+        <p:spPr/>
+        <p:txBody>
+          <a:bodyPr/>
+          <a:lstStyle/>
+          <a:p>
+            <a:r>
+              <a:rPr lang="de-DE"/>
+              <a:t>Campus Sontheim</a:t>
+            </a:r>
+            <a:endParaRPr lang="de-DE" dirty="0"/>
+          </a:p>
+        </p:txBody>
+      </p:sp>
+      <p:sp>
+        <p:nvSpPr>
+          <p:cNvPr id="5" name="Fußzeilenplatzhalter 4">
+            <a:extLst>
+              <a:ext uri="{FF2B5EF4-FFF2-40B4-BE49-F238E27FC236}">
+                <a16:creationId xmlns:a16="http://schemas.microsoft.com/office/drawing/2014/main" id="{3FAF1F66-EAC1-1266-9ACA-885788282CEC}"/>
+              </a:ext>
+            </a:extLst>
+          </p:cNvPr>
+          <p:cNvSpPr>
+            <a:spLocks noGrp="1"/>
+          </p:cNvSpPr>
+          <p:nvPr>
+            <p:ph type="ftr" sz="quarter" idx="11"/>
+          </p:nvPr>
+        </p:nvSpPr>
+        <p:spPr/>
+        <p:txBody>
+          <a:bodyPr/>
+          <a:lstStyle/>
+          <a:p>
+            <a:r>
+              <a:rPr lang="de-DE"/>
+              <a:t>Sarah-Anne Teuner, Rico Steinke |  T1 / MAS |  WiSe 2022/23</a:t>
+            </a:r>
+            <a:endParaRPr lang="de-DE" dirty="0"/>
+          </a:p>
+        </p:txBody>
+      </p:sp>
+      <p:sp>
+        <p:nvSpPr>
+          <p:cNvPr id="6" name="Foliennummernplatzhalter 5">
+            <a:extLst>
+              <a:ext uri="{FF2B5EF4-FFF2-40B4-BE49-F238E27FC236}">
+                <a16:creationId xmlns:a16="http://schemas.microsoft.com/office/drawing/2014/main" id="{FC15A4F3-CE1D-71B4-B211-A117CD4C4522}"/>
+              </a:ext>
+            </a:extLst>
+          </p:cNvPr>
+          <p:cNvSpPr>
+            <a:spLocks noGrp="1"/>
+          </p:cNvSpPr>
+          <p:nvPr>
+            <p:ph type="sldNum" sz="quarter" idx="12"/>
+          </p:nvPr>
+        </p:nvSpPr>
+        <p:spPr/>
+        <p:txBody>
+          <a:bodyPr/>
+          <a:lstStyle/>
+          <a:p>
+            <a:r>
+              <a:rPr lang="de-DE"/>
+              <a:t>|  </a:t>
+            </a:r>
+            <a:fld id="{E6B5151A-17C4-4431-8407-112C0160A8B6}" type="slidenum">
+              <a:rPr lang="de-DE" smtClean="0"/>
+              <a:pPr/>
+              <a:t>5</a:t>
+            </a:fld>
+            <a:endParaRPr lang="de-DE" dirty="0"/>
+          </a:p>
+        </p:txBody>
+      </p:sp>
+      <p:sp>
+        <p:nvSpPr>
+          <p:cNvPr id="8" name="Titel 7">
+            <a:extLst>
+              <a:ext uri="{FF2B5EF4-FFF2-40B4-BE49-F238E27FC236}">
+                <a16:creationId xmlns:a16="http://schemas.microsoft.com/office/drawing/2014/main" id="{A4DA370A-F9F8-1AAB-8F9D-DE85826D91AC}"/>
+              </a:ext>
+            </a:extLst>
+          </p:cNvPr>
+          <p:cNvSpPr>
+            <a:spLocks noGrp="1"/>
+          </p:cNvSpPr>
+          <p:nvPr>
+            <p:ph type="title"/>
+          </p:nvPr>
+        </p:nvSpPr>
+        <p:spPr/>
+        <p:txBody>
+          <a:bodyPr/>
+          <a:lstStyle/>
+          <a:p>
+            <a:r>
+              <a:rPr lang="de-DE" dirty="0" err="1"/>
+              <a:t>AbbildungsVerzeichnis</a:t>
+            </a:r>
+            <a:endParaRPr lang="de-DE" dirty="0"/>
+          </a:p>
+        </p:txBody>
+      </p:sp>
+      <p:sp>
+        <p:nvSpPr>
+          <p:cNvPr id="9" name="Inhaltsplatzhalter 8">
+            <a:extLst>
+              <a:ext uri="{FF2B5EF4-FFF2-40B4-BE49-F238E27FC236}">
+                <a16:creationId xmlns:a16="http://schemas.microsoft.com/office/drawing/2014/main" id="{027FC95D-FE72-E71C-60C3-362414F19C9C}"/>
+              </a:ext>
+            </a:extLst>
+          </p:cNvPr>
+          <p:cNvSpPr>
+            <a:spLocks noGrp="1"/>
+          </p:cNvSpPr>
+          <p:nvPr>
+            <p:ph idx="13"/>
+          </p:nvPr>
+        </p:nvSpPr>
+        <p:spPr/>
+        <p:txBody>
+          <a:bodyPr/>
+          <a:lstStyle/>
+          <a:p>
+            <a:r>
+              <a:rPr lang="de-DE" b="0" i="0" dirty="0">
+                <a:effectLst/>
+                <a:latin typeface="Arial" panose="020B0604020202020204" pitchFamily="34" charset="0"/>
+              </a:rPr>
+              <a:t>1 Symbolgraphik Agile (Quelle: stock.adobe.com) . . . . . . . . . . . . . . Folie 4 </a:t>
+            </a:r>
+            <a:endParaRPr lang="de-DE" dirty="0"/>
+          </a:p>
+        </p:txBody>
+      </p:sp>
+    </p:spTree>
+    <p:extLst>
+      <p:ext uri="{BB962C8B-B14F-4D97-AF65-F5344CB8AC3E}">
+        <p14:creationId xmlns:p14="http://schemas.microsoft.com/office/powerpoint/2010/main" val="956665881"/>
+      </p:ext>
+    </p:extLst>
+  </p:cSld>
+  <p:clrMapOvr>
+    <a:masterClrMapping/>
+  </p:clrMapOvr>
+</p:sld>
+</file>
+
+<file path=ppt/slides/slide6.xml><?xml version="1.0" encoding="utf-8"?>
+<p:sld xmlns:a="http://schemas.openxmlformats.org/drawingml/2006/main" xmlns:r="http://schemas.openxmlformats.org/officeDocument/2006/relationships" xmlns:p="http://schemas.openxmlformats.org/presentationml/2006/main">
+  <p:cSld>
+    <p:spTree>
+      <p:nvGrpSpPr>
+        <p:cNvPr id="1" name=""/>
+        <p:cNvGrpSpPr/>
+        <p:nvPr/>
+      </p:nvGrpSpPr>
+      <p:grpSpPr>
+        <a:xfrm>
+          <a:off x="0" y="0"/>
+          <a:ext cx="0" cy="0"/>
+          <a:chOff x="0" y="0"/>
+          <a:chExt cx="0" cy="0"/>
+        </a:xfrm>
+      </p:grpSpPr>
+      <p:sp>
+        <p:nvSpPr>
+          <p:cNvPr id="2" name="Datumsplatzhalter 1">
+            <a:extLst>
+              <a:ext uri="{FF2B5EF4-FFF2-40B4-BE49-F238E27FC236}">
+                <a16:creationId xmlns:a16="http://schemas.microsoft.com/office/drawing/2014/main" id="{715BFC56-E707-DCA2-9B30-20D5F047E4BD}"/>
+              </a:ext>
+            </a:extLst>
+          </p:cNvPr>
+          <p:cNvSpPr>
+            <a:spLocks noGrp="1"/>
+          </p:cNvSpPr>
+          <p:nvPr>
+            <p:ph type="dt" sz="half" idx="10"/>
+          </p:nvPr>
+        </p:nvSpPr>
+        <p:spPr/>
+        <p:txBody>
+          <a:bodyPr/>
+          <a:lstStyle/>
+          <a:p>
+            <a:r>
+              <a:rPr lang="de-DE"/>
+              <a:t>Campus Sontheim</a:t>
+            </a:r>
+            <a:endParaRPr lang="de-DE" dirty="0"/>
+          </a:p>
+        </p:txBody>
+      </p:sp>
+      <p:sp>
+        <p:nvSpPr>
+          <p:cNvPr id="3" name="Fußzeilenplatzhalter 2">
+            <a:extLst>
+              <a:ext uri="{FF2B5EF4-FFF2-40B4-BE49-F238E27FC236}">
+                <a16:creationId xmlns:a16="http://schemas.microsoft.com/office/drawing/2014/main" id="{92336A89-E81A-8175-D84C-9E978E13583A}"/>
+              </a:ext>
+            </a:extLst>
+          </p:cNvPr>
+          <p:cNvSpPr>
+            <a:spLocks noGrp="1"/>
+          </p:cNvSpPr>
+          <p:nvPr>
+            <p:ph type="ftr" sz="quarter" idx="11"/>
+          </p:nvPr>
+        </p:nvSpPr>
+        <p:spPr/>
+        <p:txBody>
+          <a:bodyPr/>
+          <a:lstStyle/>
+          <a:p>
+            <a:r>
+              <a:rPr lang="de-DE"/>
+              <a:t>Sarah-Anne Teuner, Rico Steinke |  T1 / MAS |  WiSe 2022/23</a:t>
+            </a:r>
+            <a:endParaRPr lang="de-DE" dirty="0"/>
+          </a:p>
+        </p:txBody>
+      </p:sp>
+      <p:sp>
+        <p:nvSpPr>
+          <p:cNvPr id="4" name="Foliennummernplatzhalter 3">
+            <a:extLst>
+              <a:ext uri="{FF2B5EF4-FFF2-40B4-BE49-F238E27FC236}">
+                <a16:creationId xmlns:a16="http://schemas.microsoft.com/office/drawing/2014/main" id="{D152A9AF-D990-6F71-9CA5-C3C38B81FED8}"/>
+              </a:ext>
+            </a:extLst>
+          </p:cNvPr>
+          <p:cNvSpPr>
+            <a:spLocks noGrp="1"/>
+          </p:cNvSpPr>
+          <p:nvPr>
+            <p:ph type="sldNum" sz="quarter" idx="12"/>
+          </p:nvPr>
+        </p:nvSpPr>
+        <p:spPr/>
+        <p:txBody>
+          <a:bodyPr/>
+          <a:lstStyle/>
+          <a:p>
+            <a:r>
+              <a:rPr lang="de-DE"/>
+              <a:t>|  </a:t>
+            </a:r>
+            <a:fld id="{E6B5151A-17C4-4431-8407-112C0160A8B6}" type="slidenum">
+              <a:rPr lang="de-DE" smtClean="0"/>
+              <a:pPr/>
+              <a:t>6</a:t>
+            </a:fld>
+            <a:endParaRPr lang="de-DE" dirty="0"/>
+          </a:p>
+        </p:txBody>
+      </p:sp>
+      <p:sp>
+        <p:nvSpPr>
+          <p:cNvPr id="5" name="Titel 4">
+            <a:extLst>
+              <a:ext uri="{FF2B5EF4-FFF2-40B4-BE49-F238E27FC236}">
+                <a16:creationId xmlns:a16="http://schemas.microsoft.com/office/drawing/2014/main" id="{25A1D4C8-876A-2FA2-821C-89B88EC1BD6A}"/>
+              </a:ext>
+            </a:extLst>
+          </p:cNvPr>
+          <p:cNvSpPr>
+            <a:spLocks noGrp="1"/>
+          </p:cNvSpPr>
+          <p:nvPr>
+            <p:ph type="title"/>
+          </p:nvPr>
+        </p:nvSpPr>
+        <p:spPr/>
+        <p:txBody>
+          <a:bodyPr/>
+          <a:lstStyle/>
+          <a:p>
+            <a:r>
+              <a:rPr lang="de-DE" dirty="0"/>
+              <a:t>Literaturverzeichnis</a:t>
+            </a:r>
+          </a:p>
+        </p:txBody>
+      </p:sp>
+      <p:sp>
+        <p:nvSpPr>
+          <p:cNvPr id="6" name="Inhaltsplatzhalter 5">
+            <a:extLst>
+              <a:ext uri="{FF2B5EF4-FFF2-40B4-BE49-F238E27FC236}">
+                <a16:creationId xmlns:a16="http://schemas.microsoft.com/office/drawing/2014/main" id="{3E7EDE6D-9992-6245-5C0C-4BFD2B763B39}"/>
+              </a:ext>
+            </a:extLst>
+          </p:cNvPr>
+          <p:cNvSpPr>
+            <a:spLocks noGrp="1"/>
+          </p:cNvSpPr>
+          <p:nvPr>
+            <p:ph idx="13"/>
+          </p:nvPr>
+        </p:nvSpPr>
+        <p:spPr/>
+        <p:txBody>
+          <a:bodyPr/>
+          <a:lstStyle/>
+          <a:p>
+            <a:r>
+              <a:rPr lang="de-DE" sz="1400" b="0" i="0" dirty="0">
+                <a:effectLst/>
+                <a:latin typeface="Arial" panose="020B0604020202020204" pitchFamily="34" charset="0"/>
+                <a:cs typeface="Arial" panose="020B0604020202020204" pitchFamily="34" charset="0"/>
+              </a:rPr>
+              <a:t>[1] A. </a:t>
+            </a:r>
+            <a:r>
+              <a:rPr lang="de-DE" sz="1400" b="0" i="0" dirty="0" err="1">
+                <a:effectLst/>
+                <a:latin typeface="Arial" panose="020B0604020202020204" pitchFamily="34" charset="0"/>
+                <a:cs typeface="Arial" panose="020B0604020202020204" pitchFamily="34" charset="0"/>
+              </a:rPr>
+              <a:t>Schloßer</a:t>
+            </a:r>
+            <a:r>
+              <a:rPr lang="de-DE" sz="1400" b="0" i="0" dirty="0">
+                <a:effectLst/>
+                <a:latin typeface="Arial" panose="020B0604020202020204" pitchFamily="34" charset="0"/>
+                <a:cs typeface="Arial" panose="020B0604020202020204" pitchFamily="34" charset="0"/>
+              </a:rPr>
+              <a:t>, J. Schnitzler, T. Sentis, and J. Richenhagen, “Agile </a:t>
+            </a:r>
+            <a:r>
+              <a:rPr lang="de-DE" sz="1400" b="0" i="0" dirty="0" err="1">
+                <a:effectLst/>
+                <a:latin typeface="Arial" panose="020B0604020202020204" pitchFamily="34" charset="0"/>
+                <a:cs typeface="Arial" panose="020B0604020202020204" pitchFamily="34" charset="0"/>
+              </a:rPr>
+              <a:t>processes</a:t>
+            </a:r>
+            <a:r>
+              <a:rPr lang="de-DE" sz="1400" b="0" i="0" dirty="0">
+                <a:effectLst/>
+                <a:latin typeface="Arial" panose="020B0604020202020204" pitchFamily="34" charset="0"/>
+                <a:cs typeface="Arial" panose="020B0604020202020204" pitchFamily="34" charset="0"/>
+              </a:rPr>
+              <a:t> in </a:t>
+            </a:r>
+            <a:r>
+              <a:rPr lang="de-DE" sz="1400" b="0" i="0" dirty="0" err="1">
+                <a:effectLst/>
+                <a:latin typeface="Arial" panose="020B0604020202020204" pitchFamily="34" charset="0"/>
+                <a:cs typeface="Arial" panose="020B0604020202020204" pitchFamily="34" charset="0"/>
+              </a:rPr>
+              <a:t>automotive</a:t>
+            </a:r>
+            <a:r>
+              <a:rPr lang="de-DE" sz="1400" b="0" i="0" dirty="0">
+                <a:effectLst/>
+                <a:latin typeface="Arial" panose="020B0604020202020204" pitchFamily="34" charset="0"/>
+                <a:cs typeface="Arial" panose="020B0604020202020204" pitchFamily="34" charset="0"/>
+              </a:rPr>
+              <a:t> </a:t>
+            </a:r>
+            <a:r>
+              <a:rPr lang="de-DE" sz="1400" b="0" i="0" dirty="0" err="1">
+                <a:effectLst/>
+                <a:latin typeface="Arial" panose="020B0604020202020204" pitchFamily="34" charset="0"/>
+                <a:cs typeface="Arial" panose="020B0604020202020204" pitchFamily="34" charset="0"/>
+              </a:rPr>
+              <a:t>industry</a:t>
+            </a:r>
+            <a:r>
+              <a:rPr lang="de-DE" sz="1400" b="0" i="0" dirty="0">
+                <a:effectLst/>
+                <a:latin typeface="Arial" panose="020B0604020202020204" pitchFamily="34" charset="0"/>
+                <a:cs typeface="Arial" panose="020B0604020202020204" pitchFamily="34" charset="0"/>
+              </a:rPr>
+              <a:t> – </a:t>
+            </a:r>
+            <a:r>
+              <a:rPr lang="de-DE" sz="1400" b="0" i="0" dirty="0" err="1">
+                <a:effectLst/>
+                <a:latin typeface="Arial" panose="020B0604020202020204" pitchFamily="34" charset="0"/>
+                <a:cs typeface="Arial" panose="020B0604020202020204" pitchFamily="34" charset="0"/>
+              </a:rPr>
+              <a:t>efficiency</a:t>
+            </a:r>
+            <a:r>
+              <a:rPr lang="de-DE" sz="1400" b="0" i="0" dirty="0">
+                <a:effectLst/>
+                <a:latin typeface="Arial" panose="020B0604020202020204" pitchFamily="34" charset="0"/>
+                <a:cs typeface="Arial" panose="020B0604020202020204" pitchFamily="34" charset="0"/>
+              </a:rPr>
+              <a:t> and </a:t>
+            </a:r>
+            <a:r>
+              <a:rPr lang="de-DE" sz="1400" b="0" i="0" dirty="0" err="1">
+                <a:effectLst/>
+                <a:latin typeface="Arial" panose="020B0604020202020204" pitchFamily="34" charset="0"/>
+                <a:cs typeface="Arial" panose="020B0604020202020204" pitchFamily="34" charset="0"/>
+              </a:rPr>
+              <a:t>quality</a:t>
+            </a:r>
+            <a:r>
+              <a:rPr lang="de-DE" sz="1400" b="0" i="0" dirty="0">
+                <a:effectLst/>
+                <a:latin typeface="Arial" panose="020B0604020202020204" pitchFamily="34" charset="0"/>
+                <a:cs typeface="Arial" panose="020B0604020202020204" pitchFamily="34" charset="0"/>
+              </a:rPr>
+              <a:t> in </a:t>
+            </a:r>
+            <a:r>
+              <a:rPr lang="de-DE" sz="1400" b="0" i="0" dirty="0" err="1">
+                <a:effectLst/>
+                <a:latin typeface="Arial" panose="020B0604020202020204" pitchFamily="34" charset="0"/>
+                <a:cs typeface="Arial" panose="020B0604020202020204" pitchFamily="34" charset="0"/>
+              </a:rPr>
+              <a:t>software</a:t>
+            </a:r>
+            <a:r>
+              <a:rPr lang="de-DE" sz="1400" b="0" i="0" dirty="0">
+                <a:effectLst/>
+                <a:latin typeface="Arial" panose="020B0604020202020204" pitchFamily="34" charset="0"/>
+                <a:cs typeface="Arial" panose="020B0604020202020204" pitchFamily="34" charset="0"/>
+              </a:rPr>
+              <a:t> </a:t>
+            </a:r>
+            <a:r>
+              <a:rPr lang="de-DE" sz="1400" b="0" i="0" dirty="0" err="1">
+                <a:effectLst/>
+                <a:latin typeface="Arial" panose="020B0604020202020204" pitchFamily="34" charset="0"/>
+                <a:cs typeface="Arial" panose="020B0604020202020204" pitchFamily="34" charset="0"/>
+              </a:rPr>
+              <a:t>development</a:t>
+            </a:r>
+            <a:r>
+              <a:rPr lang="de-DE" sz="1400" b="0" i="0" dirty="0">
+                <a:effectLst/>
+                <a:latin typeface="Arial" panose="020B0604020202020204" pitchFamily="34" charset="0"/>
+                <a:cs typeface="Arial" panose="020B0604020202020204" pitchFamily="34" charset="0"/>
+              </a:rPr>
+              <a:t>,” in 16. Internationales Stuttgarter Symposium (M. </a:t>
+            </a:r>
+            <a:r>
+              <a:rPr lang="de-DE" sz="1400" b="0" i="0" dirty="0" err="1">
+                <a:effectLst/>
+                <a:latin typeface="Arial" panose="020B0604020202020204" pitchFamily="34" charset="0"/>
+                <a:cs typeface="Arial" panose="020B0604020202020204" pitchFamily="34" charset="0"/>
+              </a:rPr>
+              <a:t>Bargende</a:t>
+            </a:r>
+            <a:r>
+              <a:rPr lang="de-DE" sz="1400" b="0" i="0" dirty="0">
+                <a:effectLst/>
+                <a:latin typeface="Arial" panose="020B0604020202020204" pitchFamily="34" charset="0"/>
+                <a:cs typeface="Arial" panose="020B0604020202020204" pitchFamily="34" charset="0"/>
+              </a:rPr>
+              <a:t>, H.-C. </a:t>
+            </a:r>
+            <a:r>
+              <a:rPr lang="de-DE" sz="1400" b="0" i="0" dirty="0" err="1">
+                <a:effectLst/>
+                <a:latin typeface="Arial" panose="020B0604020202020204" pitchFamily="34" charset="0"/>
+                <a:cs typeface="Arial" panose="020B0604020202020204" pitchFamily="34" charset="0"/>
+              </a:rPr>
+              <a:t>Reuss</a:t>
+            </a:r>
+            <a:r>
+              <a:rPr lang="de-DE" sz="1400" b="0" i="0" dirty="0">
+                <a:effectLst/>
+                <a:latin typeface="Arial" panose="020B0604020202020204" pitchFamily="34" charset="0"/>
+                <a:cs typeface="Arial" panose="020B0604020202020204" pitchFamily="34" charset="0"/>
+              </a:rPr>
+              <a:t>, and J. Wiedemann, </a:t>
+            </a:r>
+            <a:r>
+              <a:rPr lang="de-DE" sz="1400" b="0" i="0" dirty="0" err="1">
+                <a:effectLst/>
+                <a:latin typeface="Arial" panose="020B0604020202020204" pitchFamily="34" charset="0"/>
+                <a:cs typeface="Arial" panose="020B0604020202020204" pitchFamily="34" charset="0"/>
+              </a:rPr>
+              <a:t>eds</a:t>
+            </a:r>
+            <a:r>
+              <a:rPr lang="de-DE" sz="1400" b="0" i="0" dirty="0">
+                <a:effectLst/>
+                <a:latin typeface="Arial" panose="020B0604020202020204" pitchFamily="34" charset="0"/>
+                <a:cs typeface="Arial" panose="020B0604020202020204" pitchFamily="34" charset="0"/>
+              </a:rPr>
+              <a:t>.), (Wiesbaden), pp. 489–503, Springer Fachmedien Wiesbaden, 2016.</a:t>
+            </a:r>
+            <a:br>
+              <a:rPr lang="de-DE" sz="1400" dirty="0">
+                <a:latin typeface="Arial" panose="020B0604020202020204" pitchFamily="34" charset="0"/>
+                <a:cs typeface="Arial" panose="020B0604020202020204" pitchFamily="34" charset="0"/>
+              </a:rPr>
+            </a:br>
+            <a:r>
+              <a:rPr lang="de-DE" sz="1400" b="0" i="0" dirty="0">
+                <a:effectLst/>
+                <a:latin typeface="Arial" panose="020B0604020202020204" pitchFamily="34" charset="0"/>
+                <a:cs typeface="Arial" panose="020B0604020202020204" pitchFamily="34" charset="0"/>
+              </a:rPr>
+              <a:t>[2] B. </a:t>
+            </a:r>
+            <a:r>
+              <a:rPr lang="de-DE" sz="1400" b="0" i="0" dirty="0" err="1">
+                <a:effectLst/>
+                <a:latin typeface="Arial" panose="020B0604020202020204" pitchFamily="34" charset="0"/>
+                <a:cs typeface="Arial" panose="020B0604020202020204" pitchFamily="34" charset="0"/>
+              </a:rPr>
+              <a:t>Katumba</a:t>
+            </a:r>
+            <a:r>
+              <a:rPr lang="de-DE" sz="1400" b="0" i="0" dirty="0">
+                <a:effectLst/>
+                <a:latin typeface="Arial" panose="020B0604020202020204" pitchFamily="34" charset="0"/>
+                <a:cs typeface="Arial" panose="020B0604020202020204" pitchFamily="34" charset="0"/>
+              </a:rPr>
+              <a:t> and E. Knauss, “Agile </a:t>
+            </a:r>
+            <a:r>
+              <a:rPr lang="de-DE" sz="1400" b="0" i="0" dirty="0" err="1">
+                <a:effectLst/>
+                <a:latin typeface="Arial" panose="020B0604020202020204" pitchFamily="34" charset="0"/>
+                <a:cs typeface="Arial" panose="020B0604020202020204" pitchFamily="34" charset="0"/>
+              </a:rPr>
+              <a:t>development</a:t>
+            </a:r>
+            <a:r>
+              <a:rPr lang="de-DE" sz="1400" b="0" i="0" dirty="0">
+                <a:effectLst/>
+                <a:latin typeface="Arial" panose="020B0604020202020204" pitchFamily="34" charset="0"/>
+                <a:cs typeface="Arial" panose="020B0604020202020204" pitchFamily="34" charset="0"/>
+              </a:rPr>
+              <a:t> in </a:t>
+            </a:r>
+            <a:r>
+              <a:rPr lang="de-DE" sz="1400" b="0" i="0" dirty="0" err="1">
+                <a:effectLst/>
+                <a:latin typeface="Arial" panose="020B0604020202020204" pitchFamily="34" charset="0"/>
+                <a:cs typeface="Arial" panose="020B0604020202020204" pitchFamily="34" charset="0"/>
+              </a:rPr>
+              <a:t>automotive</a:t>
+            </a:r>
+            <a:r>
+              <a:rPr lang="de-DE" sz="1400" b="0" i="0" dirty="0">
+                <a:effectLst/>
+                <a:latin typeface="Arial" panose="020B0604020202020204" pitchFamily="34" charset="0"/>
+                <a:cs typeface="Arial" panose="020B0604020202020204" pitchFamily="34" charset="0"/>
+              </a:rPr>
+              <a:t> </a:t>
+            </a:r>
+            <a:r>
+              <a:rPr lang="de-DE" sz="1400" b="0" i="0" dirty="0" err="1">
+                <a:effectLst/>
+                <a:latin typeface="Arial" panose="020B0604020202020204" pitchFamily="34" charset="0"/>
+                <a:cs typeface="Arial" panose="020B0604020202020204" pitchFamily="34" charset="0"/>
+              </a:rPr>
+              <a:t>software</a:t>
+            </a:r>
+            <a:r>
+              <a:rPr lang="de-DE" sz="1400" b="0" i="0" dirty="0">
+                <a:effectLst/>
+                <a:latin typeface="Arial" panose="020B0604020202020204" pitchFamily="34" charset="0"/>
+                <a:cs typeface="Arial" panose="020B0604020202020204" pitchFamily="34" charset="0"/>
+              </a:rPr>
+              <a:t> </a:t>
+            </a:r>
+            <a:r>
+              <a:rPr lang="de-DE" sz="1400" b="0" i="0" dirty="0" err="1">
+                <a:effectLst/>
+                <a:latin typeface="Arial" panose="020B0604020202020204" pitchFamily="34" charset="0"/>
+                <a:cs typeface="Arial" panose="020B0604020202020204" pitchFamily="34" charset="0"/>
+              </a:rPr>
+              <a:t>development</a:t>
+            </a:r>
+            <a:r>
+              <a:rPr lang="de-DE" sz="1400" b="0" i="0" dirty="0">
+                <a:effectLst/>
+                <a:latin typeface="Arial" panose="020B0604020202020204" pitchFamily="34" charset="0"/>
+                <a:cs typeface="Arial" panose="020B0604020202020204" pitchFamily="34" charset="0"/>
+              </a:rPr>
+              <a:t>: Challenges and </a:t>
+            </a:r>
+            <a:r>
+              <a:rPr lang="de-DE" sz="1400" b="0" i="0" dirty="0" err="1">
+                <a:effectLst/>
+                <a:latin typeface="Arial" panose="020B0604020202020204" pitchFamily="34" charset="0"/>
+                <a:cs typeface="Arial" panose="020B0604020202020204" pitchFamily="34" charset="0"/>
+              </a:rPr>
+              <a:t>opportunities</a:t>
+            </a:r>
+            <a:r>
+              <a:rPr lang="de-DE" sz="1400" b="0" i="0" dirty="0">
+                <a:effectLst/>
+                <a:latin typeface="Arial" panose="020B0604020202020204" pitchFamily="34" charset="0"/>
+                <a:cs typeface="Arial" panose="020B0604020202020204" pitchFamily="34" charset="0"/>
+              </a:rPr>
+              <a:t>,” 12 2014.</a:t>
+            </a:r>
+            <a:br>
+              <a:rPr lang="de-DE" sz="1400" dirty="0">
+                <a:latin typeface="Arial" panose="020B0604020202020204" pitchFamily="34" charset="0"/>
+                <a:cs typeface="Arial" panose="020B0604020202020204" pitchFamily="34" charset="0"/>
+              </a:rPr>
+            </a:br>
+            <a:r>
+              <a:rPr lang="de-DE" sz="1400" b="0" i="0" dirty="0">
+                <a:effectLst/>
+                <a:latin typeface="Arial" panose="020B0604020202020204" pitchFamily="34" charset="0"/>
+                <a:cs typeface="Arial" panose="020B0604020202020204" pitchFamily="34" charset="0"/>
+              </a:rPr>
+              <a:t>[3] Andreas </a:t>
+            </a:r>
+            <a:r>
+              <a:rPr lang="de-DE" sz="1400" b="0" i="0" dirty="0" err="1">
+                <a:effectLst/>
+                <a:latin typeface="Arial" panose="020B0604020202020204" pitchFamily="34" charset="0"/>
+                <a:cs typeface="Arial" panose="020B0604020202020204" pitchFamily="34" charset="0"/>
+              </a:rPr>
+              <a:t>Daberkow</a:t>
+            </a:r>
+            <a:r>
+              <a:rPr lang="de-DE" sz="1400" b="0" i="0" dirty="0">
+                <a:effectLst/>
+                <a:latin typeface="Arial" panose="020B0604020202020204" pitchFamily="34" charset="0"/>
+                <a:cs typeface="Arial" panose="020B0604020202020204" pitchFamily="34" charset="0"/>
+              </a:rPr>
+              <a:t>, “Prozessgestaltung in der Produktentstehung.”</a:t>
+            </a:r>
+            <a:br>
+              <a:rPr lang="de-DE" sz="1400" dirty="0">
+                <a:latin typeface="Arial" panose="020B0604020202020204" pitchFamily="34" charset="0"/>
+                <a:cs typeface="Arial" panose="020B0604020202020204" pitchFamily="34" charset="0"/>
+              </a:rPr>
+            </a:br>
+            <a:r>
+              <a:rPr lang="de-DE" sz="1400" b="0" i="0" dirty="0">
+                <a:effectLst/>
+                <a:latin typeface="Arial" panose="020B0604020202020204" pitchFamily="34" charset="0"/>
+                <a:cs typeface="Arial" panose="020B0604020202020204" pitchFamily="34" charset="0"/>
+              </a:rPr>
+              <a:t>[4] H. Wolf and W. Bleek, Agile Softwareentwicklung: Werte, Konzepte und Methoden. </a:t>
+            </a:r>
+            <a:r>
+              <a:rPr lang="de-DE" sz="1400" b="0" i="0" dirty="0" err="1">
+                <a:effectLst/>
+                <a:latin typeface="Arial" panose="020B0604020202020204" pitchFamily="34" charset="0"/>
+                <a:cs typeface="Arial" panose="020B0604020202020204" pitchFamily="34" charset="0"/>
+              </a:rPr>
+              <a:t>dpunkt.verlag</a:t>
+            </a:r>
+            <a:r>
+              <a:rPr lang="de-DE" sz="1400" b="0" i="0" dirty="0">
+                <a:effectLst/>
+                <a:latin typeface="Arial" panose="020B0604020202020204" pitchFamily="34" charset="0"/>
+                <a:cs typeface="Arial" panose="020B0604020202020204" pitchFamily="34" charset="0"/>
+              </a:rPr>
+              <a:t>, 2011.</a:t>
+            </a:r>
+            <a:br>
+              <a:rPr lang="de-DE" sz="1400" dirty="0">
+                <a:latin typeface="Arial" panose="020B0604020202020204" pitchFamily="34" charset="0"/>
+                <a:cs typeface="Arial" panose="020B0604020202020204" pitchFamily="34" charset="0"/>
+              </a:rPr>
+            </a:br>
+            <a:r>
+              <a:rPr lang="de-DE" sz="1400" b="0" i="0" dirty="0">
+                <a:effectLst/>
+                <a:latin typeface="Arial" panose="020B0604020202020204" pitchFamily="34" charset="0"/>
+                <a:cs typeface="Arial" panose="020B0604020202020204" pitchFamily="34" charset="0"/>
+              </a:rPr>
+              <a:t>[5] A. Alliance, “Agile 101.” https://www.agilealliance.org/agile101/. [Online</a:t>
+            </a:r>
+            <a:r>
+              <a:rPr lang="de-DE" sz="1400" b="0" i="0">
+                <a:effectLst/>
+                <a:latin typeface="Arial" panose="020B0604020202020204" pitchFamily="34" charset="0"/>
+                <a:cs typeface="Arial" panose="020B0604020202020204" pitchFamily="34" charset="0"/>
+              </a:rPr>
+              <a:t>; Stand 15.11.2022</a:t>
+            </a:r>
+            <a:r>
+              <a:rPr lang="de-DE" sz="1400" b="0" i="0" dirty="0">
+                <a:effectLst/>
+                <a:latin typeface="Arial" panose="020B0604020202020204" pitchFamily="34" charset="0"/>
+                <a:cs typeface="Arial" panose="020B0604020202020204" pitchFamily="34" charset="0"/>
+              </a:rPr>
+              <a:t>].</a:t>
+            </a:r>
+            <a:br>
+              <a:rPr lang="de-DE" dirty="0"/>
+            </a:br>
+            <a:endParaRPr lang="de-DE" dirty="0"/>
+          </a:p>
+        </p:txBody>
+      </p:sp>
+    </p:spTree>
+    <p:extLst>
+      <p:ext uri="{BB962C8B-B14F-4D97-AF65-F5344CB8AC3E}">
+        <p14:creationId xmlns:p14="http://schemas.microsoft.com/office/powerpoint/2010/main" val="2018495382"/>
       </p:ext>
     </p:extLst>
   </p:cSld>

</xml_diff>

<commit_message>
agile prinzipien zu präsi
</commit_message>
<xml_diff>
--- a/Agile_Softwareentwicklung_Automotive_PGPE.pptx
+++ b/Agile_Softwareentwicklung_Automotive_PGPE.pptx
@@ -9,15 +9,16 @@
     <p:sldMasterId id="2147483702" r:id="rId5"/>
   </p:sldMasterIdLst>
   <p:notesMasterIdLst>
-    <p:notesMasterId r:id="rId12"/>
+    <p:notesMasterId r:id="rId13"/>
   </p:notesMasterIdLst>
   <p:sldIdLst>
     <p:sldId id="281" r:id="rId6"/>
     <p:sldId id="282" r:id="rId7"/>
     <p:sldId id="283" r:id="rId8"/>
     <p:sldId id="284" r:id="rId9"/>
-    <p:sldId id="285" r:id="rId10"/>
-    <p:sldId id="286" r:id="rId11"/>
+    <p:sldId id="287" r:id="rId10"/>
+    <p:sldId id="285" r:id="rId11"/>
+    <p:sldId id="286" r:id="rId12"/>
   </p:sldIdLst>
   <p:sldSz cx="12192000" cy="6858000"/>
   <p:notesSz cx="6858000" cy="9144000"/>
@@ -2792,8 +2793,13 @@
         <a:p>
           <a:r>
             <a:rPr lang="de-DE" dirty="0"/>
-            <a:t>Agiler Prozessablauf an einem Beispiel</a:t>
+            <a:t>Agiler Prozessablauf an einem Beispiel im </a:t>
           </a:r>
+          <a:r>
+            <a:rPr lang="de-DE"/>
+            <a:t>Automotive Bereich</a:t>
+          </a:r>
+          <a:endParaRPr lang="de-DE" dirty="0"/>
         </a:p>
       </dgm:t>
     </dgm:pt>
@@ -3841,8 +3847,13 @@
           </a:pPr>
           <a:r>
             <a:rPr lang="de-DE" sz="2400" kern="1200" dirty="0"/>
-            <a:t>Agiler Prozessablauf an einem Beispiel</a:t>
+            <a:t>Agiler Prozessablauf an einem Beispiel im </a:t>
           </a:r>
+          <a:r>
+            <a:rPr lang="de-DE" sz="2400" kern="1200"/>
+            <a:t>Automotive Bereich</a:t>
+          </a:r>
+          <a:endParaRPr lang="de-DE" sz="2400" kern="1200" dirty="0"/>
         </a:p>
       </dsp:txBody>
       <dsp:txXfrm>
@@ -9765,7 +9776,7 @@
           <a:p>
             <a:fld id="{CF93AEB5-C303-4762-90A0-AF697EB357C4}" type="datetimeFigureOut">
               <a:rPr lang="de-DE" smtClean="0"/>
-              <a:t>18.11.2022</a:t>
+              <a:t>22.11.2022</a:t>
             </a:fld>
             <a:endParaRPr lang="de-DE"/>
           </a:p>
@@ -35089,7 +35100,7 @@
             <p:ph idx="13"/>
             <p:extLst>
               <p:ext uri="{D42A27DB-BD31-4B8C-83A1-F6EECF244321}">
-                <p14:modId xmlns:p14="http://schemas.microsoft.com/office/powerpoint/2010/main" val="4060755484"/>
+                <p14:modId xmlns:p14="http://schemas.microsoft.com/office/powerpoint/2010/main" val="2807418609"/>
               </p:ext>
             </p:extLst>
           </p:nvPr>
@@ -35684,6 +35695,261 @@
           <p:cNvPr id="3" name="Datumsplatzhalter 2">
             <a:extLst>
               <a:ext uri="{FF2B5EF4-FFF2-40B4-BE49-F238E27FC236}">
+                <a16:creationId xmlns:a16="http://schemas.microsoft.com/office/drawing/2014/main" id="{B6A1EFD9-7BB2-34B2-1E7D-82B04281AE32}"/>
+              </a:ext>
+            </a:extLst>
+          </p:cNvPr>
+          <p:cNvSpPr>
+            <a:spLocks noGrp="1"/>
+          </p:cNvSpPr>
+          <p:nvPr>
+            <p:ph type="dt" sz="half" idx="10"/>
+          </p:nvPr>
+        </p:nvSpPr>
+        <p:spPr/>
+        <p:txBody>
+          <a:bodyPr/>
+          <a:lstStyle/>
+          <a:p>
+            <a:r>
+              <a:rPr lang="de-DE"/>
+              <a:t>Campus Sontheim</a:t>
+            </a:r>
+            <a:endParaRPr lang="de-DE" dirty="0"/>
+          </a:p>
+        </p:txBody>
+      </p:sp>
+      <p:sp>
+        <p:nvSpPr>
+          <p:cNvPr id="5" name="Fußzeilenplatzhalter 4">
+            <a:extLst>
+              <a:ext uri="{FF2B5EF4-FFF2-40B4-BE49-F238E27FC236}">
+                <a16:creationId xmlns:a16="http://schemas.microsoft.com/office/drawing/2014/main" id="{2F746CF2-D7C4-848A-7A9D-1390C819BC8E}"/>
+              </a:ext>
+            </a:extLst>
+          </p:cNvPr>
+          <p:cNvSpPr>
+            <a:spLocks noGrp="1"/>
+          </p:cNvSpPr>
+          <p:nvPr>
+            <p:ph type="ftr" sz="quarter" idx="11"/>
+          </p:nvPr>
+        </p:nvSpPr>
+        <p:spPr/>
+        <p:txBody>
+          <a:bodyPr/>
+          <a:lstStyle/>
+          <a:p>
+            <a:r>
+              <a:rPr lang="de-DE"/>
+              <a:t>Sarah-Anne Teuner, Rico Steinke |  T1 / MAS |  WiSe 2022/23</a:t>
+            </a:r>
+            <a:endParaRPr lang="de-DE" dirty="0"/>
+          </a:p>
+        </p:txBody>
+      </p:sp>
+      <p:sp>
+        <p:nvSpPr>
+          <p:cNvPr id="6" name="Foliennummernplatzhalter 5">
+            <a:extLst>
+              <a:ext uri="{FF2B5EF4-FFF2-40B4-BE49-F238E27FC236}">
+                <a16:creationId xmlns:a16="http://schemas.microsoft.com/office/drawing/2014/main" id="{93ED1E61-4DD4-7A2A-082F-A37A9191D1ED}"/>
+              </a:ext>
+            </a:extLst>
+          </p:cNvPr>
+          <p:cNvSpPr>
+            <a:spLocks noGrp="1"/>
+          </p:cNvSpPr>
+          <p:nvPr>
+            <p:ph type="sldNum" sz="quarter" idx="12"/>
+          </p:nvPr>
+        </p:nvSpPr>
+        <p:spPr/>
+        <p:txBody>
+          <a:bodyPr/>
+          <a:lstStyle/>
+          <a:p>
+            <a:r>
+              <a:rPr lang="de-DE" dirty="0"/>
+              <a:t>[Agile Alliance, 2022]|  </a:t>
+            </a:r>
+            <a:fld id="{E6B5151A-17C4-4431-8407-112C0160A8B6}" type="slidenum">
+              <a:rPr lang="de-DE" smtClean="0"/>
+              <a:pPr/>
+              <a:t>5</a:t>
+            </a:fld>
+            <a:endParaRPr lang="de-DE" dirty="0"/>
+          </a:p>
+        </p:txBody>
+      </p:sp>
+      <p:sp>
+        <p:nvSpPr>
+          <p:cNvPr id="8" name="Titel 7">
+            <a:extLst>
+              <a:ext uri="{FF2B5EF4-FFF2-40B4-BE49-F238E27FC236}">
+                <a16:creationId xmlns:a16="http://schemas.microsoft.com/office/drawing/2014/main" id="{5C292190-36E5-25C2-9B55-22FC172155B7}"/>
+              </a:ext>
+            </a:extLst>
+          </p:cNvPr>
+          <p:cNvSpPr>
+            <a:spLocks noGrp="1"/>
+          </p:cNvSpPr>
+          <p:nvPr>
+            <p:ph type="title"/>
+          </p:nvPr>
+        </p:nvSpPr>
+        <p:spPr/>
+        <p:txBody>
+          <a:bodyPr/>
+          <a:lstStyle/>
+          <a:p>
+            <a:r>
+              <a:rPr lang="de-DE" dirty="0"/>
+              <a:t>Einleitung Agile Softwareentwicklung</a:t>
+            </a:r>
+            <a:br>
+              <a:rPr lang="de-DE" dirty="0"/>
+            </a:br>
+            <a:r>
+              <a:rPr lang="de-DE" dirty="0"/>
+              <a:t>Agile </a:t>
+            </a:r>
+            <a:r>
+              <a:rPr lang="de-DE" dirty="0" err="1"/>
+              <a:t>Manifesto</a:t>
+            </a:r>
+            <a:endParaRPr lang="de-DE" dirty="0"/>
+          </a:p>
+        </p:txBody>
+      </p:sp>
+      <p:sp>
+        <p:nvSpPr>
+          <p:cNvPr id="9" name="Inhaltsplatzhalter 8">
+            <a:extLst>
+              <a:ext uri="{FF2B5EF4-FFF2-40B4-BE49-F238E27FC236}">
+                <a16:creationId xmlns:a16="http://schemas.microsoft.com/office/drawing/2014/main" id="{3D77CDA8-90E9-24AA-4242-E57B9037AE42}"/>
+              </a:ext>
+            </a:extLst>
+          </p:cNvPr>
+          <p:cNvSpPr>
+            <a:spLocks noGrp="1"/>
+          </p:cNvSpPr>
+          <p:nvPr>
+            <p:ph idx="13"/>
+          </p:nvPr>
+        </p:nvSpPr>
+        <p:spPr/>
+        <p:txBody>
+          <a:bodyPr/>
+          <a:lstStyle/>
+          <a:p>
+            <a:pPr marL="457200" indent="-457200">
+              <a:lnSpc>
+                <a:spcPct val="150000"/>
+              </a:lnSpc>
+              <a:buFont typeface="+mj-lt"/>
+              <a:buAutoNum type="arabicParenBoth"/>
+            </a:pPr>
+            <a:r>
+              <a:rPr lang="de-DE" sz="2800" b="1" dirty="0"/>
+              <a:t>Individuen und Interaktionen </a:t>
+            </a:r>
+            <a:r>
+              <a:rPr lang="de-DE" sz="2800" dirty="0"/>
+              <a:t>vor Prozessen und Werkzeugen</a:t>
+            </a:r>
+          </a:p>
+          <a:p>
+            <a:pPr marL="457200" indent="-457200">
+              <a:lnSpc>
+                <a:spcPct val="150000"/>
+              </a:lnSpc>
+              <a:buFont typeface="+mj-lt"/>
+              <a:buAutoNum type="arabicParenBoth"/>
+            </a:pPr>
+            <a:r>
+              <a:rPr lang="de-DE" sz="2800" b="1" dirty="0"/>
+              <a:t>Funktionierende Software </a:t>
+            </a:r>
+            <a:r>
+              <a:rPr lang="de-DE" sz="2800" dirty="0"/>
+              <a:t>über umfassende Dokumentation</a:t>
+            </a:r>
+          </a:p>
+          <a:p>
+            <a:pPr marL="457200" indent="-457200">
+              <a:lnSpc>
+                <a:spcPct val="150000"/>
+              </a:lnSpc>
+              <a:buFont typeface="+mj-lt"/>
+              <a:buAutoNum type="arabicParenBoth"/>
+            </a:pPr>
+            <a:r>
+              <a:rPr lang="de-DE" sz="2800" b="1" dirty="0"/>
+              <a:t>Zusammenarbeit mit dem Kunden </a:t>
+            </a:r>
+            <a:r>
+              <a:rPr lang="de-DE" sz="2800" dirty="0"/>
+              <a:t>statt Vertragsverhandlungen</a:t>
+            </a:r>
+          </a:p>
+          <a:p>
+            <a:pPr marL="457200" indent="-457200">
+              <a:lnSpc>
+                <a:spcPct val="150000"/>
+              </a:lnSpc>
+              <a:buFont typeface="+mj-lt"/>
+              <a:buAutoNum type="arabicParenBoth"/>
+            </a:pPr>
+            <a:r>
+              <a:rPr lang="de-DE" sz="2800" b="1" dirty="0"/>
+              <a:t>Reagieren auf Veränderungen </a:t>
+            </a:r>
+            <a:r>
+              <a:rPr lang="de-DE" sz="2800" dirty="0"/>
+              <a:t>statt Befolgen eines Plans</a:t>
+            </a:r>
+          </a:p>
+          <a:p>
+            <a:endParaRPr lang="de-DE" dirty="0"/>
+          </a:p>
+        </p:txBody>
+      </p:sp>
+    </p:spTree>
+    <p:extLst>
+      <p:ext uri="{BB962C8B-B14F-4D97-AF65-F5344CB8AC3E}">
+        <p14:creationId xmlns:p14="http://schemas.microsoft.com/office/powerpoint/2010/main" val="1047183562"/>
+      </p:ext>
+    </p:extLst>
+  </p:cSld>
+  <p:clrMapOvr>
+    <a:masterClrMapping/>
+  </p:clrMapOvr>
+</p:sld>
+</file>
+
+<file path=ppt/slides/slide6.xml><?xml version="1.0" encoding="utf-8"?>
+<p:sld xmlns:a="http://schemas.openxmlformats.org/drawingml/2006/main" xmlns:r="http://schemas.openxmlformats.org/officeDocument/2006/relationships" xmlns:p="http://schemas.openxmlformats.org/presentationml/2006/main">
+  <p:cSld>
+    <p:spTree>
+      <p:nvGrpSpPr>
+        <p:cNvPr id="1" name=""/>
+        <p:cNvGrpSpPr/>
+        <p:nvPr/>
+      </p:nvGrpSpPr>
+      <p:grpSpPr>
+        <a:xfrm>
+          <a:off x="0" y="0"/>
+          <a:ext cx="0" cy="0"/>
+          <a:chOff x="0" y="0"/>
+          <a:chExt cx="0" cy="0"/>
+        </a:xfrm>
+      </p:grpSpPr>
+      <p:sp>
+        <p:nvSpPr>
+          <p:cNvPr id="3" name="Datumsplatzhalter 2">
+            <a:extLst>
+              <a:ext uri="{FF2B5EF4-FFF2-40B4-BE49-F238E27FC236}">
                 <a16:creationId xmlns:a16="http://schemas.microsoft.com/office/drawing/2014/main" id="{FE2618A7-246F-BE95-0BA0-D89E868BB6CD}"/>
               </a:ext>
             </a:extLst>
@@ -35765,7 +36031,7 @@
             <a:fld id="{E6B5151A-17C4-4431-8407-112C0160A8B6}" type="slidenum">
               <a:rPr lang="de-DE" smtClean="0"/>
               <a:pPr/>
-              <a:t>5</a:t>
+              <a:t>6</a:t>
             </a:fld>
             <a:endParaRPr lang="de-DE" dirty="0"/>
           </a:p>
@@ -35845,7 +36111,7 @@
 </p:sld>
 </file>
 
-<file path=ppt/slides/slide6.xml><?xml version="1.0" encoding="utf-8"?>
+<file path=ppt/slides/slide7.xml><?xml version="1.0" encoding="utf-8"?>
 <p:sld xmlns:a="http://schemas.openxmlformats.org/drawingml/2006/main" xmlns:r="http://schemas.openxmlformats.org/officeDocument/2006/relationships" xmlns:p="http://schemas.openxmlformats.org/presentationml/2006/main">
   <p:cSld>
     <p:spTree>
@@ -35948,7 +36214,7 @@
             <a:fld id="{E6B5151A-17C4-4431-8407-112C0160A8B6}" type="slidenum">
               <a:rPr lang="de-DE" smtClean="0"/>
               <a:pPr/>
-              <a:t>6</a:t>
+              <a:t>7</a:t>
             </a:fld>
             <a:endParaRPr lang="de-DE" dirty="0"/>
           </a:p>

</xml_diff>

<commit_message>
anpassung prosa; zusammenführen präsi
</commit_message>
<xml_diff>
--- a/Agile_Softwareentwicklung_Automotive_PGPE.pptx
+++ b/Agile_Softwareentwicklung_Automotive_PGPE.pptx
@@ -9,7 +9,7 @@
     <p:sldMasterId id="2147483702" r:id="rId5"/>
   </p:sldMasterIdLst>
   <p:notesMasterIdLst>
-    <p:notesMasterId r:id="rId13"/>
+    <p:notesMasterId r:id="rId23"/>
   </p:notesMasterIdLst>
   <p:sldIdLst>
     <p:sldId id="281" r:id="rId6"/>
@@ -17,8 +17,18 @@
     <p:sldId id="283" r:id="rId8"/>
     <p:sldId id="284" r:id="rId9"/>
     <p:sldId id="287" r:id="rId10"/>
-    <p:sldId id="285" r:id="rId11"/>
-    <p:sldId id="286" r:id="rId12"/>
+    <p:sldId id="290" r:id="rId11"/>
+    <p:sldId id="295" r:id="rId12"/>
+    <p:sldId id="288" r:id="rId13"/>
+    <p:sldId id="289" r:id="rId14"/>
+    <p:sldId id="291" r:id="rId15"/>
+    <p:sldId id="292" r:id="rId16"/>
+    <p:sldId id="293" r:id="rId17"/>
+    <p:sldId id="294" r:id="rId18"/>
+    <p:sldId id="296" r:id="rId19"/>
+    <p:sldId id="297" r:id="rId20"/>
+    <p:sldId id="285" r:id="rId21"/>
+    <p:sldId id="286" r:id="rId22"/>
   </p:sldIdLst>
   <p:sldSz cx="12192000" cy="6858000"/>
   <p:notesSz cx="6858000" cy="9144000"/>
@@ -34807,38 +34817,25 @@
           <a:lstStyle/>
           <a:p>
             <a:r>
-              <a:rPr lang="de-DE" sz="4800" dirty="0"/>
+              <a:rPr lang="de-DE" sz="4400" dirty="0"/>
               <a:t>Agile </a:t>
             </a:r>
             <a:r>
-              <a:rPr lang="de-DE" sz="4800" dirty="0" err="1"/>
+              <a:rPr lang="de-DE" sz="4400" dirty="0" err="1"/>
               <a:t>software</a:t>
             </a:r>
             <a:r>
-              <a:rPr lang="de-DE" sz="4800" dirty="0"/>
+              <a:rPr lang="de-DE" sz="4400" dirty="0"/>
               <a:t> </a:t>
             </a:r>
             <a:r>
-              <a:rPr lang="de-DE" sz="4800" dirty="0" err="1"/>
-              <a:t>entwicklung</a:t>
+              <a:rPr lang="de-DE" sz="4400" dirty="0" err="1"/>
+              <a:t>entwicklunG</a:t>
             </a:r>
             <a:r>
-              <a:rPr lang="de-DE" sz="4800" dirty="0"/>
-              <a:t> im </a:t>
+              <a:rPr lang="de-DE" sz="4400" dirty="0"/>
+              <a:t> für automobile Anwendungen </a:t>
             </a:r>
-            <a:r>
-              <a:rPr lang="de-DE" sz="4800" dirty="0" err="1"/>
-              <a:t>automotive</a:t>
-            </a:r>
-            <a:r>
-              <a:rPr lang="de-DE" sz="4800" dirty="0"/>
-              <a:t> </a:t>
-            </a:r>
-            <a:r>
-              <a:rPr lang="de-DE" sz="4800" dirty="0" err="1"/>
-              <a:t>bereich</a:t>
-            </a:r>
-            <a:endParaRPr lang="de-DE" sz="4800" dirty="0"/>
           </a:p>
         </p:txBody>
       </p:sp>
@@ -34938,6 +34935,2460 @@
     <p:extLst>
       <p:ext uri="{BB962C8B-B14F-4D97-AF65-F5344CB8AC3E}">
         <p14:creationId xmlns:p14="http://schemas.microsoft.com/office/powerpoint/2010/main" val="590607356"/>
+      </p:ext>
+    </p:extLst>
+  </p:cSld>
+  <p:clrMapOvr>
+    <a:masterClrMapping/>
+  </p:clrMapOvr>
+</p:sld>
+</file>
+
+<file path=ppt/slides/slide10.xml><?xml version="1.0" encoding="utf-8"?>
+<p:sld xmlns:a="http://schemas.openxmlformats.org/drawingml/2006/main" xmlns:r="http://schemas.openxmlformats.org/officeDocument/2006/relationships" xmlns:p="http://schemas.openxmlformats.org/presentationml/2006/main">
+  <p:cSld>
+    <p:spTree>
+      <p:nvGrpSpPr>
+        <p:cNvPr id="1" name=""/>
+        <p:cNvGrpSpPr/>
+        <p:nvPr/>
+      </p:nvGrpSpPr>
+      <p:grpSpPr>
+        <a:xfrm>
+          <a:off x="0" y="0"/>
+          <a:ext cx="0" cy="0"/>
+          <a:chOff x="0" y="0"/>
+          <a:chExt cx="0" cy="0"/>
+        </a:xfrm>
+      </p:grpSpPr>
+      <p:sp>
+        <p:nvSpPr>
+          <p:cNvPr id="2" name="Datumsplatzhalter 1">
+            <a:extLst>
+              <a:ext uri="{FF2B5EF4-FFF2-40B4-BE49-F238E27FC236}">
+                <a16:creationId xmlns:a16="http://schemas.microsoft.com/office/drawing/2014/main" id="{BB1D788A-C68F-79F5-C9F2-447312A7CBD9}"/>
+              </a:ext>
+            </a:extLst>
+          </p:cNvPr>
+          <p:cNvSpPr>
+            <a:spLocks noGrp="1"/>
+          </p:cNvSpPr>
+          <p:nvPr>
+            <p:ph type="dt" sz="half" idx="10"/>
+          </p:nvPr>
+        </p:nvSpPr>
+        <p:spPr/>
+        <p:txBody>
+          <a:bodyPr/>
+          <a:lstStyle/>
+          <a:p>
+            <a:r>
+              <a:rPr lang="de-DE"/>
+              <a:t>Campus Sontheim</a:t>
+            </a:r>
+            <a:endParaRPr lang="de-DE" dirty="0"/>
+          </a:p>
+        </p:txBody>
+      </p:sp>
+      <p:sp>
+        <p:nvSpPr>
+          <p:cNvPr id="3" name="Fußzeilenplatzhalter 2">
+            <a:extLst>
+              <a:ext uri="{FF2B5EF4-FFF2-40B4-BE49-F238E27FC236}">
+                <a16:creationId xmlns:a16="http://schemas.microsoft.com/office/drawing/2014/main" id="{EFFA12D6-C5C2-21E1-C6C9-FA2241432F1D}"/>
+              </a:ext>
+            </a:extLst>
+          </p:cNvPr>
+          <p:cNvSpPr>
+            <a:spLocks noGrp="1"/>
+          </p:cNvSpPr>
+          <p:nvPr>
+            <p:ph type="ftr" sz="quarter" idx="11"/>
+          </p:nvPr>
+        </p:nvSpPr>
+        <p:spPr/>
+        <p:txBody>
+          <a:bodyPr/>
+          <a:lstStyle/>
+          <a:p>
+            <a:r>
+              <a:rPr lang="de-DE"/>
+              <a:t>Sarah-Anne Teuner, Rico Steinke |  T1 / MAS |  WiSe 2022/23</a:t>
+            </a:r>
+            <a:endParaRPr lang="de-DE" dirty="0"/>
+          </a:p>
+        </p:txBody>
+      </p:sp>
+      <p:sp>
+        <p:nvSpPr>
+          <p:cNvPr id="4" name="Foliennummernplatzhalter 3">
+            <a:extLst>
+              <a:ext uri="{FF2B5EF4-FFF2-40B4-BE49-F238E27FC236}">
+                <a16:creationId xmlns:a16="http://schemas.microsoft.com/office/drawing/2014/main" id="{8A245F5A-8BAE-F0F4-482C-831DAC8ECDE9}"/>
+              </a:ext>
+            </a:extLst>
+          </p:cNvPr>
+          <p:cNvSpPr>
+            <a:spLocks noGrp="1"/>
+          </p:cNvSpPr>
+          <p:nvPr>
+            <p:ph type="sldNum" sz="quarter" idx="12"/>
+          </p:nvPr>
+        </p:nvSpPr>
+        <p:spPr/>
+        <p:txBody>
+          <a:bodyPr/>
+          <a:lstStyle/>
+          <a:p>
+            <a:r>
+              <a:rPr lang="de-DE"/>
+              <a:t>|  </a:t>
+            </a:r>
+            <a:fld id="{E6B5151A-17C4-4431-8407-112C0160A8B6}" type="slidenum">
+              <a:rPr lang="de-DE" smtClean="0"/>
+              <a:pPr/>
+              <a:t>10</a:t>
+            </a:fld>
+            <a:endParaRPr lang="de-DE" dirty="0"/>
+          </a:p>
+        </p:txBody>
+      </p:sp>
+      <p:sp>
+        <p:nvSpPr>
+          <p:cNvPr id="5" name="Titel 4">
+            <a:extLst>
+              <a:ext uri="{FF2B5EF4-FFF2-40B4-BE49-F238E27FC236}">
+                <a16:creationId xmlns:a16="http://schemas.microsoft.com/office/drawing/2014/main" id="{5B8A2D87-E9F2-0CAD-601F-F24CF4BBDB53}"/>
+              </a:ext>
+            </a:extLst>
+          </p:cNvPr>
+          <p:cNvSpPr>
+            <a:spLocks noGrp="1"/>
+          </p:cNvSpPr>
+          <p:nvPr>
+            <p:ph type="title"/>
+          </p:nvPr>
+        </p:nvSpPr>
+        <p:spPr/>
+        <p:txBody>
+          <a:bodyPr/>
+          <a:lstStyle/>
+          <a:p>
+            <a:r>
+              <a:rPr lang="de-DE" dirty="0"/>
+              <a:t>Agile Softwareentwicklung an einem Beispiel im Automotive Bereich</a:t>
+            </a:r>
+            <a:endParaRPr lang="LID4096" dirty="0"/>
+          </a:p>
+        </p:txBody>
+      </p:sp>
+      <p:sp>
+        <p:nvSpPr>
+          <p:cNvPr id="6" name="Inhaltsplatzhalter 5">
+            <a:extLst>
+              <a:ext uri="{FF2B5EF4-FFF2-40B4-BE49-F238E27FC236}">
+                <a16:creationId xmlns:a16="http://schemas.microsoft.com/office/drawing/2014/main" id="{4D0C46E6-5705-FEE9-ECA0-BDD549783C5C}"/>
+              </a:ext>
+            </a:extLst>
+          </p:cNvPr>
+          <p:cNvSpPr>
+            <a:spLocks noGrp="1"/>
+          </p:cNvSpPr>
+          <p:nvPr>
+            <p:ph idx="13"/>
+          </p:nvPr>
+        </p:nvSpPr>
+        <p:spPr/>
+        <p:txBody>
+          <a:bodyPr/>
+          <a:lstStyle/>
+          <a:p>
+            <a:r>
+              <a:rPr lang="de-DE" dirty="0"/>
+              <a:t>Entwicklung von Bremssystemen / Bestimmte Funktion?</a:t>
+            </a:r>
+          </a:p>
+          <a:p>
+            <a:r>
+              <a:rPr lang="de-DE" dirty="0"/>
+              <a:t>Welche besonderen Anforderungen habe ich denn in der SW-Entwicklung im Vergleich zur Elektrik/Elektronik Entwicklung?</a:t>
+            </a:r>
+          </a:p>
+          <a:p>
+            <a:pPr marL="342900" indent="-342900">
+              <a:buFontTx/>
+              <a:buChar char="-"/>
+            </a:pPr>
+            <a:r>
+              <a:rPr lang="de-DE" dirty="0"/>
+              <a:t>Hohe Flexibilität</a:t>
+            </a:r>
+          </a:p>
+          <a:p>
+            <a:pPr marL="342900" indent="-342900">
+              <a:buFontTx/>
+              <a:buChar char="-"/>
+            </a:pPr>
+            <a:r>
+              <a:rPr lang="de-DE" dirty="0"/>
+              <a:t>Hohes Maß an Änderungsmanagement</a:t>
+            </a:r>
+          </a:p>
+          <a:p>
+            <a:pPr marL="342900" indent="-342900">
+              <a:buFontTx/>
+              <a:buChar char="-"/>
+            </a:pPr>
+            <a:r>
+              <a:rPr lang="de-DE" dirty="0"/>
+              <a:t>SW-Architektur und ihre Untereinheiten</a:t>
+            </a:r>
+          </a:p>
+          <a:p>
+            <a:pPr marL="342900" indent="-342900">
+              <a:buFontTx/>
+              <a:buChar char="-"/>
+            </a:pPr>
+            <a:r>
+              <a:rPr lang="de-DE" dirty="0"/>
+              <a:t>Dokumentation</a:t>
+            </a:r>
+          </a:p>
+          <a:p>
+            <a:pPr marL="342900" indent="-342900">
+              <a:buFontTx/>
+              <a:buChar char="-"/>
+            </a:pPr>
+            <a:r>
+              <a:rPr lang="de-DE" dirty="0"/>
+              <a:t>Einheitlicher Stil/ Nachvollziehbarkeit/Qualitätssicherung </a:t>
+            </a:r>
+          </a:p>
+        </p:txBody>
+      </p:sp>
+    </p:spTree>
+    <p:extLst>
+      <p:ext uri="{BB962C8B-B14F-4D97-AF65-F5344CB8AC3E}">
+        <p14:creationId xmlns:p14="http://schemas.microsoft.com/office/powerpoint/2010/main" val="1277455109"/>
+      </p:ext>
+    </p:extLst>
+  </p:cSld>
+  <p:clrMapOvr>
+    <a:masterClrMapping/>
+  </p:clrMapOvr>
+</p:sld>
+</file>
+
+<file path=ppt/slides/slide11.xml><?xml version="1.0" encoding="utf-8"?>
+<p:sld xmlns:a="http://schemas.openxmlformats.org/drawingml/2006/main" xmlns:r="http://schemas.openxmlformats.org/officeDocument/2006/relationships" xmlns:p="http://schemas.openxmlformats.org/presentationml/2006/main">
+  <p:cSld>
+    <p:spTree>
+      <p:nvGrpSpPr>
+        <p:cNvPr id="1" name=""/>
+        <p:cNvGrpSpPr/>
+        <p:nvPr/>
+      </p:nvGrpSpPr>
+      <p:grpSpPr>
+        <a:xfrm>
+          <a:off x="0" y="0"/>
+          <a:ext cx="0" cy="0"/>
+          <a:chOff x="0" y="0"/>
+          <a:chExt cx="0" cy="0"/>
+        </a:xfrm>
+      </p:grpSpPr>
+      <p:sp>
+        <p:nvSpPr>
+          <p:cNvPr id="2" name="Datumsplatzhalter 1">
+            <a:extLst>
+              <a:ext uri="{FF2B5EF4-FFF2-40B4-BE49-F238E27FC236}">
+                <a16:creationId xmlns:a16="http://schemas.microsoft.com/office/drawing/2014/main" id="{BB1D788A-C68F-79F5-C9F2-447312A7CBD9}"/>
+              </a:ext>
+            </a:extLst>
+          </p:cNvPr>
+          <p:cNvSpPr>
+            <a:spLocks noGrp="1"/>
+          </p:cNvSpPr>
+          <p:nvPr>
+            <p:ph type="dt" sz="half" idx="10"/>
+          </p:nvPr>
+        </p:nvSpPr>
+        <p:spPr/>
+        <p:txBody>
+          <a:bodyPr/>
+          <a:lstStyle/>
+          <a:p>
+            <a:r>
+              <a:rPr lang="de-DE"/>
+              <a:t>Campus Sontheim</a:t>
+            </a:r>
+            <a:endParaRPr lang="de-DE" dirty="0"/>
+          </a:p>
+        </p:txBody>
+      </p:sp>
+      <p:sp>
+        <p:nvSpPr>
+          <p:cNvPr id="3" name="Fußzeilenplatzhalter 2">
+            <a:extLst>
+              <a:ext uri="{FF2B5EF4-FFF2-40B4-BE49-F238E27FC236}">
+                <a16:creationId xmlns:a16="http://schemas.microsoft.com/office/drawing/2014/main" id="{EFFA12D6-C5C2-21E1-C6C9-FA2241432F1D}"/>
+              </a:ext>
+            </a:extLst>
+          </p:cNvPr>
+          <p:cNvSpPr>
+            <a:spLocks noGrp="1"/>
+          </p:cNvSpPr>
+          <p:nvPr>
+            <p:ph type="ftr" sz="quarter" idx="11"/>
+          </p:nvPr>
+        </p:nvSpPr>
+        <p:spPr/>
+        <p:txBody>
+          <a:bodyPr/>
+          <a:lstStyle/>
+          <a:p>
+            <a:r>
+              <a:rPr lang="de-DE"/>
+              <a:t>Sarah-Anne Teuner, Rico Steinke |  T1 / MAS |  WiSe 2022/23</a:t>
+            </a:r>
+            <a:endParaRPr lang="de-DE" dirty="0"/>
+          </a:p>
+        </p:txBody>
+      </p:sp>
+      <p:sp>
+        <p:nvSpPr>
+          <p:cNvPr id="4" name="Foliennummernplatzhalter 3">
+            <a:extLst>
+              <a:ext uri="{FF2B5EF4-FFF2-40B4-BE49-F238E27FC236}">
+                <a16:creationId xmlns:a16="http://schemas.microsoft.com/office/drawing/2014/main" id="{8A245F5A-8BAE-F0F4-482C-831DAC8ECDE9}"/>
+              </a:ext>
+            </a:extLst>
+          </p:cNvPr>
+          <p:cNvSpPr>
+            <a:spLocks noGrp="1"/>
+          </p:cNvSpPr>
+          <p:nvPr>
+            <p:ph type="sldNum" sz="quarter" idx="12"/>
+          </p:nvPr>
+        </p:nvSpPr>
+        <p:spPr/>
+        <p:txBody>
+          <a:bodyPr/>
+          <a:lstStyle/>
+          <a:p>
+            <a:r>
+              <a:rPr lang="de-DE"/>
+              <a:t>|  </a:t>
+            </a:r>
+            <a:fld id="{E6B5151A-17C4-4431-8407-112C0160A8B6}" type="slidenum">
+              <a:rPr lang="de-DE" smtClean="0"/>
+              <a:pPr/>
+              <a:t>11</a:t>
+            </a:fld>
+            <a:endParaRPr lang="de-DE" dirty="0"/>
+          </a:p>
+        </p:txBody>
+      </p:sp>
+      <p:sp>
+        <p:nvSpPr>
+          <p:cNvPr id="5" name="Titel 4">
+            <a:extLst>
+              <a:ext uri="{FF2B5EF4-FFF2-40B4-BE49-F238E27FC236}">
+                <a16:creationId xmlns:a16="http://schemas.microsoft.com/office/drawing/2014/main" id="{5B8A2D87-E9F2-0CAD-601F-F24CF4BBDB53}"/>
+              </a:ext>
+            </a:extLst>
+          </p:cNvPr>
+          <p:cNvSpPr>
+            <a:spLocks noGrp="1"/>
+          </p:cNvSpPr>
+          <p:nvPr>
+            <p:ph type="title"/>
+          </p:nvPr>
+        </p:nvSpPr>
+        <p:spPr/>
+        <p:txBody>
+          <a:bodyPr/>
+          <a:lstStyle/>
+          <a:p>
+            <a:r>
+              <a:rPr lang="de-DE" dirty="0"/>
+              <a:t>Agile Softwareentwicklung an einem Beispiel</a:t>
+            </a:r>
+            <a:endParaRPr lang="LID4096" dirty="0"/>
+          </a:p>
+        </p:txBody>
+      </p:sp>
+      <p:sp>
+        <p:nvSpPr>
+          <p:cNvPr id="6" name="Inhaltsplatzhalter 5">
+            <a:extLst>
+              <a:ext uri="{FF2B5EF4-FFF2-40B4-BE49-F238E27FC236}">
+                <a16:creationId xmlns:a16="http://schemas.microsoft.com/office/drawing/2014/main" id="{4D0C46E6-5705-FEE9-ECA0-BDD549783C5C}"/>
+              </a:ext>
+            </a:extLst>
+          </p:cNvPr>
+          <p:cNvSpPr>
+            <a:spLocks noGrp="1"/>
+          </p:cNvSpPr>
+          <p:nvPr>
+            <p:ph idx="13"/>
+          </p:nvPr>
+        </p:nvSpPr>
+        <p:spPr/>
+        <p:txBody>
+          <a:bodyPr/>
+          <a:lstStyle/>
+          <a:p>
+            <a:r>
+              <a:rPr lang="de-DE" dirty="0"/>
+              <a:t>Anpassung der Organisationseinheit an agile SW Entwicklungsprozesse</a:t>
+            </a:r>
+          </a:p>
+          <a:p>
+            <a:r>
+              <a:rPr lang="de-DE" dirty="0"/>
+              <a:t>Wie sieht das Gerüst aus? Welche Schnittstellen habe ich?</a:t>
+            </a:r>
+          </a:p>
+          <a:p>
+            <a:r>
+              <a:rPr lang="de-DE" dirty="0"/>
+              <a:t>Bsp. Aus der Praxis (Bosch, Porsche) </a:t>
+            </a:r>
+            <a:r>
+              <a:rPr lang="de-DE" dirty="0" err="1"/>
+              <a:t>SAFe</a:t>
+            </a:r>
+            <a:r>
+              <a:rPr lang="de-DE" dirty="0"/>
+              <a:t> </a:t>
+            </a:r>
+            <a:r>
+              <a:rPr lang="de-DE" dirty="0" err="1"/>
+              <a:t>Scaled</a:t>
+            </a:r>
+            <a:r>
+              <a:rPr lang="de-DE" dirty="0"/>
+              <a:t> Agile Framework (beliebt bei großen Projekten)</a:t>
+            </a:r>
+          </a:p>
+          <a:p>
+            <a:pPr marL="342900" indent="-342900">
+              <a:buFontTx/>
+              <a:buChar char="-"/>
+            </a:pPr>
+            <a:r>
+              <a:rPr lang="de-DE" dirty="0"/>
+              <a:t>Visualisierung der Prozesse/Schnittstellen/zeitlichen Abläufe</a:t>
+            </a:r>
+          </a:p>
+          <a:p>
+            <a:pPr marL="342900" indent="-342900">
+              <a:buFontTx/>
+              <a:buChar char="-"/>
+            </a:pPr>
+            <a:r>
+              <a:rPr lang="de-DE" dirty="0"/>
+              <a:t>Sowohl auf Management wie auch auf Entwicklerebene</a:t>
+            </a:r>
+          </a:p>
+          <a:p>
+            <a:pPr marL="342900" indent="-342900">
+              <a:buFontTx/>
+              <a:buChar char="-"/>
+            </a:pPr>
+            <a:r>
+              <a:rPr lang="de-DE" dirty="0"/>
+              <a:t>Framework liefert ein Set für </a:t>
+            </a:r>
+            <a:r>
+              <a:rPr lang="de-DE" dirty="0" err="1"/>
+              <a:t>Organisations</a:t>
+            </a:r>
+            <a:r>
+              <a:rPr lang="de-DE" dirty="0"/>
+              <a:t> und Workflow Patterns</a:t>
+            </a:r>
+          </a:p>
+          <a:p>
+            <a:pPr marL="342900" indent="-342900">
+              <a:buFontTx/>
+              <a:buChar char="-"/>
+            </a:pPr>
+            <a:r>
+              <a:rPr lang="de-DE" dirty="0"/>
+              <a:t>Wie läuft dann beispielhaft die Entwicklung einer SW-Funktion ab? (Beispiel Bremssysteme) Anforderung</a:t>
+            </a:r>
+            <a:r>
+              <a:rPr lang="de-DE" dirty="0">
+                <a:sym typeface="Wingdings" panose="05000000000000000000" pitchFamily="2" charset="2"/>
+              </a:rPr>
+              <a:t> Planung </a:t>
+            </a:r>
+            <a:r>
+              <a:rPr lang="de-DE" dirty="0" err="1">
+                <a:sym typeface="Wingdings" panose="05000000000000000000" pitchFamily="2" charset="2"/>
+              </a:rPr>
+              <a:t>UmsetzungDokumentationFreigabe</a:t>
+            </a:r>
+            <a:r>
+              <a:rPr lang="de-DE" dirty="0">
+                <a:sym typeface="Wingdings" panose="05000000000000000000" pitchFamily="2" charset="2"/>
+              </a:rPr>
+              <a:t> im </a:t>
+            </a:r>
+            <a:r>
+              <a:rPr lang="de-DE" dirty="0" err="1">
+                <a:sym typeface="Wingdings" panose="05000000000000000000" pitchFamily="2" charset="2"/>
+              </a:rPr>
+              <a:t>SAFe</a:t>
+            </a:r>
+            <a:endParaRPr lang="de-DE" dirty="0"/>
+          </a:p>
+        </p:txBody>
+      </p:sp>
+    </p:spTree>
+    <p:extLst>
+      <p:ext uri="{BB962C8B-B14F-4D97-AF65-F5344CB8AC3E}">
+        <p14:creationId xmlns:p14="http://schemas.microsoft.com/office/powerpoint/2010/main" val="4086636583"/>
+      </p:ext>
+    </p:extLst>
+  </p:cSld>
+  <p:clrMapOvr>
+    <a:masterClrMapping/>
+  </p:clrMapOvr>
+</p:sld>
+</file>
+
+<file path=ppt/slides/slide12.xml><?xml version="1.0" encoding="utf-8"?>
+<p:sld xmlns:a="http://schemas.openxmlformats.org/drawingml/2006/main" xmlns:r="http://schemas.openxmlformats.org/officeDocument/2006/relationships" xmlns:p="http://schemas.openxmlformats.org/presentationml/2006/main">
+  <p:cSld>
+    <p:spTree>
+      <p:nvGrpSpPr>
+        <p:cNvPr id="1" name=""/>
+        <p:cNvGrpSpPr/>
+        <p:nvPr/>
+      </p:nvGrpSpPr>
+      <p:grpSpPr>
+        <a:xfrm>
+          <a:off x="0" y="0"/>
+          <a:ext cx="0" cy="0"/>
+          <a:chOff x="0" y="0"/>
+          <a:chExt cx="0" cy="0"/>
+        </a:xfrm>
+      </p:grpSpPr>
+      <p:sp>
+        <p:nvSpPr>
+          <p:cNvPr id="2" name="Datumsplatzhalter 1">
+            <a:extLst>
+              <a:ext uri="{FF2B5EF4-FFF2-40B4-BE49-F238E27FC236}">
+                <a16:creationId xmlns:a16="http://schemas.microsoft.com/office/drawing/2014/main" id="{BB1D788A-C68F-79F5-C9F2-447312A7CBD9}"/>
+              </a:ext>
+            </a:extLst>
+          </p:cNvPr>
+          <p:cNvSpPr>
+            <a:spLocks noGrp="1"/>
+          </p:cNvSpPr>
+          <p:nvPr>
+            <p:ph type="dt" sz="half" idx="10"/>
+          </p:nvPr>
+        </p:nvSpPr>
+        <p:spPr/>
+        <p:txBody>
+          <a:bodyPr/>
+          <a:lstStyle/>
+          <a:p>
+            <a:r>
+              <a:rPr lang="de-DE"/>
+              <a:t>Campus Sontheim</a:t>
+            </a:r>
+            <a:endParaRPr lang="de-DE" dirty="0"/>
+          </a:p>
+        </p:txBody>
+      </p:sp>
+      <p:sp>
+        <p:nvSpPr>
+          <p:cNvPr id="3" name="Fußzeilenplatzhalter 2">
+            <a:extLst>
+              <a:ext uri="{FF2B5EF4-FFF2-40B4-BE49-F238E27FC236}">
+                <a16:creationId xmlns:a16="http://schemas.microsoft.com/office/drawing/2014/main" id="{EFFA12D6-C5C2-21E1-C6C9-FA2241432F1D}"/>
+              </a:ext>
+            </a:extLst>
+          </p:cNvPr>
+          <p:cNvSpPr>
+            <a:spLocks noGrp="1"/>
+          </p:cNvSpPr>
+          <p:nvPr>
+            <p:ph type="ftr" sz="quarter" idx="11"/>
+          </p:nvPr>
+        </p:nvSpPr>
+        <p:spPr/>
+        <p:txBody>
+          <a:bodyPr/>
+          <a:lstStyle/>
+          <a:p>
+            <a:r>
+              <a:rPr lang="de-DE"/>
+              <a:t>Sarah-Anne Teuner, Rico Steinke |  T1 / MAS |  WiSe 2022/23</a:t>
+            </a:r>
+            <a:endParaRPr lang="de-DE" dirty="0"/>
+          </a:p>
+        </p:txBody>
+      </p:sp>
+      <p:sp>
+        <p:nvSpPr>
+          <p:cNvPr id="4" name="Foliennummernplatzhalter 3">
+            <a:extLst>
+              <a:ext uri="{FF2B5EF4-FFF2-40B4-BE49-F238E27FC236}">
+                <a16:creationId xmlns:a16="http://schemas.microsoft.com/office/drawing/2014/main" id="{8A245F5A-8BAE-F0F4-482C-831DAC8ECDE9}"/>
+              </a:ext>
+            </a:extLst>
+          </p:cNvPr>
+          <p:cNvSpPr>
+            <a:spLocks noGrp="1"/>
+          </p:cNvSpPr>
+          <p:nvPr>
+            <p:ph type="sldNum" sz="quarter" idx="12"/>
+          </p:nvPr>
+        </p:nvSpPr>
+        <p:spPr/>
+        <p:txBody>
+          <a:bodyPr/>
+          <a:lstStyle/>
+          <a:p>
+            <a:r>
+              <a:rPr lang="de-DE"/>
+              <a:t>|  </a:t>
+            </a:r>
+            <a:fld id="{E6B5151A-17C4-4431-8407-112C0160A8B6}" type="slidenum">
+              <a:rPr lang="de-DE" smtClean="0"/>
+              <a:pPr/>
+              <a:t>12</a:t>
+            </a:fld>
+            <a:endParaRPr lang="de-DE" dirty="0"/>
+          </a:p>
+        </p:txBody>
+      </p:sp>
+      <p:sp>
+        <p:nvSpPr>
+          <p:cNvPr id="5" name="Titel 4">
+            <a:extLst>
+              <a:ext uri="{FF2B5EF4-FFF2-40B4-BE49-F238E27FC236}">
+                <a16:creationId xmlns:a16="http://schemas.microsoft.com/office/drawing/2014/main" id="{5B8A2D87-E9F2-0CAD-601F-F24CF4BBDB53}"/>
+              </a:ext>
+            </a:extLst>
+          </p:cNvPr>
+          <p:cNvSpPr>
+            <a:spLocks noGrp="1"/>
+          </p:cNvSpPr>
+          <p:nvPr>
+            <p:ph type="title"/>
+          </p:nvPr>
+        </p:nvSpPr>
+        <p:spPr/>
+        <p:txBody>
+          <a:bodyPr/>
+          <a:lstStyle/>
+          <a:p>
+            <a:r>
+              <a:rPr lang="de-DE" dirty="0"/>
+              <a:t>Agile Softwareentwicklung an einem Beispiel</a:t>
+            </a:r>
+            <a:endParaRPr lang="LID4096" dirty="0"/>
+          </a:p>
+        </p:txBody>
+      </p:sp>
+      <p:sp>
+        <p:nvSpPr>
+          <p:cNvPr id="6" name="Inhaltsplatzhalter 5">
+            <a:extLst>
+              <a:ext uri="{FF2B5EF4-FFF2-40B4-BE49-F238E27FC236}">
+                <a16:creationId xmlns:a16="http://schemas.microsoft.com/office/drawing/2014/main" id="{4D0C46E6-5705-FEE9-ECA0-BDD549783C5C}"/>
+              </a:ext>
+            </a:extLst>
+          </p:cNvPr>
+          <p:cNvSpPr>
+            <a:spLocks noGrp="1"/>
+          </p:cNvSpPr>
+          <p:nvPr>
+            <p:ph idx="13"/>
+          </p:nvPr>
+        </p:nvSpPr>
+        <p:spPr/>
+        <p:txBody>
+          <a:bodyPr/>
+          <a:lstStyle/>
+          <a:p>
+            <a:r>
+              <a:rPr lang="de-DE" dirty="0"/>
+              <a:t>Gründe für die Umstrukturierung</a:t>
+            </a:r>
+          </a:p>
+          <a:p>
+            <a:pPr marL="342900" indent="-342900">
+              <a:buFont typeface="Arial" panose="020B0604020202020204" pitchFamily="34" charset="0"/>
+              <a:buChar char="•"/>
+            </a:pPr>
+            <a:r>
+              <a:rPr lang="de-DE" dirty="0"/>
+              <a:t>Bessere Kooperation zwischen den HW, SW, SYS </a:t>
+            </a:r>
+            <a:r>
+              <a:rPr lang="de-DE" dirty="0" err="1"/>
+              <a:t>teams</a:t>
+            </a:r>
+            <a:endParaRPr lang="de-DE" dirty="0"/>
+          </a:p>
+          <a:p>
+            <a:pPr marL="342900" indent="-342900">
+              <a:buFont typeface="Arial" panose="020B0604020202020204" pitchFamily="34" charset="0"/>
+              <a:buChar char="•"/>
+            </a:pPr>
+            <a:r>
+              <a:rPr lang="de-DE" dirty="0"/>
+              <a:t>Kurze Entwicklungsschleifen</a:t>
+            </a:r>
+          </a:p>
+          <a:p>
+            <a:pPr marL="342900" indent="-342900">
+              <a:buFont typeface="Arial" panose="020B0604020202020204" pitchFamily="34" charset="0"/>
+              <a:buChar char="•"/>
+            </a:pPr>
+            <a:r>
+              <a:rPr lang="de-DE" dirty="0"/>
+              <a:t>Zeitersparnis durch weniger Meetings/Reviews</a:t>
+            </a:r>
+          </a:p>
+          <a:p>
+            <a:pPr marL="342900" indent="-342900">
+              <a:buFont typeface="Arial" panose="020B0604020202020204" pitchFamily="34" charset="0"/>
+              <a:buChar char="•"/>
+            </a:pPr>
+            <a:r>
+              <a:rPr lang="de-DE" dirty="0"/>
+              <a:t>SW: Späte Information über finale </a:t>
+            </a:r>
+            <a:r>
+              <a:rPr lang="de-DE" dirty="0" err="1"/>
+              <a:t>system</a:t>
+            </a:r>
+            <a:r>
+              <a:rPr lang="de-DE" dirty="0"/>
+              <a:t> requirements</a:t>
+            </a:r>
+          </a:p>
+          <a:p>
+            <a:pPr marL="342900" indent="-342900">
+              <a:buFont typeface="Arial" panose="020B0604020202020204" pitchFamily="34" charset="0"/>
+              <a:buChar char="•"/>
+            </a:pPr>
+            <a:r>
+              <a:rPr lang="de-DE" dirty="0"/>
+              <a:t>SYS: Fehlende Funktionsspezifikationen</a:t>
+            </a:r>
+          </a:p>
+          <a:p>
+            <a:pPr marL="342900" indent="-342900">
+              <a:buFont typeface="Arial" panose="020B0604020202020204" pitchFamily="34" charset="0"/>
+              <a:buChar char="•"/>
+            </a:pPr>
+            <a:r>
+              <a:rPr lang="de-DE" dirty="0"/>
+              <a:t>Test: späte Verfügbarkeit von </a:t>
+            </a:r>
+            <a:r>
+              <a:rPr lang="de-DE" dirty="0" err="1"/>
+              <a:t>Testsergebnissen</a:t>
+            </a:r>
+            <a:endParaRPr lang="de-DE" dirty="0"/>
+          </a:p>
+          <a:p>
+            <a:pPr marL="342900" indent="-342900">
+              <a:buFont typeface="Arial" panose="020B0604020202020204" pitchFamily="34" charset="0"/>
+              <a:buChar char="•"/>
+            </a:pPr>
+            <a:r>
+              <a:rPr lang="de-DE" dirty="0">
+                <a:sym typeface="Wingdings" panose="05000000000000000000" pitchFamily="2" charset="2"/>
+              </a:rPr>
+              <a:t> agiles Modell für schnellere und gezielte Absprachen (Effizienz bei Meeting)</a:t>
+            </a:r>
+            <a:endParaRPr lang="de-DE" dirty="0"/>
+          </a:p>
+          <a:p>
+            <a:endParaRPr lang="de-DE" dirty="0"/>
+          </a:p>
+        </p:txBody>
+      </p:sp>
+    </p:spTree>
+    <p:extLst>
+      <p:ext uri="{BB962C8B-B14F-4D97-AF65-F5344CB8AC3E}">
+        <p14:creationId xmlns:p14="http://schemas.microsoft.com/office/powerpoint/2010/main" val="3455577268"/>
+      </p:ext>
+    </p:extLst>
+  </p:cSld>
+  <p:clrMapOvr>
+    <a:masterClrMapping/>
+  </p:clrMapOvr>
+</p:sld>
+</file>
+
+<file path=ppt/slides/slide13.xml><?xml version="1.0" encoding="utf-8"?>
+<p:sld xmlns:a="http://schemas.openxmlformats.org/drawingml/2006/main" xmlns:r="http://schemas.openxmlformats.org/officeDocument/2006/relationships" xmlns:p="http://schemas.openxmlformats.org/presentationml/2006/main">
+  <p:cSld>
+    <p:spTree>
+      <p:nvGrpSpPr>
+        <p:cNvPr id="1" name=""/>
+        <p:cNvGrpSpPr/>
+        <p:nvPr/>
+      </p:nvGrpSpPr>
+      <p:grpSpPr>
+        <a:xfrm>
+          <a:off x="0" y="0"/>
+          <a:ext cx="0" cy="0"/>
+          <a:chOff x="0" y="0"/>
+          <a:chExt cx="0" cy="0"/>
+        </a:xfrm>
+      </p:grpSpPr>
+      <p:sp>
+        <p:nvSpPr>
+          <p:cNvPr id="2" name="Datumsplatzhalter 1">
+            <a:extLst>
+              <a:ext uri="{FF2B5EF4-FFF2-40B4-BE49-F238E27FC236}">
+                <a16:creationId xmlns:a16="http://schemas.microsoft.com/office/drawing/2014/main" id="{BB1D788A-C68F-79F5-C9F2-447312A7CBD9}"/>
+              </a:ext>
+            </a:extLst>
+          </p:cNvPr>
+          <p:cNvSpPr>
+            <a:spLocks noGrp="1"/>
+          </p:cNvSpPr>
+          <p:nvPr>
+            <p:ph type="dt" sz="half" idx="10"/>
+          </p:nvPr>
+        </p:nvSpPr>
+        <p:spPr/>
+        <p:txBody>
+          <a:bodyPr/>
+          <a:lstStyle/>
+          <a:p>
+            <a:r>
+              <a:rPr lang="de-DE"/>
+              <a:t>Campus Sontheim</a:t>
+            </a:r>
+            <a:endParaRPr lang="de-DE" dirty="0"/>
+          </a:p>
+        </p:txBody>
+      </p:sp>
+      <p:sp>
+        <p:nvSpPr>
+          <p:cNvPr id="3" name="Fußzeilenplatzhalter 2">
+            <a:extLst>
+              <a:ext uri="{FF2B5EF4-FFF2-40B4-BE49-F238E27FC236}">
+                <a16:creationId xmlns:a16="http://schemas.microsoft.com/office/drawing/2014/main" id="{EFFA12D6-C5C2-21E1-C6C9-FA2241432F1D}"/>
+              </a:ext>
+            </a:extLst>
+          </p:cNvPr>
+          <p:cNvSpPr>
+            <a:spLocks noGrp="1"/>
+          </p:cNvSpPr>
+          <p:nvPr>
+            <p:ph type="ftr" sz="quarter" idx="11"/>
+          </p:nvPr>
+        </p:nvSpPr>
+        <p:spPr/>
+        <p:txBody>
+          <a:bodyPr/>
+          <a:lstStyle/>
+          <a:p>
+            <a:r>
+              <a:rPr lang="de-DE"/>
+              <a:t>Sarah-Anne Teuner, Rico Steinke |  T1 / MAS |  WiSe 2022/23</a:t>
+            </a:r>
+            <a:endParaRPr lang="de-DE" dirty="0"/>
+          </a:p>
+        </p:txBody>
+      </p:sp>
+      <p:sp>
+        <p:nvSpPr>
+          <p:cNvPr id="4" name="Foliennummernplatzhalter 3">
+            <a:extLst>
+              <a:ext uri="{FF2B5EF4-FFF2-40B4-BE49-F238E27FC236}">
+                <a16:creationId xmlns:a16="http://schemas.microsoft.com/office/drawing/2014/main" id="{8A245F5A-8BAE-F0F4-482C-831DAC8ECDE9}"/>
+              </a:ext>
+            </a:extLst>
+          </p:cNvPr>
+          <p:cNvSpPr>
+            <a:spLocks noGrp="1"/>
+          </p:cNvSpPr>
+          <p:nvPr>
+            <p:ph type="sldNum" sz="quarter" idx="12"/>
+          </p:nvPr>
+        </p:nvSpPr>
+        <p:spPr/>
+        <p:txBody>
+          <a:bodyPr/>
+          <a:lstStyle/>
+          <a:p>
+            <a:r>
+              <a:rPr lang="de-DE"/>
+              <a:t>|  </a:t>
+            </a:r>
+            <a:fld id="{E6B5151A-17C4-4431-8407-112C0160A8B6}" type="slidenum">
+              <a:rPr lang="de-DE" smtClean="0"/>
+              <a:pPr/>
+              <a:t>13</a:t>
+            </a:fld>
+            <a:endParaRPr lang="de-DE" dirty="0"/>
+          </a:p>
+        </p:txBody>
+      </p:sp>
+      <p:sp>
+        <p:nvSpPr>
+          <p:cNvPr id="5" name="Titel 4">
+            <a:extLst>
+              <a:ext uri="{FF2B5EF4-FFF2-40B4-BE49-F238E27FC236}">
+                <a16:creationId xmlns:a16="http://schemas.microsoft.com/office/drawing/2014/main" id="{5B8A2D87-E9F2-0CAD-601F-F24CF4BBDB53}"/>
+              </a:ext>
+            </a:extLst>
+          </p:cNvPr>
+          <p:cNvSpPr>
+            <a:spLocks noGrp="1"/>
+          </p:cNvSpPr>
+          <p:nvPr>
+            <p:ph type="title"/>
+          </p:nvPr>
+        </p:nvSpPr>
+        <p:spPr/>
+        <p:txBody>
+          <a:bodyPr/>
+          <a:lstStyle/>
+          <a:p>
+            <a:r>
+              <a:rPr lang="de-DE" dirty="0"/>
+              <a:t>Agile Softwareentwicklung an einem Beispiel</a:t>
+            </a:r>
+            <a:endParaRPr lang="LID4096" dirty="0"/>
+          </a:p>
+        </p:txBody>
+      </p:sp>
+      <p:sp>
+        <p:nvSpPr>
+          <p:cNvPr id="6" name="Inhaltsplatzhalter 5">
+            <a:extLst>
+              <a:ext uri="{FF2B5EF4-FFF2-40B4-BE49-F238E27FC236}">
+                <a16:creationId xmlns:a16="http://schemas.microsoft.com/office/drawing/2014/main" id="{4D0C46E6-5705-FEE9-ECA0-BDD549783C5C}"/>
+              </a:ext>
+            </a:extLst>
+          </p:cNvPr>
+          <p:cNvSpPr>
+            <a:spLocks noGrp="1"/>
+          </p:cNvSpPr>
+          <p:nvPr>
+            <p:ph idx="13"/>
+          </p:nvPr>
+        </p:nvSpPr>
+        <p:spPr/>
+        <p:txBody>
+          <a:bodyPr/>
+          <a:lstStyle/>
+          <a:p>
+            <a:endParaRPr lang="de-DE" dirty="0"/>
+          </a:p>
+        </p:txBody>
+      </p:sp>
+    </p:spTree>
+    <p:extLst>
+      <p:ext uri="{BB962C8B-B14F-4D97-AF65-F5344CB8AC3E}">
+        <p14:creationId xmlns:p14="http://schemas.microsoft.com/office/powerpoint/2010/main" val="2835112856"/>
+      </p:ext>
+    </p:extLst>
+  </p:cSld>
+  <p:clrMapOvr>
+    <a:masterClrMapping/>
+  </p:clrMapOvr>
+</p:sld>
+</file>
+
+<file path=ppt/slides/slide14.xml><?xml version="1.0" encoding="utf-8"?>
+<p:sld xmlns:a="http://schemas.openxmlformats.org/drawingml/2006/main" xmlns:r="http://schemas.openxmlformats.org/officeDocument/2006/relationships" xmlns:p="http://schemas.openxmlformats.org/presentationml/2006/main">
+  <p:cSld>
+    <p:spTree>
+      <p:nvGrpSpPr>
+        <p:cNvPr id="1" name=""/>
+        <p:cNvGrpSpPr/>
+        <p:nvPr/>
+      </p:nvGrpSpPr>
+      <p:grpSpPr>
+        <a:xfrm>
+          <a:off x="0" y="0"/>
+          <a:ext cx="0" cy="0"/>
+          <a:chOff x="0" y="0"/>
+          <a:chExt cx="0" cy="0"/>
+        </a:xfrm>
+      </p:grpSpPr>
+      <p:sp>
+        <p:nvSpPr>
+          <p:cNvPr id="3" name="Datumsplatzhalter 2">
+            <a:extLst>
+              <a:ext uri="{FF2B5EF4-FFF2-40B4-BE49-F238E27FC236}">
+                <a16:creationId xmlns:a16="http://schemas.microsoft.com/office/drawing/2014/main" id="{FE2618A7-246F-BE95-0BA0-D89E868BB6CD}"/>
+              </a:ext>
+            </a:extLst>
+          </p:cNvPr>
+          <p:cNvSpPr>
+            <a:spLocks noGrp="1"/>
+          </p:cNvSpPr>
+          <p:nvPr>
+            <p:ph type="dt" sz="half" idx="10"/>
+          </p:nvPr>
+        </p:nvSpPr>
+        <p:spPr/>
+        <p:txBody>
+          <a:bodyPr/>
+          <a:lstStyle/>
+          <a:p>
+            <a:r>
+              <a:rPr lang="de-DE"/>
+              <a:t>Campus Sontheim</a:t>
+            </a:r>
+            <a:endParaRPr lang="de-DE" dirty="0"/>
+          </a:p>
+        </p:txBody>
+      </p:sp>
+      <p:sp>
+        <p:nvSpPr>
+          <p:cNvPr id="5" name="Fußzeilenplatzhalter 4">
+            <a:extLst>
+              <a:ext uri="{FF2B5EF4-FFF2-40B4-BE49-F238E27FC236}">
+                <a16:creationId xmlns:a16="http://schemas.microsoft.com/office/drawing/2014/main" id="{3FAF1F66-EAC1-1266-9ACA-885788282CEC}"/>
+              </a:ext>
+            </a:extLst>
+          </p:cNvPr>
+          <p:cNvSpPr>
+            <a:spLocks noGrp="1"/>
+          </p:cNvSpPr>
+          <p:nvPr>
+            <p:ph type="ftr" sz="quarter" idx="11"/>
+          </p:nvPr>
+        </p:nvSpPr>
+        <p:spPr/>
+        <p:txBody>
+          <a:bodyPr/>
+          <a:lstStyle/>
+          <a:p>
+            <a:r>
+              <a:rPr lang="de-DE"/>
+              <a:t>Sarah-Anne Teuner, Rico Steinke |  T1 / MAS |  WiSe 2022/23</a:t>
+            </a:r>
+            <a:endParaRPr lang="de-DE" dirty="0"/>
+          </a:p>
+        </p:txBody>
+      </p:sp>
+      <p:sp>
+        <p:nvSpPr>
+          <p:cNvPr id="6" name="Foliennummernplatzhalter 5">
+            <a:extLst>
+              <a:ext uri="{FF2B5EF4-FFF2-40B4-BE49-F238E27FC236}">
+                <a16:creationId xmlns:a16="http://schemas.microsoft.com/office/drawing/2014/main" id="{FC15A4F3-CE1D-71B4-B211-A117CD4C4522}"/>
+              </a:ext>
+            </a:extLst>
+          </p:cNvPr>
+          <p:cNvSpPr>
+            <a:spLocks noGrp="1"/>
+          </p:cNvSpPr>
+          <p:nvPr>
+            <p:ph type="sldNum" sz="quarter" idx="12"/>
+          </p:nvPr>
+        </p:nvSpPr>
+        <p:spPr/>
+        <p:txBody>
+          <a:bodyPr/>
+          <a:lstStyle/>
+          <a:p>
+            <a:r>
+              <a:rPr lang="de-DE"/>
+              <a:t>|  </a:t>
+            </a:r>
+            <a:fld id="{E6B5151A-17C4-4431-8407-112C0160A8B6}" type="slidenum">
+              <a:rPr lang="de-DE" smtClean="0"/>
+              <a:pPr/>
+              <a:t>14</a:t>
+            </a:fld>
+            <a:endParaRPr lang="de-DE" dirty="0"/>
+          </a:p>
+        </p:txBody>
+      </p:sp>
+      <p:sp>
+        <p:nvSpPr>
+          <p:cNvPr id="8" name="Titel 7">
+            <a:extLst>
+              <a:ext uri="{FF2B5EF4-FFF2-40B4-BE49-F238E27FC236}">
+                <a16:creationId xmlns:a16="http://schemas.microsoft.com/office/drawing/2014/main" id="{A4DA370A-F9F8-1AAB-8F9D-DE85826D91AC}"/>
+              </a:ext>
+            </a:extLst>
+          </p:cNvPr>
+          <p:cNvSpPr>
+            <a:spLocks noGrp="1"/>
+          </p:cNvSpPr>
+          <p:nvPr>
+            <p:ph type="title"/>
+          </p:nvPr>
+        </p:nvSpPr>
+        <p:spPr/>
+        <p:txBody>
+          <a:bodyPr/>
+          <a:lstStyle/>
+          <a:p>
+            <a:r>
+              <a:rPr lang="de-DE" dirty="0" err="1"/>
+              <a:t>AbbildungsVerzeichnis</a:t>
+            </a:r>
+            <a:endParaRPr lang="de-DE" dirty="0"/>
+          </a:p>
+        </p:txBody>
+      </p:sp>
+      <p:sp>
+        <p:nvSpPr>
+          <p:cNvPr id="9" name="Inhaltsplatzhalter 8">
+            <a:extLst>
+              <a:ext uri="{FF2B5EF4-FFF2-40B4-BE49-F238E27FC236}">
+                <a16:creationId xmlns:a16="http://schemas.microsoft.com/office/drawing/2014/main" id="{027FC95D-FE72-E71C-60C3-362414F19C9C}"/>
+              </a:ext>
+            </a:extLst>
+          </p:cNvPr>
+          <p:cNvSpPr>
+            <a:spLocks noGrp="1"/>
+          </p:cNvSpPr>
+          <p:nvPr>
+            <p:ph idx="13"/>
+          </p:nvPr>
+        </p:nvSpPr>
+        <p:spPr/>
+        <p:txBody>
+          <a:bodyPr/>
+          <a:lstStyle/>
+          <a:p>
+            <a:r>
+              <a:rPr lang="de-DE" b="0" i="0" dirty="0">
+                <a:effectLst/>
+                <a:latin typeface="Arial" panose="020B0604020202020204" pitchFamily="34" charset="0"/>
+              </a:rPr>
+              <a:t>1 Symbolgraphik Agile (Quelle: stock.adobe.com) . . . . . . . . . . . . . . Folie 4 </a:t>
+            </a:r>
+            <a:endParaRPr lang="de-DE" dirty="0"/>
+          </a:p>
+        </p:txBody>
+      </p:sp>
+    </p:spTree>
+    <p:extLst>
+      <p:ext uri="{BB962C8B-B14F-4D97-AF65-F5344CB8AC3E}">
+        <p14:creationId xmlns:p14="http://schemas.microsoft.com/office/powerpoint/2010/main" val="1894614973"/>
+      </p:ext>
+    </p:extLst>
+  </p:cSld>
+  <p:clrMapOvr>
+    <a:masterClrMapping/>
+  </p:clrMapOvr>
+</p:sld>
+</file>
+
+<file path=ppt/slides/slide15.xml><?xml version="1.0" encoding="utf-8"?>
+<p:sld xmlns:a="http://schemas.openxmlformats.org/drawingml/2006/main" xmlns:r="http://schemas.openxmlformats.org/officeDocument/2006/relationships" xmlns:p="http://schemas.openxmlformats.org/presentationml/2006/main">
+  <p:cSld>
+    <p:spTree>
+      <p:nvGrpSpPr>
+        <p:cNvPr id="1" name=""/>
+        <p:cNvGrpSpPr/>
+        <p:nvPr/>
+      </p:nvGrpSpPr>
+      <p:grpSpPr>
+        <a:xfrm>
+          <a:off x="0" y="0"/>
+          <a:ext cx="0" cy="0"/>
+          <a:chOff x="0" y="0"/>
+          <a:chExt cx="0" cy="0"/>
+        </a:xfrm>
+      </p:grpSpPr>
+      <p:sp>
+        <p:nvSpPr>
+          <p:cNvPr id="2" name="Datumsplatzhalter 1">
+            <a:extLst>
+              <a:ext uri="{FF2B5EF4-FFF2-40B4-BE49-F238E27FC236}">
+                <a16:creationId xmlns:a16="http://schemas.microsoft.com/office/drawing/2014/main" id="{715BFC56-E707-DCA2-9B30-20D5F047E4BD}"/>
+              </a:ext>
+            </a:extLst>
+          </p:cNvPr>
+          <p:cNvSpPr>
+            <a:spLocks noGrp="1"/>
+          </p:cNvSpPr>
+          <p:nvPr>
+            <p:ph type="dt" sz="half" idx="10"/>
+          </p:nvPr>
+        </p:nvSpPr>
+        <p:spPr/>
+        <p:txBody>
+          <a:bodyPr/>
+          <a:lstStyle/>
+          <a:p>
+            <a:r>
+              <a:rPr lang="de-DE"/>
+              <a:t>Campus Sontheim</a:t>
+            </a:r>
+            <a:endParaRPr lang="de-DE" dirty="0"/>
+          </a:p>
+        </p:txBody>
+      </p:sp>
+      <p:sp>
+        <p:nvSpPr>
+          <p:cNvPr id="3" name="Fußzeilenplatzhalter 2">
+            <a:extLst>
+              <a:ext uri="{FF2B5EF4-FFF2-40B4-BE49-F238E27FC236}">
+                <a16:creationId xmlns:a16="http://schemas.microsoft.com/office/drawing/2014/main" id="{92336A89-E81A-8175-D84C-9E978E13583A}"/>
+              </a:ext>
+            </a:extLst>
+          </p:cNvPr>
+          <p:cNvSpPr>
+            <a:spLocks noGrp="1"/>
+          </p:cNvSpPr>
+          <p:nvPr>
+            <p:ph type="ftr" sz="quarter" idx="11"/>
+          </p:nvPr>
+        </p:nvSpPr>
+        <p:spPr/>
+        <p:txBody>
+          <a:bodyPr/>
+          <a:lstStyle/>
+          <a:p>
+            <a:r>
+              <a:rPr lang="de-DE"/>
+              <a:t>Sarah-Anne Teuner, Rico Steinke |  T1 / MAS |  WiSe 2022/23</a:t>
+            </a:r>
+            <a:endParaRPr lang="de-DE" dirty="0"/>
+          </a:p>
+        </p:txBody>
+      </p:sp>
+      <p:sp>
+        <p:nvSpPr>
+          <p:cNvPr id="4" name="Foliennummernplatzhalter 3">
+            <a:extLst>
+              <a:ext uri="{FF2B5EF4-FFF2-40B4-BE49-F238E27FC236}">
+                <a16:creationId xmlns:a16="http://schemas.microsoft.com/office/drawing/2014/main" id="{D152A9AF-D990-6F71-9CA5-C3C38B81FED8}"/>
+              </a:ext>
+            </a:extLst>
+          </p:cNvPr>
+          <p:cNvSpPr>
+            <a:spLocks noGrp="1"/>
+          </p:cNvSpPr>
+          <p:nvPr>
+            <p:ph type="sldNum" sz="quarter" idx="12"/>
+          </p:nvPr>
+        </p:nvSpPr>
+        <p:spPr/>
+        <p:txBody>
+          <a:bodyPr/>
+          <a:lstStyle/>
+          <a:p>
+            <a:r>
+              <a:rPr lang="de-DE"/>
+              <a:t>|  </a:t>
+            </a:r>
+            <a:fld id="{E6B5151A-17C4-4431-8407-112C0160A8B6}" type="slidenum">
+              <a:rPr lang="de-DE" smtClean="0"/>
+              <a:pPr/>
+              <a:t>15</a:t>
+            </a:fld>
+            <a:endParaRPr lang="de-DE" dirty="0"/>
+          </a:p>
+        </p:txBody>
+      </p:sp>
+      <p:sp>
+        <p:nvSpPr>
+          <p:cNvPr id="5" name="Titel 4">
+            <a:extLst>
+              <a:ext uri="{FF2B5EF4-FFF2-40B4-BE49-F238E27FC236}">
+                <a16:creationId xmlns:a16="http://schemas.microsoft.com/office/drawing/2014/main" id="{25A1D4C8-876A-2FA2-821C-89B88EC1BD6A}"/>
+              </a:ext>
+            </a:extLst>
+          </p:cNvPr>
+          <p:cNvSpPr>
+            <a:spLocks noGrp="1"/>
+          </p:cNvSpPr>
+          <p:nvPr>
+            <p:ph type="title"/>
+          </p:nvPr>
+        </p:nvSpPr>
+        <p:spPr/>
+        <p:txBody>
+          <a:bodyPr/>
+          <a:lstStyle/>
+          <a:p>
+            <a:r>
+              <a:rPr lang="de-DE" dirty="0"/>
+              <a:t>Literaturverzeichnis</a:t>
+            </a:r>
+          </a:p>
+        </p:txBody>
+      </p:sp>
+      <p:sp>
+        <p:nvSpPr>
+          <p:cNvPr id="6" name="Inhaltsplatzhalter 5">
+            <a:extLst>
+              <a:ext uri="{FF2B5EF4-FFF2-40B4-BE49-F238E27FC236}">
+                <a16:creationId xmlns:a16="http://schemas.microsoft.com/office/drawing/2014/main" id="{3E7EDE6D-9992-6245-5C0C-4BFD2B763B39}"/>
+              </a:ext>
+            </a:extLst>
+          </p:cNvPr>
+          <p:cNvSpPr>
+            <a:spLocks noGrp="1"/>
+          </p:cNvSpPr>
+          <p:nvPr>
+            <p:ph idx="13"/>
+          </p:nvPr>
+        </p:nvSpPr>
+        <p:spPr/>
+        <p:txBody>
+          <a:bodyPr/>
+          <a:lstStyle/>
+          <a:p>
+            <a:r>
+              <a:rPr lang="de-DE" sz="1400" b="0" i="0" dirty="0">
+                <a:effectLst/>
+                <a:latin typeface="Arial" panose="020B0604020202020204" pitchFamily="34" charset="0"/>
+                <a:cs typeface="Arial" panose="020B0604020202020204" pitchFamily="34" charset="0"/>
+              </a:rPr>
+              <a:t>[1] A. </a:t>
+            </a:r>
+            <a:r>
+              <a:rPr lang="de-DE" sz="1400" b="0" i="0" dirty="0" err="1">
+                <a:effectLst/>
+                <a:latin typeface="Arial" panose="020B0604020202020204" pitchFamily="34" charset="0"/>
+                <a:cs typeface="Arial" panose="020B0604020202020204" pitchFamily="34" charset="0"/>
+              </a:rPr>
+              <a:t>Schloßer</a:t>
+            </a:r>
+            <a:r>
+              <a:rPr lang="de-DE" sz="1400" b="0" i="0" dirty="0">
+                <a:effectLst/>
+                <a:latin typeface="Arial" panose="020B0604020202020204" pitchFamily="34" charset="0"/>
+                <a:cs typeface="Arial" panose="020B0604020202020204" pitchFamily="34" charset="0"/>
+              </a:rPr>
+              <a:t>, J. Schnitzler, T. Sentis, and J. Richenhagen, “Agile </a:t>
+            </a:r>
+            <a:r>
+              <a:rPr lang="de-DE" sz="1400" b="0" i="0" dirty="0" err="1">
+                <a:effectLst/>
+                <a:latin typeface="Arial" panose="020B0604020202020204" pitchFamily="34" charset="0"/>
+                <a:cs typeface="Arial" panose="020B0604020202020204" pitchFamily="34" charset="0"/>
+              </a:rPr>
+              <a:t>processes</a:t>
+            </a:r>
+            <a:r>
+              <a:rPr lang="de-DE" sz="1400" b="0" i="0" dirty="0">
+                <a:effectLst/>
+                <a:latin typeface="Arial" panose="020B0604020202020204" pitchFamily="34" charset="0"/>
+                <a:cs typeface="Arial" panose="020B0604020202020204" pitchFamily="34" charset="0"/>
+              </a:rPr>
+              <a:t> in </a:t>
+            </a:r>
+            <a:r>
+              <a:rPr lang="de-DE" sz="1400" b="0" i="0" dirty="0" err="1">
+                <a:effectLst/>
+                <a:latin typeface="Arial" panose="020B0604020202020204" pitchFamily="34" charset="0"/>
+                <a:cs typeface="Arial" panose="020B0604020202020204" pitchFamily="34" charset="0"/>
+              </a:rPr>
+              <a:t>automotive</a:t>
+            </a:r>
+            <a:r>
+              <a:rPr lang="de-DE" sz="1400" b="0" i="0" dirty="0">
+                <a:effectLst/>
+                <a:latin typeface="Arial" panose="020B0604020202020204" pitchFamily="34" charset="0"/>
+                <a:cs typeface="Arial" panose="020B0604020202020204" pitchFamily="34" charset="0"/>
+              </a:rPr>
+              <a:t> </a:t>
+            </a:r>
+            <a:r>
+              <a:rPr lang="de-DE" sz="1400" b="0" i="0" dirty="0" err="1">
+                <a:effectLst/>
+                <a:latin typeface="Arial" panose="020B0604020202020204" pitchFamily="34" charset="0"/>
+                <a:cs typeface="Arial" panose="020B0604020202020204" pitchFamily="34" charset="0"/>
+              </a:rPr>
+              <a:t>industry</a:t>
+            </a:r>
+            <a:r>
+              <a:rPr lang="de-DE" sz="1400" b="0" i="0" dirty="0">
+                <a:effectLst/>
+                <a:latin typeface="Arial" panose="020B0604020202020204" pitchFamily="34" charset="0"/>
+                <a:cs typeface="Arial" panose="020B0604020202020204" pitchFamily="34" charset="0"/>
+              </a:rPr>
+              <a:t> – </a:t>
+            </a:r>
+            <a:r>
+              <a:rPr lang="de-DE" sz="1400" b="0" i="0" dirty="0" err="1">
+                <a:effectLst/>
+                <a:latin typeface="Arial" panose="020B0604020202020204" pitchFamily="34" charset="0"/>
+                <a:cs typeface="Arial" panose="020B0604020202020204" pitchFamily="34" charset="0"/>
+              </a:rPr>
+              <a:t>efficiency</a:t>
+            </a:r>
+            <a:r>
+              <a:rPr lang="de-DE" sz="1400" b="0" i="0" dirty="0">
+                <a:effectLst/>
+                <a:latin typeface="Arial" panose="020B0604020202020204" pitchFamily="34" charset="0"/>
+                <a:cs typeface="Arial" panose="020B0604020202020204" pitchFamily="34" charset="0"/>
+              </a:rPr>
+              <a:t> and </a:t>
+            </a:r>
+            <a:r>
+              <a:rPr lang="de-DE" sz="1400" b="0" i="0" dirty="0" err="1">
+                <a:effectLst/>
+                <a:latin typeface="Arial" panose="020B0604020202020204" pitchFamily="34" charset="0"/>
+                <a:cs typeface="Arial" panose="020B0604020202020204" pitchFamily="34" charset="0"/>
+              </a:rPr>
+              <a:t>quality</a:t>
+            </a:r>
+            <a:r>
+              <a:rPr lang="de-DE" sz="1400" b="0" i="0" dirty="0">
+                <a:effectLst/>
+                <a:latin typeface="Arial" panose="020B0604020202020204" pitchFamily="34" charset="0"/>
+                <a:cs typeface="Arial" panose="020B0604020202020204" pitchFamily="34" charset="0"/>
+              </a:rPr>
+              <a:t> in </a:t>
+            </a:r>
+            <a:r>
+              <a:rPr lang="de-DE" sz="1400" b="0" i="0" dirty="0" err="1">
+                <a:effectLst/>
+                <a:latin typeface="Arial" panose="020B0604020202020204" pitchFamily="34" charset="0"/>
+                <a:cs typeface="Arial" panose="020B0604020202020204" pitchFamily="34" charset="0"/>
+              </a:rPr>
+              <a:t>software</a:t>
+            </a:r>
+            <a:r>
+              <a:rPr lang="de-DE" sz="1400" b="0" i="0" dirty="0">
+                <a:effectLst/>
+                <a:latin typeface="Arial" panose="020B0604020202020204" pitchFamily="34" charset="0"/>
+                <a:cs typeface="Arial" panose="020B0604020202020204" pitchFamily="34" charset="0"/>
+              </a:rPr>
+              <a:t> </a:t>
+            </a:r>
+            <a:r>
+              <a:rPr lang="de-DE" sz="1400" b="0" i="0" dirty="0" err="1">
+                <a:effectLst/>
+                <a:latin typeface="Arial" panose="020B0604020202020204" pitchFamily="34" charset="0"/>
+                <a:cs typeface="Arial" panose="020B0604020202020204" pitchFamily="34" charset="0"/>
+              </a:rPr>
+              <a:t>development</a:t>
+            </a:r>
+            <a:r>
+              <a:rPr lang="de-DE" sz="1400" b="0" i="0" dirty="0">
+                <a:effectLst/>
+                <a:latin typeface="Arial" panose="020B0604020202020204" pitchFamily="34" charset="0"/>
+                <a:cs typeface="Arial" panose="020B0604020202020204" pitchFamily="34" charset="0"/>
+              </a:rPr>
+              <a:t>,” in 16. Internationales Stuttgarter Symposium (M. </a:t>
+            </a:r>
+            <a:r>
+              <a:rPr lang="de-DE" sz="1400" b="0" i="0" dirty="0" err="1">
+                <a:effectLst/>
+                <a:latin typeface="Arial" panose="020B0604020202020204" pitchFamily="34" charset="0"/>
+                <a:cs typeface="Arial" panose="020B0604020202020204" pitchFamily="34" charset="0"/>
+              </a:rPr>
+              <a:t>Bargende</a:t>
+            </a:r>
+            <a:r>
+              <a:rPr lang="de-DE" sz="1400" b="0" i="0" dirty="0">
+                <a:effectLst/>
+                <a:latin typeface="Arial" panose="020B0604020202020204" pitchFamily="34" charset="0"/>
+                <a:cs typeface="Arial" panose="020B0604020202020204" pitchFamily="34" charset="0"/>
+              </a:rPr>
+              <a:t>, H.-C. </a:t>
+            </a:r>
+            <a:r>
+              <a:rPr lang="de-DE" sz="1400" b="0" i="0" dirty="0" err="1">
+                <a:effectLst/>
+                <a:latin typeface="Arial" panose="020B0604020202020204" pitchFamily="34" charset="0"/>
+                <a:cs typeface="Arial" panose="020B0604020202020204" pitchFamily="34" charset="0"/>
+              </a:rPr>
+              <a:t>Reuss</a:t>
+            </a:r>
+            <a:r>
+              <a:rPr lang="de-DE" sz="1400" b="0" i="0" dirty="0">
+                <a:effectLst/>
+                <a:latin typeface="Arial" panose="020B0604020202020204" pitchFamily="34" charset="0"/>
+                <a:cs typeface="Arial" panose="020B0604020202020204" pitchFamily="34" charset="0"/>
+              </a:rPr>
+              <a:t>, and J. Wiedemann, </a:t>
+            </a:r>
+            <a:r>
+              <a:rPr lang="de-DE" sz="1400" b="0" i="0" dirty="0" err="1">
+                <a:effectLst/>
+                <a:latin typeface="Arial" panose="020B0604020202020204" pitchFamily="34" charset="0"/>
+                <a:cs typeface="Arial" panose="020B0604020202020204" pitchFamily="34" charset="0"/>
+              </a:rPr>
+              <a:t>eds</a:t>
+            </a:r>
+            <a:r>
+              <a:rPr lang="de-DE" sz="1400" b="0" i="0" dirty="0">
+                <a:effectLst/>
+                <a:latin typeface="Arial" panose="020B0604020202020204" pitchFamily="34" charset="0"/>
+                <a:cs typeface="Arial" panose="020B0604020202020204" pitchFamily="34" charset="0"/>
+              </a:rPr>
+              <a:t>.), (Wiesbaden), pp. 489–503, Springer Fachmedien Wiesbaden, 2016.</a:t>
+            </a:r>
+            <a:br>
+              <a:rPr lang="de-DE" sz="1400" dirty="0">
+                <a:latin typeface="Arial" panose="020B0604020202020204" pitchFamily="34" charset="0"/>
+                <a:cs typeface="Arial" panose="020B0604020202020204" pitchFamily="34" charset="0"/>
+              </a:rPr>
+            </a:br>
+            <a:r>
+              <a:rPr lang="de-DE" sz="1400" b="0" i="0" dirty="0">
+                <a:effectLst/>
+                <a:latin typeface="Arial" panose="020B0604020202020204" pitchFamily="34" charset="0"/>
+                <a:cs typeface="Arial" panose="020B0604020202020204" pitchFamily="34" charset="0"/>
+              </a:rPr>
+              <a:t>[2] B. </a:t>
+            </a:r>
+            <a:r>
+              <a:rPr lang="de-DE" sz="1400" b="0" i="0" dirty="0" err="1">
+                <a:effectLst/>
+                <a:latin typeface="Arial" panose="020B0604020202020204" pitchFamily="34" charset="0"/>
+                <a:cs typeface="Arial" panose="020B0604020202020204" pitchFamily="34" charset="0"/>
+              </a:rPr>
+              <a:t>Katumba</a:t>
+            </a:r>
+            <a:r>
+              <a:rPr lang="de-DE" sz="1400" b="0" i="0" dirty="0">
+                <a:effectLst/>
+                <a:latin typeface="Arial" panose="020B0604020202020204" pitchFamily="34" charset="0"/>
+                <a:cs typeface="Arial" panose="020B0604020202020204" pitchFamily="34" charset="0"/>
+              </a:rPr>
+              <a:t> and E. Knauss, “Agile </a:t>
+            </a:r>
+            <a:r>
+              <a:rPr lang="de-DE" sz="1400" b="0" i="0" dirty="0" err="1">
+                <a:effectLst/>
+                <a:latin typeface="Arial" panose="020B0604020202020204" pitchFamily="34" charset="0"/>
+                <a:cs typeface="Arial" panose="020B0604020202020204" pitchFamily="34" charset="0"/>
+              </a:rPr>
+              <a:t>development</a:t>
+            </a:r>
+            <a:r>
+              <a:rPr lang="de-DE" sz="1400" b="0" i="0" dirty="0">
+                <a:effectLst/>
+                <a:latin typeface="Arial" panose="020B0604020202020204" pitchFamily="34" charset="0"/>
+                <a:cs typeface="Arial" panose="020B0604020202020204" pitchFamily="34" charset="0"/>
+              </a:rPr>
+              <a:t> in </a:t>
+            </a:r>
+            <a:r>
+              <a:rPr lang="de-DE" sz="1400" b="0" i="0" dirty="0" err="1">
+                <a:effectLst/>
+                <a:latin typeface="Arial" panose="020B0604020202020204" pitchFamily="34" charset="0"/>
+                <a:cs typeface="Arial" panose="020B0604020202020204" pitchFamily="34" charset="0"/>
+              </a:rPr>
+              <a:t>automotive</a:t>
+            </a:r>
+            <a:r>
+              <a:rPr lang="de-DE" sz="1400" b="0" i="0" dirty="0">
+                <a:effectLst/>
+                <a:latin typeface="Arial" panose="020B0604020202020204" pitchFamily="34" charset="0"/>
+                <a:cs typeface="Arial" panose="020B0604020202020204" pitchFamily="34" charset="0"/>
+              </a:rPr>
+              <a:t> </a:t>
+            </a:r>
+            <a:r>
+              <a:rPr lang="de-DE" sz="1400" b="0" i="0" dirty="0" err="1">
+                <a:effectLst/>
+                <a:latin typeface="Arial" panose="020B0604020202020204" pitchFamily="34" charset="0"/>
+                <a:cs typeface="Arial" panose="020B0604020202020204" pitchFamily="34" charset="0"/>
+              </a:rPr>
+              <a:t>software</a:t>
+            </a:r>
+            <a:r>
+              <a:rPr lang="de-DE" sz="1400" b="0" i="0" dirty="0">
+                <a:effectLst/>
+                <a:latin typeface="Arial" panose="020B0604020202020204" pitchFamily="34" charset="0"/>
+                <a:cs typeface="Arial" panose="020B0604020202020204" pitchFamily="34" charset="0"/>
+              </a:rPr>
+              <a:t> </a:t>
+            </a:r>
+            <a:r>
+              <a:rPr lang="de-DE" sz="1400" b="0" i="0" dirty="0" err="1">
+                <a:effectLst/>
+                <a:latin typeface="Arial" panose="020B0604020202020204" pitchFamily="34" charset="0"/>
+                <a:cs typeface="Arial" panose="020B0604020202020204" pitchFamily="34" charset="0"/>
+              </a:rPr>
+              <a:t>development</a:t>
+            </a:r>
+            <a:r>
+              <a:rPr lang="de-DE" sz="1400" b="0" i="0" dirty="0">
+                <a:effectLst/>
+                <a:latin typeface="Arial" panose="020B0604020202020204" pitchFamily="34" charset="0"/>
+                <a:cs typeface="Arial" panose="020B0604020202020204" pitchFamily="34" charset="0"/>
+              </a:rPr>
+              <a:t>: Challenges and </a:t>
+            </a:r>
+            <a:r>
+              <a:rPr lang="de-DE" sz="1400" b="0" i="0" dirty="0" err="1">
+                <a:effectLst/>
+                <a:latin typeface="Arial" panose="020B0604020202020204" pitchFamily="34" charset="0"/>
+                <a:cs typeface="Arial" panose="020B0604020202020204" pitchFamily="34" charset="0"/>
+              </a:rPr>
+              <a:t>opportunities</a:t>
+            </a:r>
+            <a:r>
+              <a:rPr lang="de-DE" sz="1400" b="0" i="0" dirty="0">
+                <a:effectLst/>
+                <a:latin typeface="Arial" panose="020B0604020202020204" pitchFamily="34" charset="0"/>
+                <a:cs typeface="Arial" panose="020B0604020202020204" pitchFamily="34" charset="0"/>
+              </a:rPr>
+              <a:t>,” 12 2014.</a:t>
+            </a:r>
+            <a:br>
+              <a:rPr lang="de-DE" sz="1400" dirty="0">
+                <a:latin typeface="Arial" panose="020B0604020202020204" pitchFamily="34" charset="0"/>
+                <a:cs typeface="Arial" panose="020B0604020202020204" pitchFamily="34" charset="0"/>
+              </a:rPr>
+            </a:br>
+            <a:r>
+              <a:rPr lang="de-DE" sz="1400" b="0" i="0" dirty="0">
+                <a:effectLst/>
+                <a:latin typeface="Arial" panose="020B0604020202020204" pitchFamily="34" charset="0"/>
+                <a:cs typeface="Arial" panose="020B0604020202020204" pitchFamily="34" charset="0"/>
+              </a:rPr>
+              <a:t>[3] Andreas </a:t>
+            </a:r>
+            <a:r>
+              <a:rPr lang="de-DE" sz="1400" b="0" i="0" dirty="0" err="1">
+                <a:effectLst/>
+                <a:latin typeface="Arial" panose="020B0604020202020204" pitchFamily="34" charset="0"/>
+                <a:cs typeface="Arial" panose="020B0604020202020204" pitchFamily="34" charset="0"/>
+              </a:rPr>
+              <a:t>Daberkow</a:t>
+            </a:r>
+            <a:r>
+              <a:rPr lang="de-DE" sz="1400" b="0" i="0" dirty="0">
+                <a:effectLst/>
+                <a:latin typeface="Arial" panose="020B0604020202020204" pitchFamily="34" charset="0"/>
+                <a:cs typeface="Arial" panose="020B0604020202020204" pitchFamily="34" charset="0"/>
+              </a:rPr>
+              <a:t>, “Prozessgestaltung in der Produktentstehung.”</a:t>
+            </a:r>
+            <a:br>
+              <a:rPr lang="de-DE" sz="1400" dirty="0">
+                <a:latin typeface="Arial" panose="020B0604020202020204" pitchFamily="34" charset="0"/>
+                <a:cs typeface="Arial" panose="020B0604020202020204" pitchFamily="34" charset="0"/>
+              </a:rPr>
+            </a:br>
+            <a:r>
+              <a:rPr lang="de-DE" sz="1400" b="0" i="0" dirty="0">
+                <a:effectLst/>
+                <a:latin typeface="Arial" panose="020B0604020202020204" pitchFamily="34" charset="0"/>
+                <a:cs typeface="Arial" panose="020B0604020202020204" pitchFamily="34" charset="0"/>
+              </a:rPr>
+              <a:t>[4] H. Wolf and W. Bleek, Agile Softwareentwicklung: Werte, Konzepte und Methoden. </a:t>
+            </a:r>
+            <a:r>
+              <a:rPr lang="de-DE" sz="1400" b="0" i="0" dirty="0" err="1">
+                <a:effectLst/>
+                <a:latin typeface="Arial" panose="020B0604020202020204" pitchFamily="34" charset="0"/>
+                <a:cs typeface="Arial" panose="020B0604020202020204" pitchFamily="34" charset="0"/>
+              </a:rPr>
+              <a:t>dpunkt.verlag</a:t>
+            </a:r>
+            <a:r>
+              <a:rPr lang="de-DE" sz="1400" b="0" i="0" dirty="0">
+                <a:effectLst/>
+                <a:latin typeface="Arial" panose="020B0604020202020204" pitchFamily="34" charset="0"/>
+                <a:cs typeface="Arial" panose="020B0604020202020204" pitchFamily="34" charset="0"/>
+              </a:rPr>
+              <a:t>, 2011.</a:t>
+            </a:r>
+            <a:br>
+              <a:rPr lang="de-DE" sz="1400" dirty="0">
+                <a:latin typeface="Arial" panose="020B0604020202020204" pitchFamily="34" charset="0"/>
+                <a:cs typeface="Arial" panose="020B0604020202020204" pitchFamily="34" charset="0"/>
+              </a:rPr>
+            </a:br>
+            <a:r>
+              <a:rPr lang="de-DE" sz="1400" b="0" i="0" dirty="0">
+                <a:effectLst/>
+                <a:latin typeface="Arial" panose="020B0604020202020204" pitchFamily="34" charset="0"/>
+                <a:cs typeface="Arial" panose="020B0604020202020204" pitchFamily="34" charset="0"/>
+              </a:rPr>
+              <a:t>[5] A. Alliance, “Agile 101.” https://www.agilealliance.org/agile101/. [Online</a:t>
+            </a:r>
+            <a:r>
+              <a:rPr lang="de-DE" sz="1400" b="0" i="0">
+                <a:effectLst/>
+                <a:latin typeface="Arial" panose="020B0604020202020204" pitchFamily="34" charset="0"/>
+                <a:cs typeface="Arial" panose="020B0604020202020204" pitchFamily="34" charset="0"/>
+              </a:rPr>
+              <a:t>; Stand 15.11.2022</a:t>
+            </a:r>
+            <a:r>
+              <a:rPr lang="de-DE" sz="1400" b="0" i="0" dirty="0">
+                <a:effectLst/>
+                <a:latin typeface="Arial" panose="020B0604020202020204" pitchFamily="34" charset="0"/>
+                <a:cs typeface="Arial" panose="020B0604020202020204" pitchFamily="34" charset="0"/>
+              </a:rPr>
+              <a:t>].</a:t>
+            </a:r>
+            <a:br>
+              <a:rPr lang="de-DE" dirty="0"/>
+            </a:br>
+            <a:endParaRPr lang="de-DE" dirty="0"/>
+          </a:p>
+        </p:txBody>
+      </p:sp>
+    </p:spTree>
+    <p:extLst>
+      <p:ext uri="{BB962C8B-B14F-4D97-AF65-F5344CB8AC3E}">
+        <p14:creationId xmlns:p14="http://schemas.microsoft.com/office/powerpoint/2010/main" val="2986913301"/>
+      </p:ext>
+    </p:extLst>
+  </p:cSld>
+  <p:clrMapOvr>
+    <a:masterClrMapping/>
+  </p:clrMapOvr>
+</p:sld>
+</file>
+
+<file path=ppt/slides/slide16.xml><?xml version="1.0" encoding="utf-8"?>
+<p:sld xmlns:a="http://schemas.openxmlformats.org/drawingml/2006/main" xmlns:r="http://schemas.openxmlformats.org/officeDocument/2006/relationships" xmlns:p="http://schemas.openxmlformats.org/presentationml/2006/main">
+  <p:cSld>
+    <p:spTree>
+      <p:nvGrpSpPr>
+        <p:cNvPr id="1" name=""/>
+        <p:cNvGrpSpPr/>
+        <p:nvPr/>
+      </p:nvGrpSpPr>
+      <p:grpSpPr>
+        <a:xfrm>
+          <a:off x="0" y="0"/>
+          <a:ext cx="0" cy="0"/>
+          <a:chOff x="0" y="0"/>
+          <a:chExt cx="0" cy="0"/>
+        </a:xfrm>
+      </p:grpSpPr>
+      <p:sp>
+        <p:nvSpPr>
+          <p:cNvPr id="3" name="Datumsplatzhalter 2">
+            <a:extLst>
+              <a:ext uri="{FF2B5EF4-FFF2-40B4-BE49-F238E27FC236}">
+                <a16:creationId xmlns:a16="http://schemas.microsoft.com/office/drawing/2014/main" id="{FE2618A7-246F-BE95-0BA0-D89E868BB6CD}"/>
+              </a:ext>
+            </a:extLst>
+          </p:cNvPr>
+          <p:cNvSpPr>
+            <a:spLocks noGrp="1"/>
+          </p:cNvSpPr>
+          <p:nvPr>
+            <p:ph type="dt" sz="half" idx="10"/>
+          </p:nvPr>
+        </p:nvSpPr>
+        <p:spPr/>
+        <p:txBody>
+          <a:bodyPr/>
+          <a:lstStyle/>
+          <a:p>
+            <a:r>
+              <a:rPr lang="de-DE"/>
+              <a:t>Campus Sontheim</a:t>
+            </a:r>
+            <a:endParaRPr lang="de-DE" dirty="0"/>
+          </a:p>
+        </p:txBody>
+      </p:sp>
+      <p:sp>
+        <p:nvSpPr>
+          <p:cNvPr id="5" name="Fußzeilenplatzhalter 4">
+            <a:extLst>
+              <a:ext uri="{FF2B5EF4-FFF2-40B4-BE49-F238E27FC236}">
+                <a16:creationId xmlns:a16="http://schemas.microsoft.com/office/drawing/2014/main" id="{3FAF1F66-EAC1-1266-9ACA-885788282CEC}"/>
+              </a:ext>
+            </a:extLst>
+          </p:cNvPr>
+          <p:cNvSpPr>
+            <a:spLocks noGrp="1"/>
+          </p:cNvSpPr>
+          <p:nvPr>
+            <p:ph type="ftr" sz="quarter" idx="11"/>
+          </p:nvPr>
+        </p:nvSpPr>
+        <p:spPr/>
+        <p:txBody>
+          <a:bodyPr/>
+          <a:lstStyle/>
+          <a:p>
+            <a:r>
+              <a:rPr lang="de-DE"/>
+              <a:t>Sarah-Anne Teuner, Rico Steinke |  T1 / MAS |  WiSe 2022/23</a:t>
+            </a:r>
+            <a:endParaRPr lang="de-DE" dirty="0"/>
+          </a:p>
+        </p:txBody>
+      </p:sp>
+      <p:sp>
+        <p:nvSpPr>
+          <p:cNvPr id="6" name="Foliennummernplatzhalter 5">
+            <a:extLst>
+              <a:ext uri="{FF2B5EF4-FFF2-40B4-BE49-F238E27FC236}">
+                <a16:creationId xmlns:a16="http://schemas.microsoft.com/office/drawing/2014/main" id="{FC15A4F3-CE1D-71B4-B211-A117CD4C4522}"/>
+              </a:ext>
+            </a:extLst>
+          </p:cNvPr>
+          <p:cNvSpPr>
+            <a:spLocks noGrp="1"/>
+          </p:cNvSpPr>
+          <p:nvPr>
+            <p:ph type="sldNum" sz="quarter" idx="12"/>
+          </p:nvPr>
+        </p:nvSpPr>
+        <p:spPr/>
+        <p:txBody>
+          <a:bodyPr/>
+          <a:lstStyle/>
+          <a:p>
+            <a:r>
+              <a:rPr lang="de-DE"/>
+              <a:t>|  </a:t>
+            </a:r>
+            <a:fld id="{E6B5151A-17C4-4431-8407-112C0160A8B6}" type="slidenum">
+              <a:rPr lang="de-DE" smtClean="0"/>
+              <a:pPr/>
+              <a:t>16</a:t>
+            </a:fld>
+            <a:endParaRPr lang="de-DE" dirty="0"/>
+          </a:p>
+        </p:txBody>
+      </p:sp>
+      <p:sp>
+        <p:nvSpPr>
+          <p:cNvPr id="8" name="Titel 7">
+            <a:extLst>
+              <a:ext uri="{FF2B5EF4-FFF2-40B4-BE49-F238E27FC236}">
+                <a16:creationId xmlns:a16="http://schemas.microsoft.com/office/drawing/2014/main" id="{A4DA370A-F9F8-1AAB-8F9D-DE85826D91AC}"/>
+              </a:ext>
+            </a:extLst>
+          </p:cNvPr>
+          <p:cNvSpPr>
+            <a:spLocks noGrp="1"/>
+          </p:cNvSpPr>
+          <p:nvPr>
+            <p:ph type="title"/>
+          </p:nvPr>
+        </p:nvSpPr>
+        <p:spPr/>
+        <p:txBody>
+          <a:bodyPr/>
+          <a:lstStyle/>
+          <a:p>
+            <a:r>
+              <a:rPr lang="de-DE" dirty="0" err="1"/>
+              <a:t>AbbildungsVerzeichnis</a:t>
+            </a:r>
+            <a:endParaRPr lang="de-DE" dirty="0"/>
+          </a:p>
+        </p:txBody>
+      </p:sp>
+      <p:sp>
+        <p:nvSpPr>
+          <p:cNvPr id="9" name="Inhaltsplatzhalter 8">
+            <a:extLst>
+              <a:ext uri="{FF2B5EF4-FFF2-40B4-BE49-F238E27FC236}">
+                <a16:creationId xmlns:a16="http://schemas.microsoft.com/office/drawing/2014/main" id="{027FC95D-FE72-E71C-60C3-362414F19C9C}"/>
+              </a:ext>
+            </a:extLst>
+          </p:cNvPr>
+          <p:cNvSpPr>
+            <a:spLocks noGrp="1"/>
+          </p:cNvSpPr>
+          <p:nvPr>
+            <p:ph idx="13"/>
+          </p:nvPr>
+        </p:nvSpPr>
+        <p:spPr/>
+        <p:txBody>
+          <a:bodyPr/>
+          <a:lstStyle/>
+          <a:p>
+            <a:r>
+              <a:rPr lang="de-DE" b="0" i="0" dirty="0">
+                <a:effectLst/>
+                <a:latin typeface="Arial" panose="020B0604020202020204" pitchFamily="34" charset="0"/>
+              </a:rPr>
+              <a:t>1 Symbolgraphik Agile (Quelle: stock.adobe.com) . . . . . . . . . . . . . . Folie 4 </a:t>
+            </a:r>
+            <a:endParaRPr lang="de-DE" dirty="0"/>
+          </a:p>
+        </p:txBody>
+      </p:sp>
+    </p:spTree>
+    <p:extLst>
+      <p:ext uri="{BB962C8B-B14F-4D97-AF65-F5344CB8AC3E}">
+        <p14:creationId xmlns:p14="http://schemas.microsoft.com/office/powerpoint/2010/main" val="956665881"/>
+      </p:ext>
+    </p:extLst>
+  </p:cSld>
+  <p:clrMapOvr>
+    <a:masterClrMapping/>
+  </p:clrMapOvr>
+</p:sld>
+</file>
+
+<file path=ppt/slides/slide17.xml><?xml version="1.0" encoding="utf-8"?>
+<p:sld xmlns:a="http://schemas.openxmlformats.org/drawingml/2006/main" xmlns:r="http://schemas.openxmlformats.org/officeDocument/2006/relationships" xmlns:p="http://schemas.openxmlformats.org/presentationml/2006/main">
+  <p:cSld>
+    <p:spTree>
+      <p:nvGrpSpPr>
+        <p:cNvPr id="1" name=""/>
+        <p:cNvGrpSpPr/>
+        <p:nvPr/>
+      </p:nvGrpSpPr>
+      <p:grpSpPr>
+        <a:xfrm>
+          <a:off x="0" y="0"/>
+          <a:ext cx="0" cy="0"/>
+          <a:chOff x="0" y="0"/>
+          <a:chExt cx="0" cy="0"/>
+        </a:xfrm>
+      </p:grpSpPr>
+      <p:sp>
+        <p:nvSpPr>
+          <p:cNvPr id="2" name="Datumsplatzhalter 1">
+            <a:extLst>
+              <a:ext uri="{FF2B5EF4-FFF2-40B4-BE49-F238E27FC236}">
+                <a16:creationId xmlns:a16="http://schemas.microsoft.com/office/drawing/2014/main" id="{715BFC56-E707-DCA2-9B30-20D5F047E4BD}"/>
+              </a:ext>
+            </a:extLst>
+          </p:cNvPr>
+          <p:cNvSpPr>
+            <a:spLocks noGrp="1"/>
+          </p:cNvSpPr>
+          <p:nvPr>
+            <p:ph type="dt" sz="half" idx="10"/>
+          </p:nvPr>
+        </p:nvSpPr>
+        <p:spPr/>
+        <p:txBody>
+          <a:bodyPr/>
+          <a:lstStyle/>
+          <a:p>
+            <a:r>
+              <a:rPr lang="de-DE"/>
+              <a:t>Campus Sontheim</a:t>
+            </a:r>
+            <a:endParaRPr lang="de-DE" dirty="0"/>
+          </a:p>
+        </p:txBody>
+      </p:sp>
+      <p:sp>
+        <p:nvSpPr>
+          <p:cNvPr id="3" name="Fußzeilenplatzhalter 2">
+            <a:extLst>
+              <a:ext uri="{FF2B5EF4-FFF2-40B4-BE49-F238E27FC236}">
+                <a16:creationId xmlns:a16="http://schemas.microsoft.com/office/drawing/2014/main" id="{92336A89-E81A-8175-D84C-9E978E13583A}"/>
+              </a:ext>
+            </a:extLst>
+          </p:cNvPr>
+          <p:cNvSpPr>
+            <a:spLocks noGrp="1"/>
+          </p:cNvSpPr>
+          <p:nvPr>
+            <p:ph type="ftr" sz="quarter" idx="11"/>
+          </p:nvPr>
+        </p:nvSpPr>
+        <p:spPr/>
+        <p:txBody>
+          <a:bodyPr/>
+          <a:lstStyle/>
+          <a:p>
+            <a:r>
+              <a:rPr lang="de-DE"/>
+              <a:t>Sarah-Anne Teuner, Rico Steinke |  T1 / MAS |  WiSe 2022/23</a:t>
+            </a:r>
+            <a:endParaRPr lang="de-DE" dirty="0"/>
+          </a:p>
+        </p:txBody>
+      </p:sp>
+      <p:sp>
+        <p:nvSpPr>
+          <p:cNvPr id="4" name="Foliennummernplatzhalter 3">
+            <a:extLst>
+              <a:ext uri="{FF2B5EF4-FFF2-40B4-BE49-F238E27FC236}">
+                <a16:creationId xmlns:a16="http://schemas.microsoft.com/office/drawing/2014/main" id="{D152A9AF-D990-6F71-9CA5-C3C38B81FED8}"/>
+              </a:ext>
+            </a:extLst>
+          </p:cNvPr>
+          <p:cNvSpPr>
+            <a:spLocks noGrp="1"/>
+          </p:cNvSpPr>
+          <p:nvPr>
+            <p:ph type="sldNum" sz="quarter" idx="12"/>
+          </p:nvPr>
+        </p:nvSpPr>
+        <p:spPr/>
+        <p:txBody>
+          <a:bodyPr/>
+          <a:lstStyle/>
+          <a:p>
+            <a:r>
+              <a:rPr lang="de-DE"/>
+              <a:t>|  </a:t>
+            </a:r>
+            <a:fld id="{E6B5151A-17C4-4431-8407-112C0160A8B6}" type="slidenum">
+              <a:rPr lang="de-DE" smtClean="0"/>
+              <a:pPr/>
+              <a:t>17</a:t>
+            </a:fld>
+            <a:endParaRPr lang="de-DE" dirty="0"/>
+          </a:p>
+        </p:txBody>
+      </p:sp>
+      <p:sp>
+        <p:nvSpPr>
+          <p:cNvPr id="5" name="Titel 4">
+            <a:extLst>
+              <a:ext uri="{FF2B5EF4-FFF2-40B4-BE49-F238E27FC236}">
+                <a16:creationId xmlns:a16="http://schemas.microsoft.com/office/drawing/2014/main" id="{25A1D4C8-876A-2FA2-821C-89B88EC1BD6A}"/>
+              </a:ext>
+            </a:extLst>
+          </p:cNvPr>
+          <p:cNvSpPr>
+            <a:spLocks noGrp="1"/>
+          </p:cNvSpPr>
+          <p:nvPr>
+            <p:ph type="title"/>
+          </p:nvPr>
+        </p:nvSpPr>
+        <p:spPr/>
+        <p:txBody>
+          <a:bodyPr/>
+          <a:lstStyle/>
+          <a:p>
+            <a:r>
+              <a:rPr lang="de-DE" dirty="0"/>
+              <a:t>Literaturverzeichnis</a:t>
+            </a:r>
+          </a:p>
+        </p:txBody>
+      </p:sp>
+      <p:sp>
+        <p:nvSpPr>
+          <p:cNvPr id="6" name="Inhaltsplatzhalter 5">
+            <a:extLst>
+              <a:ext uri="{FF2B5EF4-FFF2-40B4-BE49-F238E27FC236}">
+                <a16:creationId xmlns:a16="http://schemas.microsoft.com/office/drawing/2014/main" id="{3E7EDE6D-9992-6245-5C0C-4BFD2B763B39}"/>
+              </a:ext>
+            </a:extLst>
+          </p:cNvPr>
+          <p:cNvSpPr>
+            <a:spLocks noGrp="1"/>
+          </p:cNvSpPr>
+          <p:nvPr>
+            <p:ph idx="13"/>
+          </p:nvPr>
+        </p:nvSpPr>
+        <p:spPr/>
+        <p:txBody>
+          <a:bodyPr/>
+          <a:lstStyle/>
+          <a:p>
+            <a:r>
+              <a:rPr lang="de-DE" sz="1400" b="0" i="0" dirty="0">
+                <a:effectLst/>
+                <a:latin typeface="Arial" panose="020B0604020202020204" pitchFamily="34" charset="0"/>
+                <a:cs typeface="Arial" panose="020B0604020202020204" pitchFamily="34" charset="0"/>
+              </a:rPr>
+              <a:t>[1] A. </a:t>
+            </a:r>
+            <a:r>
+              <a:rPr lang="de-DE" sz="1400" b="0" i="0" dirty="0" err="1">
+                <a:effectLst/>
+                <a:latin typeface="Arial" panose="020B0604020202020204" pitchFamily="34" charset="0"/>
+                <a:cs typeface="Arial" panose="020B0604020202020204" pitchFamily="34" charset="0"/>
+              </a:rPr>
+              <a:t>Schloßer</a:t>
+            </a:r>
+            <a:r>
+              <a:rPr lang="de-DE" sz="1400" b="0" i="0" dirty="0">
+                <a:effectLst/>
+                <a:latin typeface="Arial" panose="020B0604020202020204" pitchFamily="34" charset="0"/>
+                <a:cs typeface="Arial" panose="020B0604020202020204" pitchFamily="34" charset="0"/>
+              </a:rPr>
+              <a:t>, J. Schnitzler, T. Sentis, and J. Richenhagen, “Agile </a:t>
+            </a:r>
+            <a:r>
+              <a:rPr lang="de-DE" sz="1400" b="0" i="0" dirty="0" err="1">
+                <a:effectLst/>
+                <a:latin typeface="Arial" panose="020B0604020202020204" pitchFamily="34" charset="0"/>
+                <a:cs typeface="Arial" panose="020B0604020202020204" pitchFamily="34" charset="0"/>
+              </a:rPr>
+              <a:t>processes</a:t>
+            </a:r>
+            <a:r>
+              <a:rPr lang="de-DE" sz="1400" b="0" i="0" dirty="0">
+                <a:effectLst/>
+                <a:latin typeface="Arial" panose="020B0604020202020204" pitchFamily="34" charset="0"/>
+                <a:cs typeface="Arial" panose="020B0604020202020204" pitchFamily="34" charset="0"/>
+              </a:rPr>
+              <a:t> in </a:t>
+            </a:r>
+            <a:r>
+              <a:rPr lang="de-DE" sz="1400" b="0" i="0" dirty="0" err="1">
+                <a:effectLst/>
+                <a:latin typeface="Arial" panose="020B0604020202020204" pitchFamily="34" charset="0"/>
+                <a:cs typeface="Arial" panose="020B0604020202020204" pitchFamily="34" charset="0"/>
+              </a:rPr>
+              <a:t>automotive</a:t>
+            </a:r>
+            <a:r>
+              <a:rPr lang="de-DE" sz="1400" b="0" i="0" dirty="0">
+                <a:effectLst/>
+                <a:latin typeface="Arial" panose="020B0604020202020204" pitchFamily="34" charset="0"/>
+                <a:cs typeface="Arial" panose="020B0604020202020204" pitchFamily="34" charset="0"/>
+              </a:rPr>
+              <a:t> </a:t>
+            </a:r>
+            <a:r>
+              <a:rPr lang="de-DE" sz="1400" b="0" i="0" dirty="0" err="1">
+                <a:effectLst/>
+                <a:latin typeface="Arial" panose="020B0604020202020204" pitchFamily="34" charset="0"/>
+                <a:cs typeface="Arial" panose="020B0604020202020204" pitchFamily="34" charset="0"/>
+              </a:rPr>
+              <a:t>industry</a:t>
+            </a:r>
+            <a:r>
+              <a:rPr lang="de-DE" sz="1400" b="0" i="0" dirty="0">
+                <a:effectLst/>
+                <a:latin typeface="Arial" panose="020B0604020202020204" pitchFamily="34" charset="0"/>
+                <a:cs typeface="Arial" panose="020B0604020202020204" pitchFamily="34" charset="0"/>
+              </a:rPr>
+              <a:t> – </a:t>
+            </a:r>
+            <a:r>
+              <a:rPr lang="de-DE" sz="1400" b="0" i="0" dirty="0" err="1">
+                <a:effectLst/>
+                <a:latin typeface="Arial" panose="020B0604020202020204" pitchFamily="34" charset="0"/>
+                <a:cs typeface="Arial" panose="020B0604020202020204" pitchFamily="34" charset="0"/>
+              </a:rPr>
+              <a:t>efficiency</a:t>
+            </a:r>
+            <a:r>
+              <a:rPr lang="de-DE" sz="1400" b="0" i="0" dirty="0">
+                <a:effectLst/>
+                <a:latin typeface="Arial" panose="020B0604020202020204" pitchFamily="34" charset="0"/>
+                <a:cs typeface="Arial" panose="020B0604020202020204" pitchFamily="34" charset="0"/>
+              </a:rPr>
+              <a:t> and </a:t>
+            </a:r>
+            <a:r>
+              <a:rPr lang="de-DE" sz="1400" b="0" i="0" dirty="0" err="1">
+                <a:effectLst/>
+                <a:latin typeface="Arial" panose="020B0604020202020204" pitchFamily="34" charset="0"/>
+                <a:cs typeface="Arial" panose="020B0604020202020204" pitchFamily="34" charset="0"/>
+              </a:rPr>
+              <a:t>quality</a:t>
+            </a:r>
+            <a:r>
+              <a:rPr lang="de-DE" sz="1400" b="0" i="0" dirty="0">
+                <a:effectLst/>
+                <a:latin typeface="Arial" panose="020B0604020202020204" pitchFamily="34" charset="0"/>
+                <a:cs typeface="Arial" panose="020B0604020202020204" pitchFamily="34" charset="0"/>
+              </a:rPr>
+              <a:t> in </a:t>
+            </a:r>
+            <a:r>
+              <a:rPr lang="de-DE" sz="1400" b="0" i="0" dirty="0" err="1">
+                <a:effectLst/>
+                <a:latin typeface="Arial" panose="020B0604020202020204" pitchFamily="34" charset="0"/>
+                <a:cs typeface="Arial" panose="020B0604020202020204" pitchFamily="34" charset="0"/>
+              </a:rPr>
+              <a:t>software</a:t>
+            </a:r>
+            <a:r>
+              <a:rPr lang="de-DE" sz="1400" b="0" i="0" dirty="0">
+                <a:effectLst/>
+                <a:latin typeface="Arial" panose="020B0604020202020204" pitchFamily="34" charset="0"/>
+                <a:cs typeface="Arial" panose="020B0604020202020204" pitchFamily="34" charset="0"/>
+              </a:rPr>
+              <a:t> </a:t>
+            </a:r>
+            <a:r>
+              <a:rPr lang="de-DE" sz="1400" b="0" i="0" dirty="0" err="1">
+                <a:effectLst/>
+                <a:latin typeface="Arial" panose="020B0604020202020204" pitchFamily="34" charset="0"/>
+                <a:cs typeface="Arial" panose="020B0604020202020204" pitchFamily="34" charset="0"/>
+              </a:rPr>
+              <a:t>development</a:t>
+            </a:r>
+            <a:r>
+              <a:rPr lang="de-DE" sz="1400" b="0" i="0" dirty="0">
+                <a:effectLst/>
+                <a:latin typeface="Arial" panose="020B0604020202020204" pitchFamily="34" charset="0"/>
+                <a:cs typeface="Arial" panose="020B0604020202020204" pitchFamily="34" charset="0"/>
+              </a:rPr>
+              <a:t>,” in 16. Internationales Stuttgarter Symposium (M. </a:t>
+            </a:r>
+            <a:r>
+              <a:rPr lang="de-DE" sz="1400" b="0" i="0" dirty="0" err="1">
+                <a:effectLst/>
+                <a:latin typeface="Arial" panose="020B0604020202020204" pitchFamily="34" charset="0"/>
+                <a:cs typeface="Arial" panose="020B0604020202020204" pitchFamily="34" charset="0"/>
+              </a:rPr>
+              <a:t>Bargende</a:t>
+            </a:r>
+            <a:r>
+              <a:rPr lang="de-DE" sz="1400" b="0" i="0" dirty="0">
+                <a:effectLst/>
+                <a:latin typeface="Arial" panose="020B0604020202020204" pitchFamily="34" charset="0"/>
+                <a:cs typeface="Arial" panose="020B0604020202020204" pitchFamily="34" charset="0"/>
+              </a:rPr>
+              <a:t>, H.-C. </a:t>
+            </a:r>
+            <a:r>
+              <a:rPr lang="de-DE" sz="1400" b="0" i="0" dirty="0" err="1">
+                <a:effectLst/>
+                <a:latin typeface="Arial" panose="020B0604020202020204" pitchFamily="34" charset="0"/>
+                <a:cs typeface="Arial" panose="020B0604020202020204" pitchFamily="34" charset="0"/>
+              </a:rPr>
+              <a:t>Reuss</a:t>
+            </a:r>
+            <a:r>
+              <a:rPr lang="de-DE" sz="1400" b="0" i="0" dirty="0">
+                <a:effectLst/>
+                <a:latin typeface="Arial" panose="020B0604020202020204" pitchFamily="34" charset="0"/>
+                <a:cs typeface="Arial" panose="020B0604020202020204" pitchFamily="34" charset="0"/>
+              </a:rPr>
+              <a:t>, and J. Wiedemann, </a:t>
+            </a:r>
+            <a:r>
+              <a:rPr lang="de-DE" sz="1400" b="0" i="0" dirty="0" err="1">
+                <a:effectLst/>
+                <a:latin typeface="Arial" panose="020B0604020202020204" pitchFamily="34" charset="0"/>
+                <a:cs typeface="Arial" panose="020B0604020202020204" pitchFamily="34" charset="0"/>
+              </a:rPr>
+              <a:t>eds</a:t>
+            </a:r>
+            <a:r>
+              <a:rPr lang="de-DE" sz="1400" b="0" i="0" dirty="0">
+                <a:effectLst/>
+                <a:latin typeface="Arial" panose="020B0604020202020204" pitchFamily="34" charset="0"/>
+                <a:cs typeface="Arial" panose="020B0604020202020204" pitchFamily="34" charset="0"/>
+              </a:rPr>
+              <a:t>.), (Wiesbaden), pp. 489–503, Springer Fachmedien Wiesbaden, 2016.</a:t>
+            </a:r>
+            <a:br>
+              <a:rPr lang="de-DE" sz="1400" dirty="0">
+                <a:latin typeface="Arial" panose="020B0604020202020204" pitchFamily="34" charset="0"/>
+                <a:cs typeface="Arial" panose="020B0604020202020204" pitchFamily="34" charset="0"/>
+              </a:rPr>
+            </a:br>
+            <a:r>
+              <a:rPr lang="de-DE" sz="1400" b="0" i="0" dirty="0">
+                <a:effectLst/>
+                <a:latin typeface="Arial" panose="020B0604020202020204" pitchFamily="34" charset="0"/>
+                <a:cs typeface="Arial" panose="020B0604020202020204" pitchFamily="34" charset="0"/>
+              </a:rPr>
+              <a:t>[2] B. </a:t>
+            </a:r>
+            <a:r>
+              <a:rPr lang="de-DE" sz="1400" b="0" i="0" dirty="0" err="1">
+                <a:effectLst/>
+                <a:latin typeface="Arial" panose="020B0604020202020204" pitchFamily="34" charset="0"/>
+                <a:cs typeface="Arial" panose="020B0604020202020204" pitchFamily="34" charset="0"/>
+              </a:rPr>
+              <a:t>Katumba</a:t>
+            </a:r>
+            <a:r>
+              <a:rPr lang="de-DE" sz="1400" b="0" i="0" dirty="0">
+                <a:effectLst/>
+                <a:latin typeface="Arial" panose="020B0604020202020204" pitchFamily="34" charset="0"/>
+                <a:cs typeface="Arial" panose="020B0604020202020204" pitchFamily="34" charset="0"/>
+              </a:rPr>
+              <a:t> and E. Knauss, “Agile </a:t>
+            </a:r>
+            <a:r>
+              <a:rPr lang="de-DE" sz="1400" b="0" i="0" dirty="0" err="1">
+                <a:effectLst/>
+                <a:latin typeface="Arial" panose="020B0604020202020204" pitchFamily="34" charset="0"/>
+                <a:cs typeface="Arial" panose="020B0604020202020204" pitchFamily="34" charset="0"/>
+              </a:rPr>
+              <a:t>development</a:t>
+            </a:r>
+            <a:r>
+              <a:rPr lang="de-DE" sz="1400" b="0" i="0" dirty="0">
+                <a:effectLst/>
+                <a:latin typeface="Arial" panose="020B0604020202020204" pitchFamily="34" charset="0"/>
+                <a:cs typeface="Arial" panose="020B0604020202020204" pitchFamily="34" charset="0"/>
+              </a:rPr>
+              <a:t> in </a:t>
+            </a:r>
+            <a:r>
+              <a:rPr lang="de-DE" sz="1400" b="0" i="0" dirty="0" err="1">
+                <a:effectLst/>
+                <a:latin typeface="Arial" panose="020B0604020202020204" pitchFamily="34" charset="0"/>
+                <a:cs typeface="Arial" panose="020B0604020202020204" pitchFamily="34" charset="0"/>
+              </a:rPr>
+              <a:t>automotive</a:t>
+            </a:r>
+            <a:r>
+              <a:rPr lang="de-DE" sz="1400" b="0" i="0" dirty="0">
+                <a:effectLst/>
+                <a:latin typeface="Arial" panose="020B0604020202020204" pitchFamily="34" charset="0"/>
+                <a:cs typeface="Arial" panose="020B0604020202020204" pitchFamily="34" charset="0"/>
+              </a:rPr>
+              <a:t> </a:t>
+            </a:r>
+            <a:r>
+              <a:rPr lang="de-DE" sz="1400" b="0" i="0" dirty="0" err="1">
+                <a:effectLst/>
+                <a:latin typeface="Arial" panose="020B0604020202020204" pitchFamily="34" charset="0"/>
+                <a:cs typeface="Arial" panose="020B0604020202020204" pitchFamily="34" charset="0"/>
+              </a:rPr>
+              <a:t>software</a:t>
+            </a:r>
+            <a:r>
+              <a:rPr lang="de-DE" sz="1400" b="0" i="0" dirty="0">
+                <a:effectLst/>
+                <a:latin typeface="Arial" panose="020B0604020202020204" pitchFamily="34" charset="0"/>
+                <a:cs typeface="Arial" panose="020B0604020202020204" pitchFamily="34" charset="0"/>
+              </a:rPr>
+              <a:t> </a:t>
+            </a:r>
+            <a:r>
+              <a:rPr lang="de-DE" sz="1400" b="0" i="0" dirty="0" err="1">
+                <a:effectLst/>
+                <a:latin typeface="Arial" panose="020B0604020202020204" pitchFamily="34" charset="0"/>
+                <a:cs typeface="Arial" panose="020B0604020202020204" pitchFamily="34" charset="0"/>
+              </a:rPr>
+              <a:t>development</a:t>
+            </a:r>
+            <a:r>
+              <a:rPr lang="de-DE" sz="1400" b="0" i="0" dirty="0">
+                <a:effectLst/>
+                <a:latin typeface="Arial" panose="020B0604020202020204" pitchFamily="34" charset="0"/>
+                <a:cs typeface="Arial" panose="020B0604020202020204" pitchFamily="34" charset="0"/>
+              </a:rPr>
+              <a:t>: Challenges and </a:t>
+            </a:r>
+            <a:r>
+              <a:rPr lang="de-DE" sz="1400" b="0" i="0" dirty="0" err="1">
+                <a:effectLst/>
+                <a:latin typeface="Arial" panose="020B0604020202020204" pitchFamily="34" charset="0"/>
+                <a:cs typeface="Arial" panose="020B0604020202020204" pitchFamily="34" charset="0"/>
+              </a:rPr>
+              <a:t>opportunities</a:t>
+            </a:r>
+            <a:r>
+              <a:rPr lang="de-DE" sz="1400" b="0" i="0" dirty="0">
+                <a:effectLst/>
+                <a:latin typeface="Arial" panose="020B0604020202020204" pitchFamily="34" charset="0"/>
+                <a:cs typeface="Arial" panose="020B0604020202020204" pitchFamily="34" charset="0"/>
+              </a:rPr>
+              <a:t>,” 12 2014.</a:t>
+            </a:r>
+            <a:br>
+              <a:rPr lang="de-DE" sz="1400" dirty="0">
+                <a:latin typeface="Arial" panose="020B0604020202020204" pitchFamily="34" charset="0"/>
+                <a:cs typeface="Arial" panose="020B0604020202020204" pitchFamily="34" charset="0"/>
+              </a:rPr>
+            </a:br>
+            <a:r>
+              <a:rPr lang="de-DE" sz="1400" b="0" i="0" dirty="0">
+                <a:effectLst/>
+                <a:latin typeface="Arial" panose="020B0604020202020204" pitchFamily="34" charset="0"/>
+                <a:cs typeface="Arial" panose="020B0604020202020204" pitchFamily="34" charset="0"/>
+              </a:rPr>
+              <a:t>[3] Andreas </a:t>
+            </a:r>
+            <a:r>
+              <a:rPr lang="de-DE" sz="1400" b="0" i="0" dirty="0" err="1">
+                <a:effectLst/>
+                <a:latin typeface="Arial" panose="020B0604020202020204" pitchFamily="34" charset="0"/>
+                <a:cs typeface="Arial" panose="020B0604020202020204" pitchFamily="34" charset="0"/>
+              </a:rPr>
+              <a:t>Daberkow</a:t>
+            </a:r>
+            <a:r>
+              <a:rPr lang="de-DE" sz="1400" b="0" i="0" dirty="0">
+                <a:effectLst/>
+                <a:latin typeface="Arial" panose="020B0604020202020204" pitchFamily="34" charset="0"/>
+                <a:cs typeface="Arial" panose="020B0604020202020204" pitchFamily="34" charset="0"/>
+              </a:rPr>
+              <a:t>, “Prozessgestaltung in der Produktentstehung.”</a:t>
+            </a:r>
+            <a:br>
+              <a:rPr lang="de-DE" sz="1400" dirty="0">
+                <a:latin typeface="Arial" panose="020B0604020202020204" pitchFamily="34" charset="0"/>
+                <a:cs typeface="Arial" panose="020B0604020202020204" pitchFamily="34" charset="0"/>
+              </a:rPr>
+            </a:br>
+            <a:r>
+              <a:rPr lang="de-DE" sz="1400" b="0" i="0" dirty="0">
+                <a:effectLst/>
+                <a:latin typeface="Arial" panose="020B0604020202020204" pitchFamily="34" charset="0"/>
+                <a:cs typeface="Arial" panose="020B0604020202020204" pitchFamily="34" charset="0"/>
+              </a:rPr>
+              <a:t>[4] H. Wolf and W. Bleek, Agile Softwareentwicklung: Werte, Konzepte und Methoden. </a:t>
+            </a:r>
+            <a:r>
+              <a:rPr lang="de-DE" sz="1400" b="0" i="0" dirty="0" err="1">
+                <a:effectLst/>
+                <a:latin typeface="Arial" panose="020B0604020202020204" pitchFamily="34" charset="0"/>
+                <a:cs typeface="Arial" panose="020B0604020202020204" pitchFamily="34" charset="0"/>
+              </a:rPr>
+              <a:t>dpunkt.verlag</a:t>
+            </a:r>
+            <a:r>
+              <a:rPr lang="de-DE" sz="1400" b="0" i="0" dirty="0">
+                <a:effectLst/>
+                <a:latin typeface="Arial" panose="020B0604020202020204" pitchFamily="34" charset="0"/>
+                <a:cs typeface="Arial" panose="020B0604020202020204" pitchFamily="34" charset="0"/>
+              </a:rPr>
+              <a:t>, 2011.</a:t>
+            </a:r>
+            <a:br>
+              <a:rPr lang="de-DE" sz="1400" dirty="0">
+                <a:latin typeface="Arial" panose="020B0604020202020204" pitchFamily="34" charset="0"/>
+                <a:cs typeface="Arial" panose="020B0604020202020204" pitchFamily="34" charset="0"/>
+              </a:rPr>
+            </a:br>
+            <a:r>
+              <a:rPr lang="de-DE" sz="1400" b="0" i="0" dirty="0">
+                <a:effectLst/>
+                <a:latin typeface="Arial" panose="020B0604020202020204" pitchFamily="34" charset="0"/>
+                <a:cs typeface="Arial" panose="020B0604020202020204" pitchFamily="34" charset="0"/>
+              </a:rPr>
+              <a:t>[5] A. Alliance, “Agile 101.” https://www.agilealliance.org/agile101/. [Online</a:t>
+            </a:r>
+            <a:r>
+              <a:rPr lang="de-DE" sz="1400" b="0" i="0">
+                <a:effectLst/>
+                <a:latin typeface="Arial" panose="020B0604020202020204" pitchFamily="34" charset="0"/>
+                <a:cs typeface="Arial" panose="020B0604020202020204" pitchFamily="34" charset="0"/>
+              </a:rPr>
+              <a:t>; Stand 15.11.2022</a:t>
+            </a:r>
+            <a:r>
+              <a:rPr lang="de-DE" sz="1400" b="0" i="0" dirty="0">
+                <a:effectLst/>
+                <a:latin typeface="Arial" panose="020B0604020202020204" pitchFamily="34" charset="0"/>
+                <a:cs typeface="Arial" panose="020B0604020202020204" pitchFamily="34" charset="0"/>
+              </a:rPr>
+              <a:t>].</a:t>
+            </a:r>
+            <a:br>
+              <a:rPr lang="de-DE" dirty="0"/>
+            </a:br>
+            <a:endParaRPr lang="de-DE" dirty="0"/>
+          </a:p>
+        </p:txBody>
+      </p:sp>
+    </p:spTree>
+    <p:extLst>
+      <p:ext uri="{BB962C8B-B14F-4D97-AF65-F5344CB8AC3E}">
+        <p14:creationId xmlns:p14="http://schemas.microsoft.com/office/powerpoint/2010/main" val="2018495382"/>
       </p:ext>
     </p:extLst>
   </p:cSld>
@@ -35947,193 +38398,10 @@
       </p:grpSpPr>
       <p:sp>
         <p:nvSpPr>
-          <p:cNvPr id="3" name="Datumsplatzhalter 2">
-            <a:extLst>
-              <a:ext uri="{FF2B5EF4-FFF2-40B4-BE49-F238E27FC236}">
-                <a16:creationId xmlns:a16="http://schemas.microsoft.com/office/drawing/2014/main" id="{FE2618A7-246F-BE95-0BA0-D89E868BB6CD}"/>
-              </a:ext>
-            </a:extLst>
-          </p:cNvPr>
-          <p:cNvSpPr>
-            <a:spLocks noGrp="1"/>
-          </p:cNvSpPr>
-          <p:nvPr>
-            <p:ph type="dt" sz="half" idx="10"/>
-          </p:nvPr>
-        </p:nvSpPr>
-        <p:spPr/>
-        <p:txBody>
-          <a:bodyPr/>
-          <a:lstStyle/>
-          <a:p>
-            <a:r>
-              <a:rPr lang="de-DE"/>
-              <a:t>Campus Sontheim</a:t>
-            </a:r>
-            <a:endParaRPr lang="de-DE" dirty="0"/>
-          </a:p>
-        </p:txBody>
-      </p:sp>
-      <p:sp>
-        <p:nvSpPr>
-          <p:cNvPr id="5" name="Fußzeilenplatzhalter 4">
-            <a:extLst>
-              <a:ext uri="{FF2B5EF4-FFF2-40B4-BE49-F238E27FC236}">
-                <a16:creationId xmlns:a16="http://schemas.microsoft.com/office/drawing/2014/main" id="{3FAF1F66-EAC1-1266-9ACA-885788282CEC}"/>
-              </a:ext>
-            </a:extLst>
-          </p:cNvPr>
-          <p:cNvSpPr>
-            <a:spLocks noGrp="1"/>
-          </p:cNvSpPr>
-          <p:nvPr>
-            <p:ph type="ftr" sz="quarter" idx="11"/>
-          </p:nvPr>
-        </p:nvSpPr>
-        <p:spPr/>
-        <p:txBody>
-          <a:bodyPr/>
-          <a:lstStyle/>
-          <a:p>
-            <a:r>
-              <a:rPr lang="de-DE"/>
-              <a:t>Sarah-Anne Teuner, Rico Steinke |  T1 / MAS |  WiSe 2022/23</a:t>
-            </a:r>
-            <a:endParaRPr lang="de-DE" dirty="0"/>
-          </a:p>
-        </p:txBody>
-      </p:sp>
-      <p:sp>
-        <p:nvSpPr>
-          <p:cNvPr id="6" name="Foliennummernplatzhalter 5">
-            <a:extLst>
-              <a:ext uri="{FF2B5EF4-FFF2-40B4-BE49-F238E27FC236}">
-                <a16:creationId xmlns:a16="http://schemas.microsoft.com/office/drawing/2014/main" id="{FC15A4F3-CE1D-71B4-B211-A117CD4C4522}"/>
-              </a:ext>
-            </a:extLst>
-          </p:cNvPr>
-          <p:cNvSpPr>
-            <a:spLocks noGrp="1"/>
-          </p:cNvSpPr>
-          <p:nvPr>
-            <p:ph type="sldNum" sz="quarter" idx="12"/>
-          </p:nvPr>
-        </p:nvSpPr>
-        <p:spPr/>
-        <p:txBody>
-          <a:bodyPr/>
-          <a:lstStyle/>
-          <a:p>
-            <a:r>
-              <a:rPr lang="de-DE"/>
-              <a:t>|  </a:t>
-            </a:r>
-            <a:fld id="{E6B5151A-17C4-4431-8407-112C0160A8B6}" type="slidenum">
-              <a:rPr lang="de-DE" smtClean="0"/>
-              <a:pPr/>
-              <a:t>6</a:t>
-            </a:fld>
-            <a:endParaRPr lang="de-DE" dirty="0"/>
-          </a:p>
-        </p:txBody>
-      </p:sp>
-      <p:sp>
-        <p:nvSpPr>
-          <p:cNvPr id="8" name="Titel 7">
-            <a:extLst>
-              <a:ext uri="{FF2B5EF4-FFF2-40B4-BE49-F238E27FC236}">
-                <a16:creationId xmlns:a16="http://schemas.microsoft.com/office/drawing/2014/main" id="{A4DA370A-F9F8-1AAB-8F9D-DE85826D91AC}"/>
-              </a:ext>
-            </a:extLst>
-          </p:cNvPr>
-          <p:cNvSpPr>
-            <a:spLocks noGrp="1"/>
-          </p:cNvSpPr>
-          <p:nvPr>
-            <p:ph type="title"/>
-          </p:nvPr>
-        </p:nvSpPr>
-        <p:spPr/>
-        <p:txBody>
-          <a:bodyPr/>
-          <a:lstStyle/>
-          <a:p>
-            <a:r>
-              <a:rPr lang="de-DE" dirty="0" err="1"/>
-              <a:t>AbbildungsVerzeichnis</a:t>
-            </a:r>
-            <a:endParaRPr lang="de-DE" dirty="0"/>
-          </a:p>
-        </p:txBody>
-      </p:sp>
-      <p:sp>
-        <p:nvSpPr>
-          <p:cNvPr id="9" name="Inhaltsplatzhalter 8">
-            <a:extLst>
-              <a:ext uri="{FF2B5EF4-FFF2-40B4-BE49-F238E27FC236}">
-                <a16:creationId xmlns:a16="http://schemas.microsoft.com/office/drawing/2014/main" id="{027FC95D-FE72-E71C-60C3-362414F19C9C}"/>
-              </a:ext>
-            </a:extLst>
-          </p:cNvPr>
-          <p:cNvSpPr>
-            <a:spLocks noGrp="1"/>
-          </p:cNvSpPr>
-          <p:nvPr>
-            <p:ph idx="13"/>
-          </p:nvPr>
-        </p:nvSpPr>
-        <p:spPr/>
-        <p:txBody>
-          <a:bodyPr/>
-          <a:lstStyle/>
-          <a:p>
-            <a:r>
-              <a:rPr lang="de-DE" b="0" i="0" dirty="0">
-                <a:effectLst/>
-                <a:latin typeface="Arial" panose="020B0604020202020204" pitchFamily="34" charset="0"/>
-              </a:rPr>
-              <a:t>1 Symbolgraphik Agile (Quelle: stock.adobe.com) . . . . . . . . . . . . . . Folie 4 </a:t>
-            </a:r>
-            <a:endParaRPr lang="de-DE" dirty="0"/>
-          </a:p>
-        </p:txBody>
-      </p:sp>
-    </p:spTree>
-    <p:extLst>
-      <p:ext uri="{BB962C8B-B14F-4D97-AF65-F5344CB8AC3E}">
-        <p14:creationId xmlns:p14="http://schemas.microsoft.com/office/powerpoint/2010/main" val="956665881"/>
-      </p:ext>
-    </p:extLst>
-  </p:cSld>
-  <p:clrMapOvr>
-    <a:masterClrMapping/>
-  </p:clrMapOvr>
-</p:sld>
-</file>
-
-<file path=ppt/slides/slide7.xml><?xml version="1.0" encoding="utf-8"?>
-<p:sld xmlns:a="http://schemas.openxmlformats.org/drawingml/2006/main" xmlns:r="http://schemas.openxmlformats.org/officeDocument/2006/relationships" xmlns:p="http://schemas.openxmlformats.org/presentationml/2006/main">
-  <p:cSld>
-    <p:spTree>
-      <p:nvGrpSpPr>
-        <p:cNvPr id="1" name=""/>
-        <p:cNvGrpSpPr/>
-        <p:nvPr/>
-      </p:nvGrpSpPr>
-      <p:grpSpPr>
-        <a:xfrm>
-          <a:off x="0" y="0"/>
-          <a:ext cx="0" cy="0"/>
-          <a:chOff x="0" y="0"/>
-          <a:chExt cx="0" cy="0"/>
-        </a:xfrm>
-      </p:grpSpPr>
-      <p:sp>
-        <p:nvSpPr>
           <p:cNvPr id="2" name="Datumsplatzhalter 1">
             <a:extLst>
               <a:ext uri="{FF2B5EF4-FFF2-40B4-BE49-F238E27FC236}">
-                <a16:creationId xmlns:a16="http://schemas.microsoft.com/office/drawing/2014/main" id="{715BFC56-E707-DCA2-9B30-20D5F047E4BD}"/>
+                <a16:creationId xmlns:a16="http://schemas.microsoft.com/office/drawing/2014/main" id="{BB1D788A-C68F-79F5-C9F2-447312A7CBD9}"/>
               </a:ext>
             </a:extLst>
           </p:cNvPr>
@@ -36162,7 +38430,7 @@
           <p:cNvPr id="3" name="Fußzeilenplatzhalter 2">
             <a:extLst>
               <a:ext uri="{FF2B5EF4-FFF2-40B4-BE49-F238E27FC236}">
-                <a16:creationId xmlns:a16="http://schemas.microsoft.com/office/drawing/2014/main" id="{92336A89-E81A-8175-D84C-9E978E13583A}"/>
+                <a16:creationId xmlns:a16="http://schemas.microsoft.com/office/drawing/2014/main" id="{EFFA12D6-C5C2-21E1-C6C9-FA2241432F1D}"/>
               </a:ext>
             </a:extLst>
           </p:cNvPr>
@@ -36191,7 +38459,644 @@
           <p:cNvPr id="4" name="Foliennummernplatzhalter 3">
             <a:extLst>
               <a:ext uri="{FF2B5EF4-FFF2-40B4-BE49-F238E27FC236}">
-                <a16:creationId xmlns:a16="http://schemas.microsoft.com/office/drawing/2014/main" id="{D152A9AF-D990-6F71-9CA5-C3C38B81FED8}"/>
+                <a16:creationId xmlns:a16="http://schemas.microsoft.com/office/drawing/2014/main" id="{8A245F5A-8BAE-F0F4-482C-831DAC8ECDE9}"/>
+              </a:ext>
+            </a:extLst>
+          </p:cNvPr>
+          <p:cNvSpPr>
+            <a:spLocks noGrp="1"/>
+          </p:cNvSpPr>
+          <p:nvPr>
+            <p:ph type="sldNum" sz="quarter" idx="12"/>
+          </p:nvPr>
+        </p:nvSpPr>
+        <p:spPr>
+          <a:xfrm>
+            <a:off x="9592988" y="6515213"/>
+            <a:ext cx="2190502" cy="216000"/>
+          </a:xfrm>
+        </p:spPr>
+        <p:txBody>
+          <a:bodyPr/>
+          <a:lstStyle/>
+          <a:p>
+            <a:r>
+              <a:rPr lang="de-DE" dirty="0"/>
+              <a:t>[</a:t>
+            </a:r>
+            <a:r>
+              <a:rPr lang="de-DE" dirty="0" err="1"/>
+              <a:t>Daberkow</a:t>
+            </a:r>
+            <a:r>
+              <a:rPr lang="de-DE" dirty="0"/>
+              <a:t>, 2022] [Abbildung 2] |  </a:t>
+            </a:r>
+            <a:fld id="{E6B5151A-17C4-4431-8407-112C0160A8B6}" type="slidenum">
+              <a:rPr lang="de-DE" smtClean="0"/>
+              <a:pPr/>
+              <a:t>6</a:t>
+            </a:fld>
+            <a:endParaRPr lang="de-DE" dirty="0"/>
+          </a:p>
+        </p:txBody>
+      </p:sp>
+      <p:sp>
+        <p:nvSpPr>
+          <p:cNvPr id="5" name="Titel 4">
+            <a:extLst>
+              <a:ext uri="{FF2B5EF4-FFF2-40B4-BE49-F238E27FC236}">
+                <a16:creationId xmlns:a16="http://schemas.microsoft.com/office/drawing/2014/main" id="{5B8A2D87-E9F2-0CAD-601F-F24CF4BBDB53}"/>
+              </a:ext>
+            </a:extLst>
+          </p:cNvPr>
+          <p:cNvSpPr>
+            <a:spLocks noGrp="1"/>
+          </p:cNvSpPr>
+          <p:nvPr>
+            <p:ph type="title"/>
+          </p:nvPr>
+        </p:nvSpPr>
+        <p:spPr/>
+        <p:txBody>
+          <a:bodyPr/>
+          <a:lstStyle/>
+          <a:p>
+            <a:r>
+              <a:rPr lang="de-DE" dirty="0"/>
+              <a:t>Einordnung in den Produktentstehungsprozess</a:t>
+            </a:r>
+            <a:endParaRPr lang="LID4096" dirty="0"/>
+          </a:p>
+        </p:txBody>
+      </p:sp>
+      <p:pic>
+        <p:nvPicPr>
+          <p:cNvPr id="8" name="Grafik 7">
+            <a:extLst>
+              <a:ext uri="{FF2B5EF4-FFF2-40B4-BE49-F238E27FC236}">
+                <a16:creationId xmlns:a16="http://schemas.microsoft.com/office/drawing/2014/main" id="{11D1B622-10B7-4830-F021-A34F10281E77}"/>
+              </a:ext>
+            </a:extLst>
+          </p:cNvPr>
+          <p:cNvPicPr>
+            <a:picLocks noChangeAspect="1"/>
+          </p:cNvPicPr>
+          <p:nvPr/>
+        </p:nvPicPr>
+        <p:blipFill>
+          <a:blip r:embed="rId2"/>
+          <a:stretch>
+            <a:fillRect/>
+          </a:stretch>
+        </p:blipFill>
+        <p:spPr>
+          <a:xfrm>
+            <a:off x="2337845" y="1964278"/>
+            <a:ext cx="7514204" cy="4337832"/>
+          </a:xfrm>
+          <a:prstGeom prst="rect">
+            <a:avLst/>
+          </a:prstGeom>
+        </p:spPr>
+      </p:pic>
+    </p:spTree>
+    <p:extLst>
+      <p:ext uri="{BB962C8B-B14F-4D97-AF65-F5344CB8AC3E}">
+        <p14:creationId xmlns:p14="http://schemas.microsoft.com/office/powerpoint/2010/main" val="3011362098"/>
+      </p:ext>
+    </p:extLst>
+  </p:cSld>
+  <p:clrMapOvr>
+    <a:masterClrMapping/>
+  </p:clrMapOvr>
+</p:sld>
+</file>
+
+<file path=ppt/slides/slide7.xml><?xml version="1.0" encoding="utf-8"?>
+<p:sld xmlns:a="http://schemas.openxmlformats.org/drawingml/2006/main" xmlns:r="http://schemas.openxmlformats.org/officeDocument/2006/relationships" xmlns:p="http://schemas.openxmlformats.org/presentationml/2006/main">
+  <p:cSld>
+    <p:spTree>
+      <p:nvGrpSpPr>
+        <p:cNvPr id="1" name=""/>
+        <p:cNvGrpSpPr/>
+        <p:nvPr/>
+      </p:nvGrpSpPr>
+      <p:grpSpPr>
+        <a:xfrm>
+          <a:off x="0" y="0"/>
+          <a:ext cx="0" cy="0"/>
+          <a:chOff x="0" y="0"/>
+          <a:chExt cx="0" cy="0"/>
+        </a:xfrm>
+      </p:grpSpPr>
+      <p:pic>
+        <p:nvPicPr>
+          <p:cNvPr id="6" name="Grafik 5">
+            <a:extLst>
+              <a:ext uri="{FF2B5EF4-FFF2-40B4-BE49-F238E27FC236}">
+                <a16:creationId xmlns:a16="http://schemas.microsoft.com/office/drawing/2014/main" id="{7CB11B9D-92EC-71DB-4D13-EC1EF168BB94}"/>
+              </a:ext>
+            </a:extLst>
+          </p:cNvPr>
+          <p:cNvPicPr>
+            <a:picLocks noChangeAspect="1"/>
+          </p:cNvPicPr>
+          <p:nvPr/>
+        </p:nvPicPr>
+        <p:blipFill rotWithShape="1">
+          <a:blip r:embed="rId2"/>
+          <a:srcRect t="32791"/>
+          <a:stretch/>
+        </p:blipFill>
+        <p:spPr>
+          <a:xfrm>
+            <a:off x="2337845" y="3521297"/>
+            <a:ext cx="7514204" cy="2915424"/>
+          </a:xfrm>
+          <a:prstGeom prst="rect">
+            <a:avLst/>
+          </a:prstGeom>
+        </p:spPr>
+      </p:pic>
+      <p:sp>
+        <p:nvSpPr>
+          <p:cNvPr id="2" name="Datumsplatzhalter 1">
+            <a:extLst>
+              <a:ext uri="{FF2B5EF4-FFF2-40B4-BE49-F238E27FC236}">
+                <a16:creationId xmlns:a16="http://schemas.microsoft.com/office/drawing/2014/main" id="{BB1D788A-C68F-79F5-C9F2-447312A7CBD9}"/>
+              </a:ext>
+            </a:extLst>
+          </p:cNvPr>
+          <p:cNvSpPr>
+            <a:spLocks noGrp="1"/>
+          </p:cNvSpPr>
+          <p:nvPr>
+            <p:ph type="dt" sz="half" idx="10"/>
+          </p:nvPr>
+        </p:nvSpPr>
+        <p:spPr/>
+        <p:txBody>
+          <a:bodyPr/>
+          <a:lstStyle/>
+          <a:p>
+            <a:r>
+              <a:rPr lang="de-DE"/>
+              <a:t>Campus Sontheim</a:t>
+            </a:r>
+            <a:endParaRPr lang="de-DE" dirty="0"/>
+          </a:p>
+        </p:txBody>
+      </p:sp>
+      <p:sp>
+        <p:nvSpPr>
+          <p:cNvPr id="3" name="Fußzeilenplatzhalter 2">
+            <a:extLst>
+              <a:ext uri="{FF2B5EF4-FFF2-40B4-BE49-F238E27FC236}">
+                <a16:creationId xmlns:a16="http://schemas.microsoft.com/office/drawing/2014/main" id="{EFFA12D6-C5C2-21E1-C6C9-FA2241432F1D}"/>
+              </a:ext>
+            </a:extLst>
+          </p:cNvPr>
+          <p:cNvSpPr>
+            <a:spLocks noGrp="1"/>
+          </p:cNvSpPr>
+          <p:nvPr>
+            <p:ph type="ftr" sz="quarter" idx="11"/>
+          </p:nvPr>
+        </p:nvSpPr>
+        <p:spPr/>
+        <p:txBody>
+          <a:bodyPr/>
+          <a:lstStyle/>
+          <a:p>
+            <a:r>
+              <a:rPr lang="de-DE"/>
+              <a:t>Sarah-Anne Teuner, Rico Steinke |  T1 / MAS |  WiSe 2022/23</a:t>
+            </a:r>
+            <a:endParaRPr lang="de-DE" dirty="0"/>
+          </a:p>
+        </p:txBody>
+      </p:sp>
+      <p:sp>
+        <p:nvSpPr>
+          <p:cNvPr id="4" name="Foliennummernplatzhalter 3">
+            <a:extLst>
+              <a:ext uri="{FF2B5EF4-FFF2-40B4-BE49-F238E27FC236}">
+                <a16:creationId xmlns:a16="http://schemas.microsoft.com/office/drawing/2014/main" id="{8A245F5A-8BAE-F0F4-482C-831DAC8ECDE9}"/>
+              </a:ext>
+            </a:extLst>
+          </p:cNvPr>
+          <p:cNvSpPr>
+            <a:spLocks noGrp="1"/>
+          </p:cNvSpPr>
+          <p:nvPr>
+            <p:ph type="sldNum" sz="quarter" idx="12"/>
+          </p:nvPr>
+        </p:nvSpPr>
+        <p:spPr/>
+        <p:txBody>
+          <a:bodyPr/>
+          <a:lstStyle/>
+          <a:p>
+            <a:r>
+              <a:rPr lang="de-DE" dirty="0"/>
+              <a:t>|  </a:t>
+            </a:r>
+            <a:fld id="{E6B5151A-17C4-4431-8407-112C0160A8B6}" type="slidenum">
+              <a:rPr lang="de-DE" smtClean="0"/>
+              <a:pPr/>
+              <a:t>7</a:t>
+            </a:fld>
+            <a:endParaRPr lang="de-DE" dirty="0"/>
+          </a:p>
+        </p:txBody>
+      </p:sp>
+      <p:sp>
+        <p:nvSpPr>
+          <p:cNvPr id="5" name="Titel 4">
+            <a:extLst>
+              <a:ext uri="{FF2B5EF4-FFF2-40B4-BE49-F238E27FC236}">
+                <a16:creationId xmlns:a16="http://schemas.microsoft.com/office/drawing/2014/main" id="{5B8A2D87-E9F2-0CAD-601F-F24CF4BBDB53}"/>
+              </a:ext>
+            </a:extLst>
+          </p:cNvPr>
+          <p:cNvSpPr>
+            <a:spLocks noGrp="1"/>
+          </p:cNvSpPr>
+          <p:nvPr>
+            <p:ph type="title"/>
+          </p:nvPr>
+        </p:nvSpPr>
+        <p:spPr/>
+        <p:txBody>
+          <a:bodyPr/>
+          <a:lstStyle/>
+          <a:p>
+            <a:r>
+              <a:rPr lang="de-DE" dirty="0"/>
+              <a:t>Einordnung in den Produktentstehungsprozess</a:t>
+            </a:r>
+            <a:endParaRPr lang="LID4096" dirty="0"/>
+          </a:p>
+        </p:txBody>
+      </p:sp>
+      <p:pic>
+        <p:nvPicPr>
+          <p:cNvPr id="10" name="Grafik 9">
+            <a:extLst>
+              <a:ext uri="{FF2B5EF4-FFF2-40B4-BE49-F238E27FC236}">
+                <a16:creationId xmlns:a16="http://schemas.microsoft.com/office/drawing/2014/main" id="{4F406F38-8A91-3044-8303-E08F58ADAF21}"/>
+              </a:ext>
+            </a:extLst>
+          </p:cNvPr>
+          <p:cNvPicPr>
+            <a:picLocks noChangeAspect="1"/>
+          </p:cNvPicPr>
+          <p:nvPr/>
+        </p:nvPicPr>
+        <p:blipFill rotWithShape="1">
+          <a:blip r:embed="rId2"/>
+          <a:srcRect t="1185" b="67609"/>
+          <a:stretch/>
+        </p:blipFill>
+        <p:spPr>
+          <a:xfrm>
+            <a:off x="2337845" y="1840617"/>
+            <a:ext cx="7514204" cy="1353687"/>
+          </a:xfrm>
+          <a:prstGeom prst="rect">
+            <a:avLst/>
+          </a:prstGeom>
+        </p:spPr>
+      </p:pic>
+      <p:sp>
+        <p:nvSpPr>
+          <p:cNvPr id="11" name="Pfeil: Fünfeck 10">
+            <a:extLst>
+              <a:ext uri="{FF2B5EF4-FFF2-40B4-BE49-F238E27FC236}">
+                <a16:creationId xmlns:a16="http://schemas.microsoft.com/office/drawing/2014/main" id="{0D723A3E-28AD-2C75-827C-29C1F76C6F77}"/>
+              </a:ext>
+            </a:extLst>
+          </p:cNvPr>
+          <p:cNvSpPr/>
+          <p:nvPr/>
+        </p:nvSpPr>
+        <p:spPr>
+          <a:xfrm>
+            <a:off x="3692027" y="3231337"/>
+            <a:ext cx="5322319" cy="264853"/>
+          </a:xfrm>
+          <a:prstGeom prst="homePlate">
+            <a:avLst>
+              <a:gd name="adj" fmla="val 33962"/>
+            </a:avLst>
+          </a:prstGeom>
+          <a:solidFill>
+            <a:schemeClr val="accent1"/>
+          </a:solidFill>
+          <a:ln>
+            <a:noFill/>
+          </a:ln>
+        </p:spPr>
+        <p:style>
+          <a:lnRef idx="2">
+            <a:schemeClr val="accent1">
+              <a:shade val="50000"/>
+            </a:schemeClr>
+          </a:lnRef>
+          <a:fillRef idx="1">
+            <a:schemeClr val="accent1"/>
+          </a:fillRef>
+          <a:effectRef idx="0">
+            <a:schemeClr val="accent1"/>
+          </a:effectRef>
+          <a:fontRef idx="minor">
+            <a:schemeClr val="lt1"/>
+          </a:fontRef>
+        </p:style>
+        <p:txBody>
+          <a:bodyPr rtlCol="0" anchor="ctr"/>
+          <a:lstStyle/>
+          <a:p>
+            <a:pPr algn="ctr"/>
+            <a:r>
+              <a:rPr lang="de-DE" sz="1400" b="1" dirty="0"/>
+              <a:t>Entwicklung Konstruktion Software</a:t>
+            </a:r>
+            <a:endParaRPr lang="LID4096" sz="1400" b="1" dirty="0"/>
+          </a:p>
+        </p:txBody>
+      </p:sp>
+      <p:sp>
+        <p:nvSpPr>
+          <p:cNvPr id="7" name="Rechteck 6">
+            <a:extLst>
+              <a:ext uri="{FF2B5EF4-FFF2-40B4-BE49-F238E27FC236}">
+                <a16:creationId xmlns:a16="http://schemas.microsoft.com/office/drawing/2014/main" id="{1D8A226C-ACF6-8C46-EBBF-6EB7C4BA6479}"/>
+              </a:ext>
+            </a:extLst>
+          </p:cNvPr>
+          <p:cNvSpPr/>
+          <p:nvPr/>
+        </p:nvSpPr>
+        <p:spPr>
+          <a:xfrm>
+            <a:off x="2458477" y="3011497"/>
+            <a:ext cx="416134" cy="662529"/>
+          </a:xfrm>
+          <a:prstGeom prst="rect">
+            <a:avLst/>
+          </a:prstGeom>
+          <a:solidFill>
+            <a:srgbClr val="2876C9"/>
+          </a:solidFill>
+          <a:ln>
+            <a:noFill/>
+          </a:ln>
+        </p:spPr>
+        <p:style>
+          <a:lnRef idx="2">
+            <a:schemeClr val="accent1">
+              <a:shade val="50000"/>
+            </a:schemeClr>
+          </a:lnRef>
+          <a:fillRef idx="1">
+            <a:schemeClr val="accent1"/>
+          </a:fillRef>
+          <a:effectRef idx="0">
+            <a:schemeClr val="accent1"/>
+          </a:effectRef>
+          <a:fontRef idx="minor">
+            <a:schemeClr val="lt1"/>
+          </a:fontRef>
+        </p:style>
+        <p:txBody>
+          <a:bodyPr rtlCol="0" anchor="ctr"/>
+          <a:lstStyle/>
+          <a:p>
+            <a:pPr algn="ctr"/>
+            <a:endParaRPr lang="LID4096"/>
+          </a:p>
+        </p:txBody>
+      </p:sp>
+    </p:spTree>
+    <p:extLst>
+      <p:ext uri="{BB962C8B-B14F-4D97-AF65-F5344CB8AC3E}">
+        <p14:creationId xmlns:p14="http://schemas.microsoft.com/office/powerpoint/2010/main" val="648024974"/>
+      </p:ext>
+    </p:extLst>
+  </p:cSld>
+  <p:clrMapOvr>
+    <a:masterClrMapping/>
+  </p:clrMapOvr>
+  <p:timing>
+    <p:tnLst>
+      <p:par>
+        <p:cTn id="1" dur="indefinite" restart="never" nodeType="tmRoot">
+          <p:childTnLst>
+            <p:seq concurrent="1" nextAc="seek">
+              <p:cTn id="2" dur="indefinite" nodeType="mainSeq">
+                <p:childTnLst>
+                  <p:par>
+                    <p:cTn id="3" fill="hold">
+                      <p:stCondLst>
+                        <p:cond delay="indefinite"/>
+                      </p:stCondLst>
+                      <p:childTnLst>
+                        <p:par>
+                          <p:cTn id="4" fill="hold">
+                            <p:stCondLst>
+                              <p:cond delay="0"/>
+                            </p:stCondLst>
+                            <p:childTnLst>
+                              <p:par>
+                                <p:cTn id="5" presetID="2" presetClass="entr" presetSubtype="4" fill="hold" grpId="0" nodeType="clickEffect">
+                                  <p:stCondLst>
+                                    <p:cond delay="0"/>
+                                  </p:stCondLst>
+                                  <p:childTnLst>
+                                    <p:set>
+                                      <p:cBhvr>
+                                        <p:cTn id="6" dur="1" fill="hold">
+                                          <p:stCondLst>
+                                            <p:cond delay="0"/>
+                                          </p:stCondLst>
+                                        </p:cTn>
+                                        <p:tgtEl>
+                                          <p:spTgt spid="11"/>
+                                        </p:tgtEl>
+                                        <p:attrNameLst>
+                                          <p:attrName>style.visibility</p:attrName>
+                                        </p:attrNameLst>
+                                      </p:cBhvr>
+                                      <p:to>
+                                        <p:strVal val="visible"/>
+                                      </p:to>
+                                    </p:set>
+                                    <p:anim calcmode="lin" valueType="num">
+                                      <p:cBhvr additive="base">
+                                        <p:cTn id="7" dur="750" fill="hold"/>
+                                        <p:tgtEl>
+                                          <p:spTgt spid="11"/>
+                                        </p:tgtEl>
+                                        <p:attrNameLst>
+                                          <p:attrName>ppt_x</p:attrName>
+                                        </p:attrNameLst>
+                                      </p:cBhvr>
+                                      <p:tavLst>
+                                        <p:tav tm="0">
+                                          <p:val>
+                                            <p:strVal val="#ppt_x"/>
+                                          </p:val>
+                                        </p:tav>
+                                        <p:tav tm="100000">
+                                          <p:val>
+                                            <p:strVal val="#ppt_x"/>
+                                          </p:val>
+                                        </p:tav>
+                                      </p:tavLst>
+                                    </p:anim>
+                                    <p:anim calcmode="lin" valueType="num">
+                                      <p:cBhvr additive="base">
+                                        <p:cTn id="8" dur="750" fill="hold"/>
+                                        <p:tgtEl>
+                                          <p:spTgt spid="11"/>
+                                        </p:tgtEl>
+                                        <p:attrNameLst>
+                                          <p:attrName>ppt_y</p:attrName>
+                                        </p:attrNameLst>
+                                      </p:cBhvr>
+                                      <p:tavLst>
+                                        <p:tav tm="0">
+                                          <p:val>
+                                            <p:strVal val="1+#ppt_h/2"/>
+                                          </p:val>
+                                        </p:tav>
+                                        <p:tav tm="100000">
+                                          <p:val>
+                                            <p:strVal val="#ppt_y"/>
+                                          </p:val>
+                                        </p:tav>
+                                      </p:tavLst>
+                                    </p:anim>
+                                  </p:childTnLst>
+                                </p:cTn>
+                              </p:par>
+                            </p:childTnLst>
+                          </p:cTn>
+                        </p:par>
+                      </p:childTnLst>
+                    </p:cTn>
+                  </p:par>
+                </p:childTnLst>
+              </p:cTn>
+              <p:prevCondLst>
+                <p:cond evt="onPrev" delay="0">
+                  <p:tgtEl>
+                    <p:sldTgt/>
+                  </p:tgtEl>
+                </p:cond>
+              </p:prevCondLst>
+              <p:nextCondLst>
+                <p:cond evt="onNext" delay="0">
+                  <p:tgtEl>
+                    <p:sldTgt/>
+                  </p:tgtEl>
+                </p:cond>
+              </p:nextCondLst>
+            </p:seq>
+          </p:childTnLst>
+        </p:cTn>
+      </p:par>
+    </p:tnLst>
+    <p:bldLst>
+      <p:bldP spid="11" grpId="0" animBg="1"/>
+    </p:bldLst>
+  </p:timing>
+</p:sld>
+</file>
+
+<file path=ppt/slides/slide8.xml><?xml version="1.0" encoding="utf-8"?>
+<p:sld xmlns:a="http://schemas.openxmlformats.org/drawingml/2006/main" xmlns:r="http://schemas.openxmlformats.org/officeDocument/2006/relationships" xmlns:p="http://schemas.openxmlformats.org/presentationml/2006/main" show="0">
+  <p:cSld>
+    <p:spTree>
+      <p:nvGrpSpPr>
+        <p:cNvPr id="1" name=""/>
+        <p:cNvGrpSpPr/>
+        <p:nvPr/>
+      </p:nvGrpSpPr>
+      <p:grpSpPr>
+        <a:xfrm>
+          <a:off x="0" y="0"/>
+          <a:ext cx="0" cy="0"/>
+          <a:chOff x="0" y="0"/>
+          <a:chExt cx="0" cy="0"/>
+        </a:xfrm>
+      </p:grpSpPr>
+      <p:sp>
+        <p:nvSpPr>
+          <p:cNvPr id="2" name="Datumsplatzhalter 1">
+            <a:extLst>
+              <a:ext uri="{FF2B5EF4-FFF2-40B4-BE49-F238E27FC236}">
+                <a16:creationId xmlns:a16="http://schemas.microsoft.com/office/drawing/2014/main" id="{BB1D788A-C68F-79F5-C9F2-447312A7CBD9}"/>
+              </a:ext>
+            </a:extLst>
+          </p:cNvPr>
+          <p:cNvSpPr>
+            <a:spLocks noGrp="1"/>
+          </p:cNvSpPr>
+          <p:nvPr>
+            <p:ph type="dt" sz="half" idx="10"/>
+          </p:nvPr>
+        </p:nvSpPr>
+        <p:spPr/>
+        <p:txBody>
+          <a:bodyPr/>
+          <a:lstStyle/>
+          <a:p>
+            <a:r>
+              <a:rPr lang="de-DE"/>
+              <a:t>Campus Sontheim</a:t>
+            </a:r>
+            <a:endParaRPr lang="de-DE" dirty="0"/>
+          </a:p>
+        </p:txBody>
+      </p:sp>
+      <p:sp>
+        <p:nvSpPr>
+          <p:cNvPr id="3" name="Fußzeilenplatzhalter 2">
+            <a:extLst>
+              <a:ext uri="{FF2B5EF4-FFF2-40B4-BE49-F238E27FC236}">
+                <a16:creationId xmlns:a16="http://schemas.microsoft.com/office/drawing/2014/main" id="{EFFA12D6-C5C2-21E1-C6C9-FA2241432F1D}"/>
+              </a:ext>
+            </a:extLst>
+          </p:cNvPr>
+          <p:cNvSpPr>
+            <a:spLocks noGrp="1"/>
+          </p:cNvSpPr>
+          <p:nvPr>
+            <p:ph type="ftr" sz="quarter" idx="11"/>
+          </p:nvPr>
+        </p:nvSpPr>
+        <p:spPr/>
+        <p:txBody>
+          <a:bodyPr/>
+          <a:lstStyle/>
+          <a:p>
+            <a:r>
+              <a:rPr lang="de-DE"/>
+              <a:t>Sarah-Anne Teuner, Rico Steinke |  T1 / MAS |  WiSe 2022/23</a:t>
+            </a:r>
+            <a:endParaRPr lang="de-DE" dirty="0"/>
+          </a:p>
+        </p:txBody>
+      </p:sp>
+      <p:sp>
+        <p:nvSpPr>
+          <p:cNvPr id="4" name="Foliennummernplatzhalter 3">
+            <a:extLst>
+              <a:ext uri="{FF2B5EF4-FFF2-40B4-BE49-F238E27FC236}">
+                <a16:creationId xmlns:a16="http://schemas.microsoft.com/office/drawing/2014/main" id="{8A245F5A-8BAE-F0F4-482C-831DAC8ECDE9}"/>
               </a:ext>
             </a:extLst>
           </p:cNvPr>
@@ -36214,7 +39119,7 @@
             <a:fld id="{E6B5151A-17C4-4431-8407-112C0160A8B6}" type="slidenum">
               <a:rPr lang="de-DE" smtClean="0"/>
               <a:pPr/>
-              <a:t>7</a:t>
+              <a:t>8</a:t>
             </a:fld>
             <a:endParaRPr lang="de-DE" dirty="0"/>
           </a:p>
@@ -36225,7 +39130,7 @@
           <p:cNvPr id="5" name="Titel 4">
             <a:extLst>
               <a:ext uri="{FF2B5EF4-FFF2-40B4-BE49-F238E27FC236}">
-                <a16:creationId xmlns:a16="http://schemas.microsoft.com/office/drawing/2014/main" id="{25A1D4C8-876A-2FA2-821C-89B88EC1BD6A}"/>
+                <a16:creationId xmlns:a16="http://schemas.microsoft.com/office/drawing/2014/main" id="{5B8A2D87-E9F2-0CAD-601F-F24CF4BBDB53}"/>
               </a:ext>
             </a:extLst>
           </p:cNvPr>
@@ -36243,8 +39148,9 @@
           <a:p>
             <a:r>
               <a:rPr lang="de-DE" dirty="0"/>
-              <a:t>Literaturverzeichnis</a:t>
+              <a:t>Einordnung in den Produktentstehungsprozess</a:t>
             </a:r>
+            <a:endParaRPr lang="LID4096" dirty="0"/>
           </a:p>
         </p:txBody>
       </p:sp>
@@ -36253,7 +39159,7 @@
           <p:cNvPr id="6" name="Inhaltsplatzhalter 5">
             <a:extLst>
               <a:ext uri="{FF2B5EF4-FFF2-40B4-BE49-F238E27FC236}">
-                <a16:creationId xmlns:a16="http://schemas.microsoft.com/office/drawing/2014/main" id="{3E7EDE6D-9992-6245-5C0C-4BFD2B763B39}"/>
+                <a16:creationId xmlns:a16="http://schemas.microsoft.com/office/drawing/2014/main" id="{4D0C46E6-5705-FEE9-ECA0-BDD549783C5C}"/>
               </a:ext>
             </a:extLst>
           </p:cNvPr>
@@ -36269,393 +39175,46 @@
           <a:bodyPr/>
           <a:lstStyle/>
           <a:p>
+            <a:pPr marL="342900" indent="-342900">
+              <a:buFont typeface="Arial" panose="020B0604020202020204" pitchFamily="34" charset="0"/>
+              <a:buChar char="•"/>
+            </a:pPr>
             <a:r>
-              <a:rPr lang="de-DE" sz="1400" b="0" i="0" dirty="0">
-                <a:effectLst/>
-                <a:latin typeface="Arial" panose="020B0604020202020204" pitchFamily="34" charset="0"/>
-                <a:cs typeface="Arial" panose="020B0604020202020204" pitchFamily="34" charset="0"/>
-              </a:rPr>
-              <a:t>[1] A. </a:t>
+              <a:rPr lang="de-DE" dirty="0"/>
+              <a:t>Prozesse in der Produktentstehung unterliegen ständigen Optimierungen hinsichtlich Zeit-, Kostenersparnis und Verbesserung der Qualität</a:t>
             </a:r>
+          </a:p>
+          <a:p>
+            <a:pPr marL="342900" indent="-342900">
+              <a:buFont typeface="Arial" panose="020B0604020202020204" pitchFamily="34" charset="0"/>
+              <a:buChar char="•"/>
+            </a:pPr>
             <a:r>
-              <a:rPr lang="de-DE" sz="1400" b="0" i="0" dirty="0" err="1">
-                <a:effectLst/>
-                <a:latin typeface="Arial" panose="020B0604020202020204" pitchFamily="34" charset="0"/>
-                <a:cs typeface="Arial" panose="020B0604020202020204" pitchFamily="34" charset="0"/>
-              </a:rPr>
-              <a:t>Schloßer</a:t>
+              <a:rPr lang="de-DE" dirty="0"/>
+              <a:t>(Um diese hohe Komplexität im Entwicklungsprozesse zu beherrschen, ist der zielgerichtete Einsatz von IT-Tools unverzichtbar)</a:t>
             </a:r>
+          </a:p>
+          <a:p>
+            <a:pPr marL="342900" indent="-342900">
+              <a:buFont typeface="Arial" panose="020B0604020202020204" pitchFamily="34" charset="0"/>
+              <a:buChar char="•"/>
+            </a:pPr>
             <a:r>
-              <a:rPr lang="de-DE" sz="1400" b="0" i="0" dirty="0">
-                <a:effectLst/>
-                <a:latin typeface="Arial" panose="020B0604020202020204" pitchFamily="34" charset="0"/>
-                <a:cs typeface="Arial" panose="020B0604020202020204" pitchFamily="34" charset="0"/>
-              </a:rPr>
-              <a:t>, J. Schnitzler, T. Sentis, and J. Richenhagen, “Agile </a:t>
+              <a:rPr lang="de-DE" dirty="0"/>
+              <a:t>Die Prozesse und Schnittstellen werden an die Anforderungen im Produktentstehungsprozess angepasst</a:t>
             </a:r>
+          </a:p>
+          <a:p>
+            <a:pPr marL="342900" indent="-342900">
+              <a:buFont typeface="Arial" panose="020B0604020202020204" pitchFamily="34" charset="0"/>
+              <a:buChar char="•"/>
+            </a:pPr>
             <a:r>
-              <a:rPr lang="de-DE" sz="1400" b="0" i="0" dirty="0" err="1">
-                <a:effectLst/>
-                <a:latin typeface="Arial" panose="020B0604020202020204" pitchFamily="34" charset="0"/>
-                <a:cs typeface="Arial" panose="020B0604020202020204" pitchFamily="34" charset="0"/>
-              </a:rPr>
-              <a:t>processes</a:t>
+              <a:rPr lang="de-DE" dirty="0"/>
+              <a:t>Heute ist als Unternehmensstruktur das Cross Enterprise Engineering üblich, hier werden die Organisationseinheiten miteinander vernetzt um parallel an einem Produkt zu arbeiten (siehe Entwicklungsfolie S. 29)</a:t>
             </a:r>
-            <a:r>
-              <a:rPr lang="de-DE" sz="1400" b="0" i="0" dirty="0">
-                <a:effectLst/>
-                <a:latin typeface="Arial" panose="020B0604020202020204" pitchFamily="34" charset="0"/>
-                <a:cs typeface="Arial" panose="020B0604020202020204" pitchFamily="34" charset="0"/>
-              </a:rPr>
-              <a:t> in </a:t>
-            </a:r>
-            <a:r>
-              <a:rPr lang="de-DE" sz="1400" b="0" i="0" dirty="0" err="1">
-                <a:effectLst/>
-                <a:latin typeface="Arial" panose="020B0604020202020204" pitchFamily="34" charset="0"/>
-                <a:cs typeface="Arial" panose="020B0604020202020204" pitchFamily="34" charset="0"/>
-              </a:rPr>
-              <a:t>automotive</a:t>
-            </a:r>
-            <a:r>
-              <a:rPr lang="de-DE" sz="1400" b="0" i="0" dirty="0">
-                <a:effectLst/>
-                <a:latin typeface="Arial" panose="020B0604020202020204" pitchFamily="34" charset="0"/>
-                <a:cs typeface="Arial" panose="020B0604020202020204" pitchFamily="34" charset="0"/>
-              </a:rPr>
-              <a:t> </a:t>
-            </a:r>
-            <a:r>
-              <a:rPr lang="de-DE" sz="1400" b="0" i="0" dirty="0" err="1">
-                <a:effectLst/>
-                <a:latin typeface="Arial" panose="020B0604020202020204" pitchFamily="34" charset="0"/>
-                <a:cs typeface="Arial" panose="020B0604020202020204" pitchFamily="34" charset="0"/>
-              </a:rPr>
-              <a:t>industry</a:t>
-            </a:r>
-            <a:r>
-              <a:rPr lang="de-DE" sz="1400" b="0" i="0" dirty="0">
-                <a:effectLst/>
-                <a:latin typeface="Arial" panose="020B0604020202020204" pitchFamily="34" charset="0"/>
-                <a:cs typeface="Arial" panose="020B0604020202020204" pitchFamily="34" charset="0"/>
-              </a:rPr>
-              <a:t> – </a:t>
-            </a:r>
-            <a:r>
-              <a:rPr lang="de-DE" sz="1400" b="0" i="0" dirty="0" err="1">
-                <a:effectLst/>
-                <a:latin typeface="Arial" panose="020B0604020202020204" pitchFamily="34" charset="0"/>
-                <a:cs typeface="Arial" panose="020B0604020202020204" pitchFamily="34" charset="0"/>
-              </a:rPr>
-              <a:t>efficiency</a:t>
-            </a:r>
-            <a:r>
-              <a:rPr lang="de-DE" sz="1400" b="0" i="0" dirty="0">
-                <a:effectLst/>
-                <a:latin typeface="Arial" panose="020B0604020202020204" pitchFamily="34" charset="0"/>
-                <a:cs typeface="Arial" panose="020B0604020202020204" pitchFamily="34" charset="0"/>
-              </a:rPr>
-              <a:t> and </a:t>
-            </a:r>
-            <a:r>
-              <a:rPr lang="de-DE" sz="1400" b="0" i="0" dirty="0" err="1">
-                <a:effectLst/>
-                <a:latin typeface="Arial" panose="020B0604020202020204" pitchFamily="34" charset="0"/>
-                <a:cs typeface="Arial" panose="020B0604020202020204" pitchFamily="34" charset="0"/>
-              </a:rPr>
-              <a:t>quality</a:t>
-            </a:r>
-            <a:r>
-              <a:rPr lang="de-DE" sz="1400" b="0" i="0" dirty="0">
-                <a:effectLst/>
-                <a:latin typeface="Arial" panose="020B0604020202020204" pitchFamily="34" charset="0"/>
-                <a:cs typeface="Arial" panose="020B0604020202020204" pitchFamily="34" charset="0"/>
-              </a:rPr>
-              <a:t> in </a:t>
-            </a:r>
-            <a:r>
-              <a:rPr lang="de-DE" sz="1400" b="0" i="0" dirty="0" err="1">
-                <a:effectLst/>
-                <a:latin typeface="Arial" panose="020B0604020202020204" pitchFamily="34" charset="0"/>
-                <a:cs typeface="Arial" panose="020B0604020202020204" pitchFamily="34" charset="0"/>
-              </a:rPr>
-              <a:t>software</a:t>
-            </a:r>
-            <a:r>
-              <a:rPr lang="de-DE" sz="1400" b="0" i="0" dirty="0">
-                <a:effectLst/>
-                <a:latin typeface="Arial" panose="020B0604020202020204" pitchFamily="34" charset="0"/>
-                <a:cs typeface="Arial" panose="020B0604020202020204" pitchFamily="34" charset="0"/>
-              </a:rPr>
-              <a:t> </a:t>
-            </a:r>
-            <a:r>
-              <a:rPr lang="de-DE" sz="1400" b="0" i="0" dirty="0" err="1">
-                <a:effectLst/>
-                <a:latin typeface="Arial" panose="020B0604020202020204" pitchFamily="34" charset="0"/>
-                <a:cs typeface="Arial" panose="020B0604020202020204" pitchFamily="34" charset="0"/>
-              </a:rPr>
-              <a:t>development</a:t>
-            </a:r>
-            <a:r>
-              <a:rPr lang="de-DE" sz="1400" b="0" i="0" dirty="0">
-                <a:effectLst/>
-                <a:latin typeface="Arial" panose="020B0604020202020204" pitchFamily="34" charset="0"/>
-                <a:cs typeface="Arial" panose="020B0604020202020204" pitchFamily="34" charset="0"/>
-              </a:rPr>
-              <a:t>,” in 16. Internationales Stuttgarter Symposium (M. </a:t>
-            </a:r>
-            <a:r>
-              <a:rPr lang="de-DE" sz="1400" b="0" i="0" dirty="0" err="1">
-                <a:effectLst/>
-                <a:latin typeface="Arial" panose="020B0604020202020204" pitchFamily="34" charset="0"/>
-                <a:cs typeface="Arial" panose="020B0604020202020204" pitchFamily="34" charset="0"/>
-              </a:rPr>
-              <a:t>Bargende</a:t>
-            </a:r>
-            <a:r>
-              <a:rPr lang="de-DE" sz="1400" b="0" i="0" dirty="0">
-                <a:effectLst/>
-                <a:latin typeface="Arial" panose="020B0604020202020204" pitchFamily="34" charset="0"/>
-                <a:cs typeface="Arial" panose="020B0604020202020204" pitchFamily="34" charset="0"/>
-              </a:rPr>
-              <a:t>, H.-C. </a:t>
-            </a:r>
-            <a:r>
-              <a:rPr lang="de-DE" sz="1400" b="0" i="0" dirty="0" err="1">
-                <a:effectLst/>
-                <a:latin typeface="Arial" panose="020B0604020202020204" pitchFamily="34" charset="0"/>
-                <a:cs typeface="Arial" panose="020B0604020202020204" pitchFamily="34" charset="0"/>
-              </a:rPr>
-              <a:t>Reuss</a:t>
-            </a:r>
-            <a:r>
-              <a:rPr lang="de-DE" sz="1400" b="0" i="0" dirty="0">
-                <a:effectLst/>
-                <a:latin typeface="Arial" panose="020B0604020202020204" pitchFamily="34" charset="0"/>
-                <a:cs typeface="Arial" panose="020B0604020202020204" pitchFamily="34" charset="0"/>
-              </a:rPr>
-              <a:t>, and J. Wiedemann, </a:t>
-            </a:r>
-            <a:r>
-              <a:rPr lang="de-DE" sz="1400" b="0" i="0" dirty="0" err="1">
-                <a:effectLst/>
-                <a:latin typeface="Arial" panose="020B0604020202020204" pitchFamily="34" charset="0"/>
-                <a:cs typeface="Arial" panose="020B0604020202020204" pitchFamily="34" charset="0"/>
-              </a:rPr>
-              <a:t>eds</a:t>
-            </a:r>
-            <a:r>
-              <a:rPr lang="de-DE" sz="1400" b="0" i="0" dirty="0">
-                <a:effectLst/>
-                <a:latin typeface="Arial" panose="020B0604020202020204" pitchFamily="34" charset="0"/>
-                <a:cs typeface="Arial" panose="020B0604020202020204" pitchFamily="34" charset="0"/>
-              </a:rPr>
-              <a:t>.), (Wiesbaden), pp. 489–503, Springer Fachmedien Wiesbaden, 2016.</a:t>
-            </a:r>
-            <a:br>
-              <a:rPr lang="de-DE" sz="1400" dirty="0">
-                <a:latin typeface="Arial" panose="020B0604020202020204" pitchFamily="34" charset="0"/>
-                <a:cs typeface="Arial" panose="020B0604020202020204" pitchFamily="34" charset="0"/>
-              </a:rPr>
-            </a:br>
-            <a:r>
-              <a:rPr lang="de-DE" sz="1400" b="0" i="0" dirty="0">
-                <a:effectLst/>
-                <a:latin typeface="Arial" panose="020B0604020202020204" pitchFamily="34" charset="0"/>
-                <a:cs typeface="Arial" panose="020B0604020202020204" pitchFamily="34" charset="0"/>
-              </a:rPr>
-              <a:t>[2] B. </a:t>
-            </a:r>
-            <a:r>
-              <a:rPr lang="de-DE" sz="1400" b="0" i="0" dirty="0" err="1">
-                <a:effectLst/>
-                <a:latin typeface="Arial" panose="020B0604020202020204" pitchFamily="34" charset="0"/>
-                <a:cs typeface="Arial" panose="020B0604020202020204" pitchFamily="34" charset="0"/>
-              </a:rPr>
-              <a:t>Katumba</a:t>
-            </a:r>
-            <a:r>
-              <a:rPr lang="de-DE" sz="1400" b="0" i="0" dirty="0">
-                <a:effectLst/>
-                <a:latin typeface="Arial" panose="020B0604020202020204" pitchFamily="34" charset="0"/>
-                <a:cs typeface="Arial" panose="020B0604020202020204" pitchFamily="34" charset="0"/>
-              </a:rPr>
-              <a:t> and E. Knauss, “Agile </a:t>
-            </a:r>
-            <a:r>
-              <a:rPr lang="de-DE" sz="1400" b="0" i="0" dirty="0" err="1">
-                <a:effectLst/>
-                <a:latin typeface="Arial" panose="020B0604020202020204" pitchFamily="34" charset="0"/>
-                <a:cs typeface="Arial" panose="020B0604020202020204" pitchFamily="34" charset="0"/>
-              </a:rPr>
-              <a:t>development</a:t>
-            </a:r>
-            <a:r>
-              <a:rPr lang="de-DE" sz="1400" b="0" i="0" dirty="0">
-                <a:effectLst/>
-                <a:latin typeface="Arial" panose="020B0604020202020204" pitchFamily="34" charset="0"/>
-                <a:cs typeface="Arial" panose="020B0604020202020204" pitchFamily="34" charset="0"/>
-              </a:rPr>
-              <a:t> in </a:t>
-            </a:r>
-            <a:r>
-              <a:rPr lang="de-DE" sz="1400" b="0" i="0" dirty="0" err="1">
-                <a:effectLst/>
-                <a:latin typeface="Arial" panose="020B0604020202020204" pitchFamily="34" charset="0"/>
-                <a:cs typeface="Arial" panose="020B0604020202020204" pitchFamily="34" charset="0"/>
-              </a:rPr>
-              <a:t>automotive</a:t>
-            </a:r>
-            <a:r>
-              <a:rPr lang="de-DE" sz="1400" b="0" i="0" dirty="0">
-                <a:effectLst/>
-                <a:latin typeface="Arial" panose="020B0604020202020204" pitchFamily="34" charset="0"/>
-                <a:cs typeface="Arial" panose="020B0604020202020204" pitchFamily="34" charset="0"/>
-              </a:rPr>
-              <a:t> </a:t>
-            </a:r>
-            <a:r>
-              <a:rPr lang="de-DE" sz="1400" b="0" i="0" dirty="0" err="1">
-                <a:effectLst/>
-                <a:latin typeface="Arial" panose="020B0604020202020204" pitchFamily="34" charset="0"/>
-                <a:cs typeface="Arial" panose="020B0604020202020204" pitchFamily="34" charset="0"/>
-              </a:rPr>
-              <a:t>software</a:t>
-            </a:r>
-            <a:r>
-              <a:rPr lang="de-DE" sz="1400" b="0" i="0" dirty="0">
-                <a:effectLst/>
-                <a:latin typeface="Arial" panose="020B0604020202020204" pitchFamily="34" charset="0"/>
-                <a:cs typeface="Arial" panose="020B0604020202020204" pitchFamily="34" charset="0"/>
-              </a:rPr>
-              <a:t> </a:t>
-            </a:r>
-            <a:r>
-              <a:rPr lang="de-DE" sz="1400" b="0" i="0" dirty="0" err="1">
-                <a:effectLst/>
-                <a:latin typeface="Arial" panose="020B0604020202020204" pitchFamily="34" charset="0"/>
-                <a:cs typeface="Arial" panose="020B0604020202020204" pitchFamily="34" charset="0"/>
-              </a:rPr>
-              <a:t>development</a:t>
-            </a:r>
-            <a:r>
-              <a:rPr lang="de-DE" sz="1400" b="0" i="0" dirty="0">
-                <a:effectLst/>
-                <a:latin typeface="Arial" panose="020B0604020202020204" pitchFamily="34" charset="0"/>
-                <a:cs typeface="Arial" panose="020B0604020202020204" pitchFamily="34" charset="0"/>
-              </a:rPr>
-              <a:t>: Challenges and </a:t>
-            </a:r>
-            <a:r>
-              <a:rPr lang="de-DE" sz="1400" b="0" i="0" dirty="0" err="1">
-                <a:effectLst/>
-                <a:latin typeface="Arial" panose="020B0604020202020204" pitchFamily="34" charset="0"/>
-                <a:cs typeface="Arial" panose="020B0604020202020204" pitchFamily="34" charset="0"/>
-              </a:rPr>
-              <a:t>opportunities</a:t>
-            </a:r>
-            <a:r>
-              <a:rPr lang="de-DE" sz="1400" b="0" i="0" dirty="0">
-                <a:effectLst/>
-                <a:latin typeface="Arial" panose="020B0604020202020204" pitchFamily="34" charset="0"/>
-                <a:cs typeface="Arial" panose="020B0604020202020204" pitchFamily="34" charset="0"/>
-              </a:rPr>
-              <a:t>,” 12 2014.</a:t>
-            </a:r>
-            <a:br>
-              <a:rPr lang="de-DE" sz="1400" dirty="0">
-                <a:latin typeface="Arial" panose="020B0604020202020204" pitchFamily="34" charset="0"/>
-                <a:cs typeface="Arial" panose="020B0604020202020204" pitchFamily="34" charset="0"/>
-              </a:rPr>
-            </a:br>
-            <a:r>
-              <a:rPr lang="de-DE" sz="1400" b="0" i="0" dirty="0">
-                <a:effectLst/>
-                <a:latin typeface="Arial" panose="020B0604020202020204" pitchFamily="34" charset="0"/>
-                <a:cs typeface="Arial" panose="020B0604020202020204" pitchFamily="34" charset="0"/>
-              </a:rPr>
-              <a:t>[3] Andreas </a:t>
-            </a:r>
-            <a:r>
-              <a:rPr lang="de-DE" sz="1400" b="0" i="0" dirty="0" err="1">
-                <a:effectLst/>
-                <a:latin typeface="Arial" panose="020B0604020202020204" pitchFamily="34" charset="0"/>
-                <a:cs typeface="Arial" panose="020B0604020202020204" pitchFamily="34" charset="0"/>
-              </a:rPr>
-              <a:t>Daberkow</a:t>
-            </a:r>
-            <a:r>
-              <a:rPr lang="de-DE" sz="1400" b="0" i="0" dirty="0">
-                <a:effectLst/>
-                <a:latin typeface="Arial" panose="020B0604020202020204" pitchFamily="34" charset="0"/>
-                <a:cs typeface="Arial" panose="020B0604020202020204" pitchFamily="34" charset="0"/>
-              </a:rPr>
-              <a:t>, “Prozessgestaltung in der Produktentstehung.”</a:t>
-            </a:r>
-            <a:br>
-              <a:rPr lang="de-DE" sz="1400" dirty="0">
-                <a:latin typeface="Arial" panose="020B0604020202020204" pitchFamily="34" charset="0"/>
-                <a:cs typeface="Arial" panose="020B0604020202020204" pitchFamily="34" charset="0"/>
-              </a:rPr>
-            </a:br>
-            <a:r>
-              <a:rPr lang="de-DE" sz="1400" b="0" i="0" dirty="0">
-                <a:effectLst/>
-                <a:latin typeface="Arial" panose="020B0604020202020204" pitchFamily="34" charset="0"/>
-                <a:cs typeface="Arial" panose="020B0604020202020204" pitchFamily="34" charset="0"/>
-              </a:rPr>
-              <a:t>[4] H. Wolf and W. Bleek, Agile Softwareentwicklung: Werte, Konzepte und Methoden. </a:t>
-            </a:r>
-            <a:r>
-              <a:rPr lang="de-DE" sz="1400" b="0" i="0" dirty="0" err="1">
-                <a:effectLst/>
-                <a:latin typeface="Arial" panose="020B0604020202020204" pitchFamily="34" charset="0"/>
-                <a:cs typeface="Arial" panose="020B0604020202020204" pitchFamily="34" charset="0"/>
-              </a:rPr>
-              <a:t>dpunkt.verlag</a:t>
-            </a:r>
-            <a:r>
-              <a:rPr lang="de-DE" sz="1400" b="0" i="0" dirty="0">
-                <a:effectLst/>
-                <a:latin typeface="Arial" panose="020B0604020202020204" pitchFamily="34" charset="0"/>
-                <a:cs typeface="Arial" panose="020B0604020202020204" pitchFamily="34" charset="0"/>
-              </a:rPr>
-              <a:t>, 2011.</a:t>
-            </a:r>
-            <a:br>
-              <a:rPr lang="de-DE" sz="1400" dirty="0">
-                <a:latin typeface="Arial" panose="020B0604020202020204" pitchFamily="34" charset="0"/>
-                <a:cs typeface="Arial" panose="020B0604020202020204" pitchFamily="34" charset="0"/>
-              </a:rPr>
-            </a:br>
-            <a:r>
-              <a:rPr lang="de-DE" sz="1400" b="0" i="0" dirty="0">
-                <a:effectLst/>
-                <a:latin typeface="Arial" panose="020B0604020202020204" pitchFamily="34" charset="0"/>
-                <a:cs typeface="Arial" panose="020B0604020202020204" pitchFamily="34" charset="0"/>
-              </a:rPr>
-              <a:t>[5] A. Alliance, “Agile 101.” https://www.agilealliance.org/agile101/. [Online</a:t>
-            </a:r>
-            <a:r>
-              <a:rPr lang="de-DE" sz="1400" b="0" i="0">
-                <a:effectLst/>
-                <a:latin typeface="Arial" panose="020B0604020202020204" pitchFamily="34" charset="0"/>
-                <a:cs typeface="Arial" panose="020B0604020202020204" pitchFamily="34" charset="0"/>
-              </a:rPr>
-              <a:t>; Stand 15.11.2022</a:t>
-            </a:r>
-            <a:r>
-              <a:rPr lang="de-DE" sz="1400" b="0" i="0" dirty="0">
-                <a:effectLst/>
-                <a:latin typeface="Arial" panose="020B0604020202020204" pitchFamily="34" charset="0"/>
-                <a:cs typeface="Arial" panose="020B0604020202020204" pitchFamily="34" charset="0"/>
-              </a:rPr>
-              <a:t>].</a:t>
-            </a:r>
-            <a:br>
-              <a:rPr lang="de-DE" dirty="0"/>
-            </a:br>
+          </a:p>
+          <a:p>
             <a:endParaRPr lang="de-DE" dirty="0"/>
           </a:p>
         </p:txBody>
@@ -36663,7 +39222,223 @@
     </p:spTree>
     <p:extLst>
       <p:ext uri="{BB962C8B-B14F-4D97-AF65-F5344CB8AC3E}">
-        <p14:creationId xmlns:p14="http://schemas.microsoft.com/office/powerpoint/2010/main" val="2018495382"/>
+        <p14:creationId xmlns:p14="http://schemas.microsoft.com/office/powerpoint/2010/main" val="1727191536"/>
+      </p:ext>
+    </p:extLst>
+  </p:cSld>
+  <p:clrMapOvr>
+    <a:masterClrMapping/>
+  </p:clrMapOvr>
+</p:sld>
+</file>
+
+<file path=ppt/slides/slide9.xml><?xml version="1.0" encoding="utf-8"?>
+<p:sld xmlns:a="http://schemas.openxmlformats.org/drawingml/2006/main" xmlns:r="http://schemas.openxmlformats.org/officeDocument/2006/relationships" xmlns:p="http://schemas.openxmlformats.org/presentationml/2006/main" show="0">
+  <p:cSld>
+    <p:spTree>
+      <p:nvGrpSpPr>
+        <p:cNvPr id="1" name=""/>
+        <p:cNvGrpSpPr/>
+        <p:nvPr/>
+      </p:nvGrpSpPr>
+      <p:grpSpPr>
+        <a:xfrm>
+          <a:off x="0" y="0"/>
+          <a:ext cx="0" cy="0"/>
+          <a:chOff x="0" y="0"/>
+          <a:chExt cx="0" cy="0"/>
+        </a:xfrm>
+      </p:grpSpPr>
+      <p:sp>
+        <p:nvSpPr>
+          <p:cNvPr id="2" name="Datumsplatzhalter 1">
+            <a:extLst>
+              <a:ext uri="{FF2B5EF4-FFF2-40B4-BE49-F238E27FC236}">
+                <a16:creationId xmlns:a16="http://schemas.microsoft.com/office/drawing/2014/main" id="{BB1D788A-C68F-79F5-C9F2-447312A7CBD9}"/>
+              </a:ext>
+            </a:extLst>
+          </p:cNvPr>
+          <p:cNvSpPr>
+            <a:spLocks noGrp="1"/>
+          </p:cNvSpPr>
+          <p:nvPr>
+            <p:ph type="dt" sz="half" idx="10"/>
+          </p:nvPr>
+        </p:nvSpPr>
+        <p:spPr/>
+        <p:txBody>
+          <a:bodyPr/>
+          <a:lstStyle/>
+          <a:p>
+            <a:r>
+              <a:rPr lang="de-DE"/>
+              <a:t>Campus Sontheim</a:t>
+            </a:r>
+            <a:endParaRPr lang="de-DE" dirty="0"/>
+          </a:p>
+        </p:txBody>
+      </p:sp>
+      <p:sp>
+        <p:nvSpPr>
+          <p:cNvPr id="3" name="Fußzeilenplatzhalter 2">
+            <a:extLst>
+              <a:ext uri="{FF2B5EF4-FFF2-40B4-BE49-F238E27FC236}">
+                <a16:creationId xmlns:a16="http://schemas.microsoft.com/office/drawing/2014/main" id="{EFFA12D6-C5C2-21E1-C6C9-FA2241432F1D}"/>
+              </a:ext>
+            </a:extLst>
+          </p:cNvPr>
+          <p:cNvSpPr>
+            <a:spLocks noGrp="1"/>
+          </p:cNvSpPr>
+          <p:nvPr>
+            <p:ph type="ftr" sz="quarter" idx="11"/>
+          </p:nvPr>
+        </p:nvSpPr>
+        <p:spPr/>
+        <p:txBody>
+          <a:bodyPr/>
+          <a:lstStyle/>
+          <a:p>
+            <a:r>
+              <a:rPr lang="de-DE"/>
+              <a:t>Sarah-Anne Teuner, Rico Steinke |  T1 / MAS |  WiSe 2022/23</a:t>
+            </a:r>
+            <a:endParaRPr lang="de-DE" dirty="0"/>
+          </a:p>
+        </p:txBody>
+      </p:sp>
+      <p:sp>
+        <p:nvSpPr>
+          <p:cNvPr id="4" name="Foliennummernplatzhalter 3">
+            <a:extLst>
+              <a:ext uri="{FF2B5EF4-FFF2-40B4-BE49-F238E27FC236}">
+                <a16:creationId xmlns:a16="http://schemas.microsoft.com/office/drawing/2014/main" id="{8A245F5A-8BAE-F0F4-482C-831DAC8ECDE9}"/>
+              </a:ext>
+            </a:extLst>
+          </p:cNvPr>
+          <p:cNvSpPr>
+            <a:spLocks noGrp="1"/>
+          </p:cNvSpPr>
+          <p:nvPr>
+            <p:ph type="sldNum" sz="quarter" idx="12"/>
+          </p:nvPr>
+        </p:nvSpPr>
+        <p:spPr/>
+        <p:txBody>
+          <a:bodyPr/>
+          <a:lstStyle/>
+          <a:p>
+            <a:r>
+              <a:rPr lang="de-DE"/>
+              <a:t>|  </a:t>
+            </a:r>
+            <a:fld id="{E6B5151A-17C4-4431-8407-112C0160A8B6}" type="slidenum">
+              <a:rPr lang="de-DE" smtClean="0"/>
+              <a:pPr/>
+              <a:t>9</a:t>
+            </a:fld>
+            <a:endParaRPr lang="de-DE" dirty="0"/>
+          </a:p>
+        </p:txBody>
+      </p:sp>
+      <p:sp>
+        <p:nvSpPr>
+          <p:cNvPr id="5" name="Titel 4">
+            <a:extLst>
+              <a:ext uri="{FF2B5EF4-FFF2-40B4-BE49-F238E27FC236}">
+                <a16:creationId xmlns:a16="http://schemas.microsoft.com/office/drawing/2014/main" id="{5B8A2D87-E9F2-0CAD-601F-F24CF4BBDB53}"/>
+              </a:ext>
+            </a:extLst>
+          </p:cNvPr>
+          <p:cNvSpPr>
+            <a:spLocks noGrp="1"/>
+          </p:cNvSpPr>
+          <p:nvPr>
+            <p:ph type="title"/>
+          </p:nvPr>
+        </p:nvSpPr>
+        <p:spPr/>
+        <p:txBody>
+          <a:bodyPr/>
+          <a:lstStyle/>
+          <a:p>
+            <a:r>
+              <a:rPr lang="de-DE" dirty="0"/>
+              <a:t>Einordnung in den Produktentstehungsprozess</a:t>
+            </a:r>
+            <a:endParaRPr lang="LID4096" dirty="0"/>
+          </a:p>
+        </p:txBody>
+      </p:sp>
+      <p:sp>
+        <p:nvSpPr>
+          <p:cNvPr id="6" name="Inhaltsplatzhalter 5">
+            <a:extLst>
+              <a:ext uri="{FF2B5EF4-FFF2-40B4-BE49-F238E27FC236}">
+                <a16:creationId xmlns:a16="http://schemas.microsoft.com/office/drawing/2014/main" id="{4D0C46E6-5705-FEE9-ECA0-BDD549783C5C}"/>
+              </a:ext>
+            </a:extLst>
+          </p:cNvPr>
+          <p:cNvSpPr>
+            <a:spLocks noGrp="1"/>
+          </p:cNvSpPr>
+          <p:nvPr>
+            <p:ph idx="13"/>
+          </p:nvPr>
+        </p:nvSpPr>
+        <p:spPr/>
+        <p:txBody>
+          <a:bodyPr/>
+          <a:lstStyle/>
+          <a:p>
+            <a:pPr marL="342900" indent="-342900">
+              <a:buFont typeface="Arial" panose="020B0604020202020204" pitchFamily="34" charset="0"/>
+              <a:buChar char="•"/>
+            </a:pPr>
+            <a:r>
+              <a:rPr lang="de-DE" dirty="0"/>
+              <a:t>Dabei hat sich in den letzten Jahren herausgestellt, dass die Entwicklung von Softwarekomponenten eines Produkts /Software als Produkt andere Anforderungen an die Prozessabläufe hat</a:t>
+            </a:r>
+          </a:p>
+          <a:p>
+            <a:pPr marL="342900" indent="-342900">
+              <a:buFont typeface="Arial" panose="020B0604020202020204" pitchFamily="34" charset="0"/>
+              <a:buChar char="•"/>
+            </a:pPr>
+            <a:r>
+              <a:rPr lang="de-DE" dirty="0"/>
+              <a:t>Hier wird zum Beispiel ein hohes Maß an Flexibilität gefordert, Anforderungen und unterliegen einem schnelleren Wandel, hier werden häufig Änderungen vorgenommen (Wen HW Änderungen zu teuer werden, muss SW ausbaden)</a:t>
+            </a:r>
+          </a:p>
+          <a:p>
+            <a:pPr marL="342900" indent="-342900">
+              <a:buFont typeface="Arial" panose="020B0604020202020204" pitchFamily="34" charset="0"/>
+              <a:buChar char="•"/>
+            </a:pPr>
+            <a:r>
+              <a:rPr lang="de-DE" dirty="0"/>
+              <a:t>Aufgrund der zunehmenden Bedeutung und Komplexität von SW in den Produkten, würden wir im PEP einen eigenen Strang für die SW Entwicklung eröffnen</a:t>
+            </a:r>
+          </a:p>
+          <a:p>
+            <a:pPr marL="342900" indent="-342900">
+              <a:buFont typeface="Arial" panose="020B0604020202020204" pitchFamily="34" charset="0"/>
+              <a:buChar char="•"/>
+            </a:pPr>
+            <a:r>
+              <a:rPr lang="de-DE" dirty="0"/>
+              <a:t>(Besondere Anforderungen in der SW Entwicklung führen zum Einsatz agiler Methoden)</a:t>
+            </a:r>
+          </a:p>
+          <a:p>
+            <a:endParaRPr lang="de-DE" dirty="0"/>
+          </a:p>
+        </p:txBody>
+      </p:sp>
+    </p:spTree>
+    <p:extLst>
+      <p:ext uri="{BB962C8B-B14F-4D97-AF65-F5344CB8AC3E}">
+        <p14:creationId xmlns:p14="http://schemas.microsoft.com/office/powerpoint/2010/main" val="30567503"/>
       </p:ext>
     </p:extLst>
   </p:cSld>

</xml_diff>